<commit_message>
Just another hour or 5 fo CONTIGs?
 Changes to be committed:
	modified:   Flip Presentations/NGS_Intro/02-CIGARS/02-CIGARS.pptx
</commit_message>
<xml_diff>
--- a/Flip Presentations/NGS_Intro/02-CIGARS/02-CIGARS.pptx
+++ b/Flip Presentations/NGS_Intro/02-CIGARS/02-CIGARS.pptx
@@ -137,7 +137,7 @@
   </p:defaultTextStyle>
   <p:extLst>
     <p:ext uri="{EFAFB233-063F-42B5-8137-9DF3F51BA10A}">
-      <p15:sldGuideLst xmlns:p15="http://schemas.microsoft.com/office/powerpoint/2012/main" xmlns=""/>
+      <p15:sldGuideLst xmlns="" xmlns:p15="http://schemas.microsoft.com/office/powerpoint/2012/main"/>
     </p:ext>
   </p:extLst>
 </p:presentation>
@@ -229,7 +229,7 @@
           <a:p>
             <a:fld id="{A1A0514D-38CC-49F5-A912-2794DAAF3AC3}" type="datetimeFigureOut">
               <a:rPr lang="en-GB" smtClean="0"/>
-              <a:t>2018-01-31</a:t>
+              <a:t>2018-02-01</a:t>
             </a:fld>
             <a:endParaRPr lang="en-GB"/>
           </a:p>
@@ -1140,7 +1140,95 @@
           <a:bodyPr/>
           <a:lstStyle/>
           <a:p>
-            <a:endParaRPr lang="en-GB"/>
+            <a:pPr algn="just"/>
+            <a:r>
+              <a:rPr lang="en-GB" dirty="0" smtClean="0"/>
+              <a:t>As it says in the </a:t>
+            </a:r>
+            <a:r>
+              <a:rPr lang="en-GB" b="1" dirty="0"/>
+              <a:t>SAM Manual </a:t>
+            </a:r>
+            <a:r>
+              <a:rPr lang="en-GB" dirty="0"/>
+              <a:t>(http://</a:t>
+            </a:r>
+            <a:r>
+              <a:rPr lang="en-GB" dirty="0" smtClean="0"/>
+              <a:t>samtools.github.io/hts-specs/SAMv1.pdf):</a:t>
+            </a:r>
+          </a:p>
+          <a:p>
+            <a:pPr algn="just"/>
+            <a:endParaRPr lang="en-GB" dirty="0"/>
+          </a:p>
+          <a:p>
+            <a:pPr algn="just"/>
+            <a:r>
+              <a:rPr lang="en-GB" dirty="0" smtClean="0"/>
+              <a:t>“In </a:t>
+            </a:r>
+            <a:r>
+              <a:rPr lang="en-GB" dirty="0"/>
+              <a:t>a padded </a:t>
+            </a:r>
+            <a:r>
+              <a:rPr lang="en-GB" b="1" dirty="0"/>
+              <a:t>SAM</a:t>
+            </a:r>
+            <a:r>
+              <a:rPr lang="en-GB" dirty="0"/>
+              <a:t>, the insertion and padding </a:t>
+            </a:r>
+            <a:r>
+              <a:rPr lang="en-GB" b="1" dirty="0"/>
+              <a:t>CIGAR</a:t>
+            </a:r>
+            <a:r>
+              <a:rPr lang="en-GB" dirty="0"/>
+              <a:t> operations (‘</a:t>
+            </a:r>
+            <a:r>
+              <a:rPr lang="en-GB" b="1" dirty="0"/>
+              <a:t>I</a:t>
+            </a:r>
+            <a:r>
+              <a:rPr lang="en-GB" dirty="0"/>
+              <a:t>’ and ‘</a:t>
+            </a:r>
+            <a:r>
+              <a:rPr lang="en-GB" b="1" dirty="0"/>
+              <a:t>P</a:t>
+            </a:r>
+            <a:r>
+              <a:rPr lang="en-GB" dirty="0"/>
+              <a:t>’) are not used </a:t>
+            </a:r>
+            <a:r>
+              <a:rPr lang="en-GB" u="sng" dirty="0"/>
+              <a:t>because the </a:t>
+            </a:r>
+            <a:r>
+              <a:rPr lang="en-GB" b="1" u="sng" dirty="0"/>
+              <a:t>padded reference </a:t>
+            </a:r>
+            <a:r>
+              <a:rPr lang="en-GB" u="sng" dirty="0"/>
+              <a:t>already considers all the </a:t>
+            </a:r>
+            <a:r>
+              <a:rPr lang="en-GB" b="1" u="sng" dirty="0"/>
+              <a:t>insertions</a:t>
+            </a:r>
+            <a:r>
+              <a:rPr lang="en-GB" dirty="0" smtClean="0"/>
+              <a:t>.”</a:t>
+            </a:r>
+            <a:endParaRPr lang="en-GB" dirty="0"/>
+          </a:p>
+          <a:p>
+            <a:pPr algn="just"/>
+            <a:endParaRPr lang="en-GB" dirty="0"/>
           </a:p>
         </p:txBody>
       </p:sp>
@@ -4029,7 +4117,7 @@
           <p:cNvPr id="2" name="Title 1">
             <a:extLst>
               <a:ext uri="{FF2B5EF4-FFF2-40B4-BE49-F238E27FC236}">
-                <a16:creationId xmlns:a16="http://schemas.microsoft.com/office/drawing/2014/main" xmlns="" id="{032A3615-1B4F-418D-B0BB-CBD54E1C819E}"/>
+                <a16:creationId xmlns="" xmlns:a16="http://schemas.microsoft.com/office/drawing/2014/main" id="{032A3615-1B4F-418D-B0BB-CBD54E1C819E}"/>
               </a:ext>
             </a:extLst>
           </p:cNvPr>
@@ -4067,7 +4155,7 @@
           <p:cNvPr id="3" name="Subtitle 2">
             <a:extLst>
               <a:ext uri="{FF2B5EF4-FFF2-40B4-BE49-F238E27FC236}">
-                <a16:creationId xmlns:a16="http://schemas.microsoft.com/office/drawing/2014/main" xmlns="" id="{5178CFA0-D280-4CD5-A213-7111D5B1C049}"/>
+                <a16:creationId xmlns="" xmlns:a16="http://schemas.microsoft.com/office/drawing/2014/main" id="{5178CFA0-D280-4CD5-A213-7111D5B1C049}"/>
               </a:ext>
             </a:extLst>
           </p:cNvPr>
@@ -4138,7 +4226,7 @@
           <p:cNvPr id="4" name="Date Placeholder 3">
             <a:extLst>
               <a:ext uri="{FF2B5EF4-FFF2-40B4-BE49-F238E27FC236}">
-                <a16:creationId xmlns:a16="http://schemas.microsoft.com/office/drawing/2014/main" xmlns="" id="{6437010A-E880-4C2E-8F4F-2C9DE975306A}"/>
+                <a16:creationId xmlns="" xmlns:a16="http://schemas.microsoft.com/office/drawing/2014/main" id="{6437010A-E880-4C2E-8F4F-2C9DE975306A}"/>
               </a:ext>
             </a:extLst>
           </p:cNvPr>
@@ -4156,7 +4244,7 @@
           <a:p>
             <a:fld id="{AEC09C50-853A-420B-8C26-7439C86401C0}" type="datetimeFigureOut">
               <a:rPr lang="en-GB" smtClean="0"/>
-              <a:t>2018-01-31</a:t>
+              <a:t>2018-02-01</a:t>
             </a:fld>
             <a:endParaRPr lang="en-GB"/>
           </a:p>
@@ -4167,7 +4255,7 @@
           <p:cNvPr id="5" name="Footer Placeholder 4">
             <a:extLst>
               <a:ext uri="{FF2B5EF4-FFF2-40B4-BE49-F238E27FC236}">
-                <a16:creationId xmlns:a16="http://schemas.microsoft.com/office/drawing/2014/main" xmlns="" id="{9F643F16-915B-4F04-8319-7D1C8C69C781}"/>
+                <a16:creationId xmlns="" xmlns:a16="http://schemas.microsoft.com/office/drawing/2014/main" id="{9F643F16-915B-4F04-8319-7D1C8C69C781}"/>
               </a:ext>
             </a:extLst>
           </p:cNvPr>
@@ -4192,7 +4280,7 @@
           <p:cNvPr id="6" name="Slide Number Placeholder 5">
             <a:extLst>
               <a:ext uri="{FF2B5EF4-FFF2-40B4-BE49-F238E27FC236}">
-                <a16:creationId xmlns:a16="http://schemas.microsoft.com/office/drawing/2014/main" xmlns="" id="{A5A1F72C-9F07-4EFA-8E45-090190D59EFA}"/>
+                <a16:creationId xmlns="" xmlns:a16="http://schemas.microsoft.com/office/drawing/2014/main" id="{A5A1F72C-9F07-4EFA-8E45-090190D59EFA}"/>
               </a:ext>
             </a:extLst>
           </p:cNvPr>
@@ -4251,7 +4339,7 @@
           <p:cNvPr id="2" name="Title 1">
             <a:extLst>
               <a:ext uri="{FF2B5EF4-FFF2-40B4-BE49-F238E27FC236}">
-                <a16:creationId xmlns:a16="http://schemas.microsoft.com/office/drawing/2014/main" xmlns="" id="{DF0ADA25-4CDF-4246-9CC9-8AE3380619F1}"/>
+                <a16:creationId xmlns="" xmlns:a16="http://schemas.microsoft.com/office/drawing/2014/main" id="{DF0ADA25-4CDF-4246-9CC9-8AE3380619F1}"/>
               </a:ext>
             </a:extLst>
           </p:cNvPr>
@@ -4280,7 +4368,7 @@
           <p:cNvPr id="3" name="Vertical Text Placeholder 2">
             <a:extLst>
               <a:ext uri="{FF2B5EF4-FFF2-40B4-BE49-F238E27FC236}">
-                <a16:creationId xmlns:a16="http://schemas.microsoft.com/office/drawing/2014/main" xmlns="" id="{A73B0C6F-4850-4D10-91DC-61668DE50E5A}"/>
+                <a16:creationId xmlns="" xmlns:a16="http://schemas.microsoft.com/office/drawing/2014/main" id="{A73B0C6F-4850-4D10-91DC-61668DE50E5A}"/>
               </a:ext>
             </a:extLst>
           </p:cNvPr>
@@ -4338,7 +4426,7 @@
           <p:cNvPr id="4" name="Date Placeholder 3">
             <a:extLst>
               <a:ext uri="{FF2B5EF4-FFF2-40B4-BE49-F238E27FC236}">
-                <a16:creationId xmlns:a16="http://schemas.microsoft.com/office/drawing/2014/main" xmlns="" id="{28816B05-7093-4142-B374-DFA2171DFDA7}"/>
+                <a16:creationId xmlns="" xmlns:a16="http://schemas.microsoft.com/office/drawing/2014/main" id="{28816B05-7093-4142-B374-DFA2171DFDA7}"/>
               </a:ext>
             </a:extLst>
           </p:cNvPr>
@@ -4356,7 +4444,7 @@
           <a:p>
             <a:fld id="{AEC09C50-853A-420B-8C26-7439C86401C0}" type="datetimeFigureOut">
               <a:rPr lang="en-GB" smtClean="0"/>
-              <a:t>2018-01-31</a:t>
+              <a:t>2018-02-01</a:t>
             </a:fld>
             <a:endParaRPr lang="en-GB"/>
           </a:p>
@@ -4367,7 +4455,7 @@
           <p:cNvPr id="5" name="Footer Placeholder 4">
             <a:extLst>
               <a:ext uri="{FF2B5EF4-FFF2-40B4-BE49-F238E27FC236}">
-                <a16:creationId xmlns:a16="http://schemas.microsoft.com/office/drawing/2014/main" xmlns="" id="{F8D052D6-AC53-4967-A0E2-E4E4AB61FF09}"/>
+                <a16:creationId xmlns="" xmlns:a16="http://schemas.microsoft.com/office/drawing/2014/main" id="{F8D052D6-AC53-4967-A0E2-E4E4AB61FF09}"/>
               </a:ext>
             </a:extLst>
           </p:cNvPr>
@@ -4392,7 +4480,7 @@
           <p:cNvPr id="6" name="Slide Number Placeholder 5">
             <a:extLst>
               <a:ext uri="{FF2B5EF4-FFF2-40B4-BE49-F238E27FC236}">
-                <a16:creationId xmlns:a16="http://schemas.microsoft.com/office/drawing/2014/main" xmlns="" id="{209C7226-9CDD-405A-B9DA-D5ED9561A32C}"/>
+                <a16:creationId xmlns="" xmlns:a16="http://schemas.microsoft.com/office/drawing/2014/main" id="{209C7226-9CDD-405A-B9DA-D5ED9561A32C}"/>
               </a:ext>
             </a:extLst>
           </p:cNvPr>
@@ -4451,7 +4539,7 @@
           <p:cNvPr id="2" name="Vertical Title 1">
             <a:extLst>
               <a:ext uri="{FF2B5EF4-FFF2-40B4-BE49-F238E27FC236}">
-                <a16:creationId xmlns:a16="http://schemas.microsoft.com/office/drawing/2014/main" xmlns="" id="{AC8F15DC-2850-4805-BE66-C8A705279A00}"/>
+                <a16:creationId xmlns="" xmlns:a16="http://schemas.microsoft.com/office/drawing/2014/main" id="{AC8F15DC-2850-4805-BE66-C8A705279A00}"/>
               </a:ext>
             </a:extLst>
           </p:cNvPr>
@@ -4485,7 +4573,7 @@
           <p:cNvPr id="3" name="Vertical Text Placeholder 2">
             <a:extLst>
               <a:ext uri="{FF2B5EF4-FFF2-40B4-BE49-F238E27FC236}">
-                <a16:creationId xmlns:a16="http://schemas.microsoft.com/office/drawing/2014/main" xmlns="" id="{C357DFB2-B690-4D71-9FB8-516ED75975FD}"/>
+                <a16:creationId xmlns="" xmlns:a16="http://schemas.microsoft.com/office/drawing/2014/main" id="{C357DFB2-B690-4D71-9FB8-516ED75975FD}"/>
               </a:ext>
             </a:extLst>
           </p:cNvPr>
@@ -4548,7 +4636,7 @@
           <p:cNvPr id="4" name="Date Placeholder 3">
             <a:extLst>
               <a:ext uri="{FF2B5EF4-FFF2-40B4-BE49-F238E27FC236}">
-                <a16:creationId xmlns:a16="http://schemas.microsoft.com/office/drawing/2014/main" xmlns="" id="{6CA1D11A-42DD-417D-AC4D-52096BB89234}"/>
+                <a16:creationId xmlns="" xmlns:a16="http://schemas.microsoft.com/office/drawing/2014/main" id="{6CA1D11A-42DD-417D-AC4D-52096BB89234}"/>
               </a:ext>
             </a:extLst>
           </p:cNvPr>
@@ -4566,7 +4654,7 @@
           <a:p>
             <a:fld id="{AEC09C50-853A-420B-8C26-7439C86401C0}" type="datetimeFigureOut">
               <a:rPr lang="en-GB" smtClean="0"/>
-              <a:t>2018-01-31</a:t>
+              <a:t>2018-02-01</a:t>
             </a:fld>
             <a:endParaRPr lang="en-GB"/>
           </a:p>
@@ -4577,7 +4665,7 @@
           <p:cNvPr id="5" name="Footer Placeholder 4">
             <a:extLst>
               <a:ext uri="{FF2B5EF4-FFF2-40B4-BE49-F238E27FC236}">
-                <a16:creationId xmlns:a16="http://schemas.microsoft.com/office/drawing/2014/main" xmlns="" id="{24E0F641-8F99-48B8-8C2B-0535E04FC772}"/>
+                <a16:creationId xmlns="" xmlns:a16="http://schemas.microsoft.com/office/drawing/2014/main" id="{24E0F641-8F99-48B8-8C2B-0535E04FC772}"/>
               </a:ext>
             </a:extLst>
           </p:cNvPr>
@@ -4602,7 +4690,7 @@
           <p:cNvPr id="6" name="Slide Number Placeholder 5">
             <a:extLst>
               <a:ext uri="{FF2B5EF4-FFF2-40B4-BE49-F238E27FC236}">
-                <a16:creationId xmlns:a16="http://schemas.microsoft.com/office/drawing/2014/main" xmlns="" id="{F5D90570-5593-43EA-ADD8-E7B87D770333}"/>
+                <a16:creationId xmlns="" xmlns:a16="http://schemas.microsoft.com/office/drawing/2014/main" id="{F5D90570-5593-43EA-ADD8-E7B87D770333}"/>
               </a:ext>
             </a:extLst>
           </p:cNvPr>
@@ -4820,7 +4908,7 @@
           <a:p>
             <a:fld id="{BB2556DB-1519-40E4-AF1C-F909855EDD97}" type="datetimeFigureOut">
               <a:rPr lang="en-GB" smtClean="0"/>
-              <a:t>2018-01-31</a:t>
+              <a:t>2018-02-01</a:t>
             </a:fld>
             <a:endParaRPr lang="en-GB"/>
           </a:p>
@@ -4990,7 +5078,7 @@
           <a:p>
             <a:fld id="{BB2556DB-1519-40E4-AF1C-F909855EDD97}" type="datetimeFigureOut">
               <a:rPr lang="en-GB" smtClean="0"/>
-              <a:t>2018-01-31</a:t>
+              <a:t>2018-02-01</a:t>
             </a:fld>
             <a:endParaRPr lang="en-GB"/>
           </a:p>
@@ -5236,7 +5324,7 @@
           <a:p>
             <a:fld id="{BB2556DB-1519-40E4-AF1C-F909855EDD97}" type="datetimeFigureOut">
               <a:rPr lang="en-GB" smtClean="0"/>
-              <a:t>2018-01-31</a:t>
+              <a:t>2018-02-01</a:t>
             </a:fld>
             <a:endParaRPr lang="en-GB"/>
           </a:p>
@@ -5524,7 +5612,7 @@
           <a:p>
             <a:fld id="{BB2556DB-1519-40E4-AF1C-F909855EDD97}" type="datetimeFigureOut">
               <a:rPr lang="en-GB" smtClean="0"/>
-              <a:t>2018-01-31</a:t>
+              <a:t>2018-02-01</a:t>
             </a:fld>
             <a:endParaRPr lang="en-GB"/>
           </a:p>
@@ -5946,7 +6034,7 @@
           <a:p>
             <a:fld id="{BB2556DB-1519-40E4-AF1C-F909855EDD97}" type="datetimeFigureOut">
               <a:rPr lang="en-GB" smtClean="0"/>
-              <a:t>2018-01-31</a:t>
+              <a:t>2018-02-01</a:t>
             </a:fld>
             <a:endParaRPr lang="en-GB"/>
           </a:p>
@@ -6064,7 +6152,7 @@
           <a:p>
             <a:fld id="{BB2556DB-1519-40E4-AF1C-F909855EDD97}" type="datetimeFigureOut">
               <a:rPr lang="en-GB" smtClean="0"/>
-              <a:t>2018-01-31</a:t>
+              <a:t>2018-02-01</a:t>
             </a:fld>
             <a:endParaRPr lang="en-GB"/>
           </a:p>
@@ -6159,7 +6247,7 @@
           <a:p>
             <a:fld id="{BB2556DB-1519-40E4-AF1C-F909855EDD97}" type="datetimeFigureOut">
               <a:rPr lang="en-GB" smtClean="0"/>
-              <a:t>2018-01-31</a:t>
+              <a:t>2018-02-01</a:t>
             </a:fld>
             <a:endParaRPr lang="en-GB"/>
           </a:p>
@@ -6436,7 +6524,7 @@
           <a:p>
             <a:fld id="{BB2556DB-1519-40E4-AF1C-F909855EDD97}" type="datetimeFigureOut">
               <a:rPr lang="en-GB" smtClean="0"/>
-              <a:t>2018-01-31</a:t>
+              <a:t>2018-02-01</a:t>
             </a:fld>
             <a:endParaRPr lang="en-GB"/>
           </a:p>
@@ -6519,7 +6607,7 @@
           <p:cNvPr id="2" name="Title 1">
             <a:extLst>
               <a:ext uri="{FF2B5EF4-FFF2-40B4-BE49-F238E27FC236}">
-                <a16:creationId xmlns:a16="http://schemas.microsoft.com/office/drawing/2014/main" xmlns="" id="{B98979EE-87BC-427F-94CA-2C281566B09A}"/>
+                <a16:creationId xmlns="" xmlns:a16="http://schemas.microsoft.com/office/drawing/2014/main" id="{B98979EE-87BC-427F-94CA-2C281566B09A}"/>
               </a:ext>
             </a:extLst>
           </p:cNvPr>
@@ -6548,7 +6636,7 @@
           <p:cNvPr id="3" name="Content Placeholder 2">
             <a:extLst>
               <a:ext uri="{FF2B5EF4-FFF2-40B4-BE49-F238E27FC236}">
-                <a16:creationId xmlns:a16="http://schemas.microsoft.com/office/drawing/2014/main" xmlns="" id="{08E844DF-4E79-432A-89FF-B27AE73F8DFC}"/>
+                <a16:creationId xmlns="" xmlns:a16="http://schemas.microsoft.com/office/drawing/2014/main" id="{08E844DF-4E79-432A-89FF-B27AE73F8DFC}"/>
               </a:ext>
             </a:extLst>
           </p:cNvPr>
@@ -6606,7 +6694,7 @@
           <p:cNvPr id="4" name="Date Placeholder 3">
             <a:extLst>
               <a:ext uri="{FF2B5EF4-FFF2-40B4-BE49-F238E27FC236}">
-                <a16:creationId xmlns:a16="http://schemas.microsoft.com/office/drawing/2014/main" xmlns="" id="{8B91852C-926C-48F7-8D30-64C8DA09313F}"/>
+                <a16:creationId xmlns="" xmlns:a16="http://schemas.microsoft.com/office/drawing/2014/main" id="{8B91852C-926C-48F7-8D30-64C8DA09313F}"/>
               </a:ext>
             </a:extLst>
           </p:cNvPr>
@@ -6624,7 +6712,7 @@
           <a:p>
             <a:fld id="{AEC09C50-853A-420B-8C26-7439C86401C0}" type="datetimeFigureOut">
               <a:rPr lang="en-GB" smtClean="0"/>
-              <a:t>2018-01-31</a:t>
+              <a:t>2018-02-01</a:t>
             </a:fld>
             <a:endParaRPr lang="en-GB"/>
           </a:p>
@@ -6635,7 +6723,7 @@
           <p:cNvPr id="5" name="Footer Placeholder 4">
             <a:extLst>
               <a:ext uri="{FF2B5EF4-FFF2-40B4-BE49-F238E27FC236}">
-                <a16:creationId xmlns:a16="http://schemas.microsoft.com/office/drawing/2014/main" xmlns="" id="{546A3794-73BB-4394-B312-0810CC8D282B}"/>
+                <a16:creationId xmlns="" xmlns:a16="http://schemas.microsoft.com/office/drawing/2014/main" id="{546A3794-73BB-4394-B312-0810CC8D282B}"/>
               </a:ext>
             </a:extLst>
           </p:cNvPr>
@@ -6660,7 +6748,7 @@
           <p:cNvPr id="6" name="Slide Number Placeholder 5">
             <a:extLst>
               <a:ext uri="{FF2B5EF4-FFF2-40B4-BE49-F238E27FC236}">
-                <a16:creationId xmlns:a16="http://schemas.microsoft.com/office/drawing/2014/main" xmlns="" id="{07786F77-2E2A-4620-93A8-BA28C7D5968E}"/>
+                <a16:creationId xmlns="" xmlns:a16="http://schemas.microsoft.com/office/drawing/2014/main" id="{07786F77-2E2A-4620-93A8-BA28C7D5968E}"/>
               </a:ext>
             </a:extLst>
           </p:cNvPr>
@@ -6889,7 +6977,7 @@
           <a:p>
             <a:fld id="{BB2556DB-1519-40E4-AF1C-F909855EDD97}" type="datetimeFigureOut">
               <a:rPr lang="en-GB" smtClean="0"/>
-              <a:t>2018-01-31</a:t>
+              <a:t>2018-02-01</a:t>
             </a:fld>
             <a:endParaRPr lang="en-GB"/>
           </a:p>
@@ -7059,7 +7147,7 @@
           <a:p>
             <a:fld id="{BB2556DB-1519-40E4-AF1C-F909855EDD97}" type="datetimeFigureOut">
               <a:rPr lang="en-GB" smtClean="0"/>
-              <a:t>2018-01-31</a:t>
+              <a:t>2018-02-01</a:t>
             </a:fld>
             <a:endParaRPr lang="en-GB"/>
           </a:p>
@@ -7239,7 +7327,7 @@
           <a:p>
             <a:fld id="{BB2556DB-1519-40E4-AF1C-F909855EDD97}" type="datetimeFigureOut">
               <a:rPr lang="en-GB" smtClean="0"/>
-              <a:t>2018-01-31</a:t>
+              <a:t>2018-02-01</a:t>
             </a:fld>
             <a:endParaRPr lang="en-GB"/>
           </a:p>
@@ -7357,7 +7445,7 @@
           <a:p>
             <a:fld id="{BB2556DB-1519-40E4-AF1C-F909855EDD97}" type="datetimeFigureOut">
               <a:rPr lang="en-GB" smtClean="0"/>
-              <a:t>2018-01-31</a:t>
+              <a:t>2018-02-01</a:t>
             </a:fld>
             <a:endParaRPr lang="en-GB"/>
           </a:p>
@@ -7440,7 +7528,7 @@
           <p:cNvPr id="2" name="Title 1">
             <a:extLst>
               <a:ext uri="{FF2B5EF4-FFF2-40B4-BE49-F238E27FC236}">
-                <a16:creationId xmlns:a16="http://schemas.microsoft.com/office/drawing/2014/main" xmlns="" id="{AAAC300C-DDCD-4815-A851-D27410C002C4}"/>
+                <a16:creationId xmlns="" xmlns:a16="http://schemas.microsoft.com/office/drawing/2014/main" id="{AAAC300C-DDCD-4815-A851-D27410C002C4}"/>
               </a:ext>
             </a:extLst>
           </p:cNvPr>
@@ -7478,7 +7566,7 @@
           <p:cNvPr id="3" name="Text Placeholder 2">
             <a:extLst>
               <a:ext uri="{FF2B5EF4-FFF2-40B4-BE49-F238E27FC236}">
-                <a16:creationId xmlns:a16="http://schemas.microsoft.com/office/drawing/2014/main" xmlns="" id="{71D70F57-38B3-443C-8310-1B6EF0186E83}"/>
+                <a16:creationId xmlns="" xmlns:a16="http://schemas.microsoft.com/office/drawing/2014/main" id="{71D70F57-38B3-443C-8310-1B6EF0186E83}"/>
               </a:ext>
             </a:extLst>
           </p:cNvPr>
@@ -7603,7 +7691,7 @@
           <p:cNvPr id="4" name="Date Placeholder 3">
             <a:extLst>
               <a:ext uri="{FF2B5EF4-FFF2-40B4-BE49-F238E27FC236}">
-                <a16:creationId xmlns:a16="http://schemas.microsoft.com/office/drawing/2014/main" xmlns="" id="{CEE46B92-1656-4AB0-B92C-41936E9B09B4}"/>
+                <a16:creationId xmlns="" xmlns:a16="http://schemas.microsoft.com/office/drawing/2014/main" id="{CEE46B92-1656-4AB0-B92C-41936E9B09B4}"/>
               </a:ext>
             </a:extLst>
           </p:cNvPr>
@@ -7621,7 +7709,7 @@
           <a:p>
             <a:fld id="{AEC09C50-853A-420B-8C26-7439C86401C0}" type="datetimeFigureOut">
               <a:rPr lang="en-GB" smtClean="0"/>
-              <a:t>2018-01-31</a:t>
+              <a:t>2018-02-01</a:t>
             </a:fld>
             <a:endParaRPr lang="en-GB"/>
           </a:p>
@@ -7632,7 +7720,7 @@
           <p:cNvPr id="5" name="Footer Placeholder 4">
             <a:extLst>
               <a:ext uri="{FF2B5EF4-FFF2-40B4-BE49-F238E27FC236}">
-                <a16:creationId xmlns:a16="http://schemas.microsoft.com/office/drawing/2014/main" xmlns="" id="{7DC8305A-64D0-4AFB-8642-6845BCEBBD8E}"/>
+                <a16:creationId xmlns="" xmlns:a16="http://schemas.microsoft.com/office/drawing/2014/main" id="{7DC8305A-64D0-4AFB-8642-6845BCEBBD8E}"/>
               </a:ext>
             </a:extLst>
           </p:cNvPr>
@@ -7657,7 +7745,7 @@
           <p:cNvPr id="6" name="Slide Number Placeholder 5">
             <a:extLst>
               <a:ext uri="{FF2B5EF4-FFF2-40B4-BE49-F238E27FC236}">
-                <a16:creationId xmlns:a16="http://schemas.microsoft.com/office/drawing/2014/main" xmlns="" id="{5CD65ACC-878F-4FFE-8CA3-4D11A4DF969D}"/>
+                <a16:creationId xmlns="" xmlns:a16="http://schemas.microsoft.com/office/drawing/2014/main" id="{5CD65ACC-878F-4FFE-8CA3-4D11A4DF969D}"/>
               </a:ext>
             </a:extLst>
           </p:cNvPr>
@@ -7716,7 +7804,7 @@
           <p:cNvPr id="2" name="Title 1">
             <a:extLst>
               <a:ext uri="{FF2B5EF4-FFF2-40B4-BE49-F238E27FC236}">
-                <a16:creationId xmlns:a16="http://schemas.microsoft.com/office/drawing/2014/main" xmlns="" id="{C22E1C61-B0A3-4D79-87F0-D3FE72B442EC}"/>
+                <a16:creationId xmlns="" xmlns:a16="http://schemas.microsoft.com/office/drawing/2014/main" id="{C22E1C61-B0A3-4D79-87F0-D3FE72B442EC}"/>
               </a:ext>
             </a:extLst>
           </p:cNvPr>
@@ -7745,7 +7833,7 @@
           <p:cNvPr id="3" name="Content Placeholder 2">
             <a:extLst>
               <a:ext uri="{FF2B5EF4-FFF2-40B4-BE49-F238E27FC236}">
-                <a16:creationId xmlns:a16="http://schemas.microsoft.com/office/drawing/2014/main" xmlns="" id="{8CF6C057-BBB5-4F28-A87E-105844231C32}"/>
+                <a16:creationId xmlns="" xmlns:a16="http://schemas.microsoft.com/office/drawing/2014/main" id="{8CF6C057-BBB5-4F28-A87E-105844231C32}"/>
               </a:ext>
             </a:extLst>
           </p:cNvPr>
@@ -7808,7 +7896,7 @@
           <p:cNvPr id="4" name="Content Placeholder 3">
             <a:extLst>
               <a:ext uri="{FF2B5EF4-FFF2-40B4-BE49-F238E27FC236}">
-                <a16:creationId xmlns:a16="http://schemas.microsoft.com/office/drawing/2014/main" xmlns="" id="{8C9AE18C-33A9-443E-928F-81EC04DF5738}"/>
+                <a16:creationId xmlns="" xmlns:a16="http://schemas.microsoft.com/office/drawing/2014/main" id="{8C9AE18C-33A9-443E-928F-81EC04DF5738}"/>
               </a:ext>
             </a:extLst>
           </p:cNvPr>
@@ -7871,7 +7959,7 @@
           <p:cNvPr id="5" name="Date Placeholder 4">
             <a:extLst>
               <a:ext uri="{FF2B5EF4-FFF2-40B4-BE49-F238E27FC236}">
-                <a16:creationId xmlns:a16="http://schemas.microsoft.com/office/drawing/2014/main" xmlns="" id="{41107389-B4BB-487C-995E-6E58CFAF6E9D}"/>
+                <a16:creationId xmlns="" xmlns:a16="http://schemas.microsoft.com/office/drawing/2014/main" id="{41107389-B4BB-487C-995E-6E58CFAF6E9D}"/>
               </a:ext>
             </a:extLst>
           </p:cNvPr>
@@ -7889,7 +7977,7 @@
           <a:p>
             <a:fld id="{AEC09C50-853A-420B-8C26-7439C86401C0}" type="datetimeFigureOut">
               <a:rPr lang="en-GB" smtClean="0"/>
-              <a:t>2018-01-31</a:t>
+              <a:t>2018-02-01</a:t>
             </a:fld>
             <a:endParaRPr lang="en-GB"/>
           </a:p>
@@ -7900,7 +7988,7 @@
           <p:cNvPr id="6" name="Footer Placeholder 5">
             <a:extLst>
               <a:ext uri="{FF2B5EF4-FFF2-40B4-BE49-F238E27FC236}">
-                <a16:creationId xmlns:a16="http://schemas.microsoft.com/office/drawing/2014/main" xmlns="" id="{3E9CD8BB-3986-4FA9-834F-317E88D998F2}"/>
+                <a16:creationId xmlns="" xmlns:a16="http://schemas.microsoft.com/office/drawing/2014/main" id="{3E9CD8BB-3986-4FA9-834F-317E88D998F2}"/>
               </a:ext>
             </a:extLst>
           </p:cNvPr>
@@ -7925,7 +8013,7 @@
           <p:cNvPr id="7" name="Slide Number Placeholder 6">
             <a:extLst>
               <a:ext uri="{FF2B5EF4-FFF2-40B4-BE49-F238E27FC236}">
-                <a16:creationId xmlns:a16="http://schemas.microsoft.com/office/drawing/2014/main" xmlns="" id="{8D5B0155-25C5-4F31-B914-54F60CD5DEBF}"/>
+                <a16:creationId xmlns="" xmlns:a16="http://schemas.microsoft.com/office/drawing/2014/main" id="{8D5B0155-25C5-4F31-B914-54F60CD5DEBF}"/>
               </a:ext>
             </a:extLst>
           </p:cNvPr>
@@ -7984,7 +8072,7 @@
           <p:cNvPr id="2" name="Title 1">
             <a:extLst>
               <a:ext uri="{FF2B5EF4-FFF2-40B4-BE49-F238E27FC236}">
-                <a16:creationId xmlns:a16="http://schemas.microsoft.com/office/drawing/2014/main" xmlns="" id="{2661A003-2765-44CA-9145-AB1528F4C2E9}"/>
+                <a16:creationId xmlns="" xmlns:a16="http://schemas.microsoft.com/office/drawing/2014/main" id="{2661A003-2765-44CA-9145-AB1528F4C2E9}"/>
               </a:ext>
             </a:extLst>
           </p:cNvPr>
@@ -8018,7 +8106,7 @@
           <p:cNvPr id="3" name="Text Placeholder 2">
             <a:extLst>
               <a:ext uri="{FF2B5EF4-FFF2-40B4-BE49-F238E27FC236}">
-                <a16:creationId xmlns:a16="http://schemas.microsoft.com/office/drawing/2014/main" xmlns="" id="{E9329458-CFA5-4FC5-83BF-8DEED1663F67}"/>
+                <a16:creationId xmlns="" xmlns:a16="http://schemas.microsoft.com/office/drawing/2014/main" id="{E9329458-CFA5-4FC5-83BF-8DEED1663F67}"/>
               </a:ext>
             </a:extLst>
           </p:cNvPr>
@@ -8089,7 +8177,7 @@
           <p:cNvPr id="4" name="Content Placeholder 3">
             <a:extLst>
               <a:ext uri="{FF2B5EF4-FFF2-40B4-BE49-F238E27FC236}">
-                <a16:creationId xmlns:a16="http://schemas.microsoft.com/office/drawing/2014/main" xmlns="" id="{00973E35-5790-4541-A9E9-6EAD8746298F}"/>
+                <a16:creationId xmlns="" xmlns:a16="http://schemas.microsoft.com/office/drawing/2014/main" id="{00973E35-5790-4541-A9E9-6EAD8746298F}"/>
               </a:ext>
             </a:extLst>
           </p:cNvPr>
@@ -8152,7 +8240,7 @@
           <p:cNvPr id="5" name="Text Placeholder 4">
             <a:extLst>
               <a:ext uri="{FF2B5EF4-FFF2-40B4-BE49-F238E27FC236}">
-                <a16:creationId xmlns:a16="http://schemas.microsoft.com/office/drawing/2014/main" xmlns="" id="{A79D0B04-D124-4DE1-8DDA-4298E11D9543}"/>
+                <a16:creationId xmlns="" xmlns:a16="http://schemas.microsoft.com/office/drawing/2014/main" id="{A79D0B04-D124-4DE1-8DDA-4298E11D9543}"/>
               </a:ext>
             </a:extLst>
           </p:cNvPr>
@@ -8223,7 +8311,7 @@
           <p:cNvPr id="6" name="Content Placeholder 5">
             <a:extLst>
               <a:ext uri="{FF2B5EF4-FFF2-40B4-BE49-F238E27FC236}">
-                <a16:creationId xmlns:a16="http://schemas.microsoft.com/office/drawing/2014/main" xmlns="" id="{B6A6F19A-1257-47E9-B4A0-44A2F7E94FF1}"/>
+                <a16:creationId xmlns="" xmlns:a16="http://schemas.microsoft.com/office/drawing/2014/main" id="{B6A6F19A-1257-47E9-B4A0-44A2F7E94FF1}"/>
               </a:ext>
             </a:extLst>
           </p:cNvPr>
@@ -8286,7 +8374,7 @@
           <p:cNvPr id="7" name="Date Placeholder 6">
             <a:extLst>
               <a:ext uri="{FF2B5EF4-FFF2-40B4-BE49-F238E27FC236}">
-                <a16:creationId xmlns:a16="http://schemas.microsoft.com/office/drawing/2014/main" xmlns="" id="{72AE3A17-5374-467D-86C2-C645B787C384}"/>
+                <a16:creationId xmlns="" xmlns:a16="http://schemas.microsoft.com/office/drawing/2014/main" id="{72AE3A17-5374-467D-86C2-C645B787C384}"/>
               </a:ext>
             </a:extLst>
           </p:cNvPr>
@@ -8304,7 +8392,7 @@
           <a:p>
             <a:fld id="{AEC09C50-853A-420B-8C26-7439C86401C0}" type="datetimeFigureOut">
               <a:rPr lang="en-GB" smtClean="0"/>
-              <a:t>2018-01-31</a:t>
+              <a:t>2018-02-01</a:t>
             </a:fld>
             <a:endParaRPr lang="en-GB"/>
           </a:p>
@@ -8315,7 +8403,7 @@
           <p:cNvPr id="8" name="Footer Placeholder 7">
             <a:extLst>
               <a:ext uri="{FF2B5EF4-FFF2-40B4-BE49-F238E27FC236}">
-                <a16:creationId xmlns:a16="http://schemas.microsoft.com/office/drawing/2014/main" xmlns="" id="{5283F0D5-8638-49FD-89DB-01F6EE922328}"/>
+                <a16:creationId xmlns="" xmlns:a16="http://schemas.microsoft.com/office/drawing/2014/main" id="{5283F0D5-8638-49FD-89DB-01F6EE922328}"/>
               </a:ext>
             </a:extLst>
           </p:cNvPr>
@@ -8340,7 +8428,7 @@
           <p:cNvPr id="9" name="Slide Number Placeholder 8">
             <a:extLst>
               <a:ext uri="{FF2B5EF4-FFF2-40B4-BE49-F238E27FC236}">
-                <a16:creationId xmlns:a16="http://schemas.microsoft.com/office/drawing/2014/main" xmlns="" id="{C0267428-4293-4A71-9B75-D565941979E2}"/>
+                <a16:creationId xmlns="" xmlns:a16="http://schemas.microsoft.com/office/drawing/2014/main" id="{C0267428-4293-4A71-9B75-D565941979E2}"/>
               </a:ext>
             </a:extLst>
           </p:cNvPr>
@@ -8399,7 +8487,7 @@
           <p:cNvPr id="2" name="Title 1">
             <a:extLst>
               <a:ext uri="{FF2B5EF4-FFF2-40B4-BE49-F238E27FC236}">
-                <a16:creationId xmlns:a16="http://schemas.microsoft.com/office/drawing/2014/main" xmlns="" id="{83526E88-76D3-4410-8E61-DDEF66B15330}"/>
+                <a16:creationId xmlns="" xmlns:a16="http://schemas.microsoft.com/office/drawing/2014/main" id="{83526E88-76D3-4410-8E61-DDEF66B15330}"/>
               </a:ext>
             </a:extLst>
           </p:cNvPr>
@@ -8428,7 +8516,7 @@
           <p:cNvPr id="3" name="Date Placeholder 2">
             <a:extLst>
               <a:ext uri="{FF2B5EF4-FFF2-40B4-BE49-F238E27FC236}">
-                <a16:creationId xmlns:a16="http://schemas.microsoft.com/office/drawing/2014/main" xmlns="" id="{EB4D1369-8B85-4E73-89D6-76C188B98E13}"/>
+                <a16:creationId xmlns="" xmlns:a16="http://schemas.microsoft.com/office/drawing/2014/main" id="{EB4D1369-8B85-4E73-89D6-76C188B98E13}"/>
               </a:ext>
             </a:extLst>
           </p:cNvPr>
@@ -8446,7 +8534,7 @@
           <a:p>
             <a:fld id="{AEC09C50-853A-420B-8C26-7439C86401C0}" type="datetimeFigureOut">
               <a:rPr lang="en-GB" smtClean="0"/>
-              <a:t>2018-01-31</a:t>
+              <a:t>2018-02-01</a:t>
             </a:fld>
             <a:endParaRPr lang="en-GB"/>
           </a:p>
@@ -8457,7 +8545,7 @@
           <p:cNvPr id="4" name="Footer Placeholder 3">
             <a:extLst>
               <a:ext uri="{FF2B5EF4-FFF2-40B4-BE49-F238E27FC236}">
-                <a16:creationId xmlns:a16="http://schemas.microsoft.com/office/drawing/2014/main" xmlns="" id="{489D4C4A-EE05-4344-A36C-6C671EE5E049}"/>
+                <a16:creationId xmlns="" xmlns:a16="http://schemas.microsoft.com/office/drawing/2014/main" id="{489D4C4A-EE05-4344-A36C-6C671EE5E049}"/>
               </a:ext>
             </a:extLst>
           </p:cNvPr>
@@ -8482,7 +8570,7 @@
           <p:cNvPr id="5" name="Slide Number Placeholder 4">
             <a:extLst>
               <a:ext uri="{FF2B5EF4-FFF2-40B4-BE49-F238E27FC236}">
-                <a16:creationId xmlns:a16="http://schemas.microsoft.com/office/drawing/2014/main" xmlns="" id="{DD1109B2-CB6D-4218-9B3E-14BAEEE90F3E}"/>
+                <a16:creationId xmlns="" xmlns:a16="http://schemas.microsoft.com/office/drawing/2014/main" id="{DD1109B2-CB6D-4218-9B3E-14BAEEE90F3E}"/>
               </a:ext>
             </a:extLst>
           </p:cNvPr>
@@ -8541,7 +8629,7 @@
           <p:cNvPr id="2" name="Date Placeholder 1">
             <a:extLst>
               <a:ext uri="{FF2B5EF4-FFF2-40B4-BE49-F238E27FC236}">
-                <a16:creationId xmlns:a16="http://schemas.microsoft.com/office/drawing/2014/main" xmlns="" id="{F2235B87-6899-48A6-999A-BC97C2BBB929}"/>
+                <a16:creationId xmlns="" xmlns:a16="http://schemas.microsoft.com/office/drawing/2014/main" id="{F2235B87-6899-48A6-999A-BC97C2BBB929}"/>
               </a:ext>
             </a:extLst>
           </p:cNvPr>
@@ -8559,7 +8647,7 @@
           <a:p>
             <a:fld id="{AEC09C50-853A-420B-8C26-7439C86401C0}" type="datetimeFigureOut">
               <a:rPr lang="en-GB" smtClean="0"/>
-              <a:t>2018-01-31</a:t>
+              <a:t>2018-02-01</a:t>
             </a:fld>
             <a:endParaRPr lang="en-GB"/>
           </a:p>
@@ -8570,7 +8658,7 @@
           <p:cNvPr id="3" name="Footer Placeholder 2">
             <a:extLst>
               <a:ext uri="{FF2B5EF4-FFF2-40B4-BE49-F238E27FC236}">
-                <a16:creationId xmlns:a16="http://schemas.microsoft.com/office/drawing/2014/main" xmlns="" id="{C8769E30-B6BB-4F0A-B22F-C95BF219412D}"/>
+                <a16:creationId xmlns="" xmlns:a16="http://schemas.microsoft.com/office/drawing/2014/main" id="{C8769E30-B6BB-4F0A-B22F-C95BF219412D}"/>
               </a:ext>
             </a:extLst>
           </p:cNvPr>
@@ -8595,7 +8683,7 @@
           <p:cNvPr id="4" name="Slide Number Placeholder 3">
             <a:extLst>
               <a:ext uri="{FF2B5EF4-FFF2-40B4-BE49-F238E27FC236}">
-                <a16:creationId xmlns:a16="http://schemas.microsoft.com/office/drawing/2014/main" xmlns="" id="{BC7650B4-2968-4449-A4B1-2C77F10005BB}"/>
+                <a16:creationId xmlns="" xmlns:a16="http://schemas.microsoft.com/office/drawing/2014/main" id="{BC7650B4-2968-4449-A4B1-2C77F10005BB}"/>
               </a:ext>
             </a:extLst>
           </p:cNvPr>
@@ -8654,7 +8742,7 @@
           <p:cNvPr id="2" name="Title 1">
             <a:extLst>
               <a:ext uri="{FF2B5EF4-FFF2-40B4-BE49-F238E27FC236}">
-                <a16:creationId xmlns:a16="http://schemas.microsoft.com/office/drawing/2014/main" xmlns="" id="{8E1ECCE6-D223-4A9C-AE1D-E9A2DFF0FC8E}"/>
+                <a16:creationId xmlns="" xmlns:a16="http://schemas.microsoft.com/office/drawing/2014/main" id="{8E1ECCE6-D223-4A9C-AE1D-E9A2DFF0FC8E}"/>
               </a:ext>
             </a:extLst>
           </p:cNvPr>
@@ -8692,7 +8780,7 @@
           <p:cNvPr id="3" name="Content Placeholder 2">
             <a:extLst>
               <a:ext uri="{FF2B5EF4-FFF2-40B4-BE49-F238E27FC236}">
-                <a16:creationId xmlns:a16="http://schemas.microsoft.com/office/drawing/2014/main" xmlns="" id="{B82EC1F7-6D9E-4A6E-83FA-3A28DA42147B}"/>
+                <a16:creationId xmlns="" xmlns:a16="http://schemas.microsoft.com/office/drawing/2014/main" id="{B82EC1F7-6D9E-4A6E-83FA-3A28DA42147B}"/>
               </a:ext>
             </a:extLst>
           </p:cNvPr>
@@ -8783,7 +8871,7 @@
           <p:cNvPr id="4" name="Text Placeholder 3">
             <a:extLst>
               <a:ext uri="{FF2B5EF4-FFF2-40B4-BE49-F238E27FC236}">
-                <a16:creationId xmlns:a16="http://schemas.microsoft.com/office/drawing/2014/main" xmlns="" id="{AF898F10-245A-48D3-9CBC-6CC749D412AA}"/>
+                <a16:creationId xmlns="" xmlns:a16="http://schemas.microsoft.com/office/drawing/2014/main" id="{AF898F10-245A-48D3-9CBC-6CC749D412AA}"/>
               </a:ext>
             </a:extLst>
           </p:cNvPr>
@@ -8854,7 +8942,7 @@
           <p:cNvPr id="5" name="Date Placeholder 4">
             <a:extLst>
               <a:ext uri="{FF2B5EF4-FFF2-40B4-BE49-F238E27FC236}">
-                <a16:creationId xmlns:a16="http://schemas.microsoft.com/office/drawing/2014/main" xmlns="" id="{32036AB4-92DA-44C3-87E4-1649313632B1}"/>
+                <a16:creationId xmlns="" xmlns:a16="http://schemas.microsoft.com/office/drawing/2014/main" id="{32036AB4-92DA-44C3-87E4-1649313632B1}"/>
               </a:ext>
             </a:extLst>
           </p:cNvPr>
@@ -8872,7 +8960,7 @@
           <a:p>
             <a:fld id="{AEC09C50-853A-420B-8C26-7439C86401C0}" type="datetimeFigureOut">
               <a:rPr lang="en-GB" smtClean="0"/>
-              <a:t>2018-01-31</a:t>
+              <a:t>2018-02-01</a:t>
             </a:fld>
             <a:endParaRPr lang="en-GB"/>
           </a:p>
@@ -8883,7 +8971,7 @@
           <p:cNvPr id="6" name="Footer Placeholder 5">
             <a:extLst>
               <a:ext uri="{FF2B5EF4-FFF2-40B4-BE49-F238E27FC236}">
-                <a16:creationId xmlns:a16="http://schemas.microsoft.com/office/drawing/2014/main" xmlns="" id="{1337DAE8-487C-4D6E-803D-F8F4FA67CA44}"/>
+                <a16:creationId xmlns="" xmlns:a16="http://schemas.microsoft.com/office/drawing/2014/main" id="{1337DAE8-487C-4D6E-803D-F8F4FA67CA44}"/>
               </a:ext>
             </a:extLst>
           </p:cNvPr>
@@ -8908,7 +8996,7 @@
           <p:cNvPr id="7" name="Slide Number Placeholder 6">
             <a:extLst>
               <a:ext uri="{FF2B5EF4-FFF2-40B4-BE49-F238E27FC236}">
-                <a16:creationId xmlns:a16="http://schemas.microsoft.com/office/drawing/2014/main" xmlns="" id="{CC449275-2FF4-4C64-ABAB-142D3BF60EAE}"/>
+                <a16:creationId xmlns="" xmlns:a16="http://schemas.microsoft.com/office/drawing/2014/main" id="{CC449275-2FF4-4C64-ABAB-142D3BF60EAE}"/>
               </a:ext>
             </a:extLst>
           </p:cNvPr>
@@ -8967,7 +9055,7 @@
           <p:cNvPr id="2" name="Title 1">
             <a:extLst>
               <a:ext uri="{FF2B5EF4-FFF2-40B4-BE49-F238E27FC236}">
-                <a16:creationId xmlns:a16="http://schemas.microsoft.com/office/drawing/2014/main" xmlns="" id="{D071AB62-177C-4054-8052-BBE8490E7381}"/>
+                <a16:creationId xmlns="" xmlns:a16="http://schemas.microsoft.com/office/drawing/2014/main" id="{D071AB62-177C-4054-8052-BBE8490E7381}"/>
               </a:ext>
             </a:extLst>
           </p:cNvPr>
@@ -9005,7 +9093,7 @@
           <p:cNvPr id="3" name="Picture Placeholder 2">
             <a:extLst>
               <a:ext uri="{FF2B5EF4-FFF2-40B4-BE49-F238E27FC236}">
-                <a16:creationId xmlns:a16="http://schemas.microsoft.com/office/drawing/2014/main" xmlns="" id="{A0D50678-0335-4865-AE73-1BCBF41E616A}"/>
+                <a16:creationId xmlns="" xmlns:a16="http://schemas.microsoft.com/office/drawing/2014/main" id="{A0D50678-0335-4865-AE73-1BCBF41E616A}"/>
               </a:ext>
             </a:extLst>
           </p:cNvPr>
@@ -9072,7 +9160,7 @@
           <p:cNvPr id="4" name="Text Placeholder 3">
             <a:extLst>
               <a:ext uri="{FF2B5EF4-FFF2-40B4-BE49-F238E27FC236}">
-                <a16:creationId xmlns:a16="http://schemas.microsoft.com/office/drawing/2014/main" xmlns="" id="{73ED4DA1-0F6A-4A5D-B369-9469EF35B96D}"/>
+                <a16:creationId xmlns="" xmlns:a16="http://schemas.microsoft.com/office/drawing/2014/main" id="{73ED4DA1-0F6A-4A5D-B369-9469EF35B96D}"/>
               </a:ext>
             </a:extLst>
           </p:cNvPr>
@@ -9143,7 +9231,7 @@
           <p:cNvPr id="5" name="Date Placeholder 4">
             <a:extLst>
               <a:ext uri="{FF2B5EF4-FFF2-40B4-BE49-F238E27FC236}">
-                <a16:creationId xmlns:a16="http://schemas.microsoft.com/office/drawing/2014/main" xmlns="" id="{092FC3AE-ADA3-4288-A99B-E5F02A2E42C8}"/>
+                <a16:creationId xmlns="" xmlns:a16="http://schemas.microsoft.com/office/drawing/2014/main" id="{092FC3AE-ADA3-4288-A99B-E5F02A2E42C8}"/>
               </a:ext>
             </a:extLst>
           </p:cNvPr>
@@ -9161,7 +9249,7 @@
           <a:p>
             <a:fld id="{AEC09C50-853A-420B-8C26-7439C86401C0}" type="datetimeFigureOut">
               <a:rPr lang="en-GB" smtClean="0"/>
-              <a:t>2018-01-31</a:t>
+              <a:t>2018-02-01</a:t>
             </a:fld>
             <a:endParaRPr lang="en-GB"/>
           </a:p>
@@ -9172,7 +9260,7 @@
           <p:cNvPr id="6" name="Footer Placeholder 5">
             <a:extLst>
               <a:ext uri="{FF2B5EF4-FFF2-40B4-BE49-F238E27FC236}">
-                <a16:creationId xmlns:a16="http://schemas.microsoft.com/office/drawing/2014/main" xmlns="" id="{2893494B-FAB4-440E-AAEB-FFBDB092E663}"/>
+                <a16:creationId xmlns="" xmlns:a16="http://schemas.microsoft.com/office/drawing/2014/main" id="{2893494B-FAB4-440E-AAEB-FFBDB092E663}"/>
               </a:ext>
             </a:extLst>
           </p:cNvPr>
@@ -9197,7 +9285,7 @@
           <p:cNvPr id="7" name="Slide Number Placeholder 6">
             <a:extLst>
               <a:ext uri="{FF2B5EF4-FFF2-40B4-BE49-F238E27FC236}">
-                <a16:creationId xmlns:a16="http://schemas.microsoft.com/office/drawing/2014/main" xmlns="" id="{073F7F22-A5C8-498A-800E-37E463DFAE16}"/>
+                <a16:creationId xmlns="" xmlns:a16="http://schemas.microsoft.com/office/drawing/2014/main" id="{073F7F22-A5C8-498A-800E-37E463DFAE16}"/>
               </a:ext>
             </a:extLst>
           </p:cNvPr>
@@ -9261,7 +9349,7 @@
           <p:cNvPr id="2" name="Title Placeholder 1">
             <a:extLst>
               <a:ext uri="{FF2B5EF4-FFF2-40B4-BE49-F238E27FC236}">
-                <a16:creationId xmlns:a16="http://schemas.microsoft.com/office/drawing/2014/main" xmlns="" id="{F0BB2809-085E-4223-9992-2BB5FBC08E6E}"/>
+                <a16:creationId xmlns="" xmlns:a16="http://schemas.microsoft.com/office/drawing/2014/main" id="{F0BB2809-085E-4223-9992-2BB5FBC08E6E}"/>
               </a:ext>
             </a:extLst>
           </p:cNvPr>
@@ -9300,7 +9388,7 @@
           <p:cNvPr id="3" name="Text Placeholder 2">
             <a:extLst>
               <a:ext uri="{FF2B5EF4-FFF2-40B4-BE49-F238E27FC236}">
-                <a16:creationId xmlns:a16="http://schemas.microsoft.com/office/drawing/2014/main" xmlns="" id="{FEC23C1B-CC61-40EA-905D-95DABCC0D1B8}"/>
+                <a16:creationId xmlns="" xmlns:a16="http://schemas.microsoft.com/office/drawing/2014/main" id="{FEC23C1B-CC61-40EA-905D-95DABCC0D1B8}"/>
               </a:ext>
             </a:extLst>
           </p:cNvPr>
@@ -9368,7 +9456,7 @@
           <p:cNvPr id="4" name="Date Placeholder 3">
             <a:extLst>
               <a:ext uri="{FF2B5EF4-FFF2-40B4-BE49-F238E27FC236}">
-                <a16:creationId xmlns:a16="http://schemas.microsoft.com/office/drawing/2014/main" xmlns="" id="{129CB7B1-CB51-4ACA-B179-C824284E8378}"/>
+                <a16:creationId xmlns="" xmlns:a16="http://schemas.microsoft.com/office/drawing/2014/main" id="{129CB7B1-CB51-4ACA-B179-C824284E8378}"/>
               </a:ext>
             </a:extLst>
           </p:cNvPr>
@@ -9404,7 +9492,7 @@
           <a:p>
             <a:fld id="{AEC09C50-853A-420B-8C26-7439C86401C0}" type="datetimeFigureOut">
               <a:rPr lang="en-GB" smtClean="0"/>
-              <a:t>2018-01-31</a:t>
+              <a:t>2018-02-01</a:t>
             </a:fld>
             <a:endParaRPr lang="en-GB"/>
           </a:p>
@@ -9415,7 +9503,7 @@
           <p:cNvPr id="5" name="Footer Placeholder 4">
             <a:extLst>
               <a:ext uri="{FF2B5EF4-FFF2-40B4-BE49-F238E27FC236}">
-                <a16:creationId xmlns:a16="http://schemas.microsoft.com/office/drawing/2014/main" xmlns="" id="{06C0286E-4114-4920-A399-1E3F7F913343}"/>
+                <a16:creationId xmlns="" xmlns:a16="http://schemas.microsoft.com/office/drawing/2014/main" id="{06C0286E-4114-4920-A399-1E3F7F913343}"/>
               </a:ext>
             </a:extLst>
           </p:cNvPr>
@@ -9458,7 +9546,7 @@
           <p:cNvPr id="6" name="Slide Number Placeholder 5">
             <a:extLst>
               <a:ext uri="{FF2B5EF4-FFF2-40B4-BE49-F238E27FC236}">
-                <a16:creationId xmlns:a16="http://schemas.microsoft.com/office/drawing/2014/main" xmlns="" id="{496FAA64-61A7-4E2F-B9B4-DB069A6171DB}"/>
+                <a16:creationId xmlns="" xmlns:a16="http://schemas.microsoft.com/office/drawing/2014/main" id="{496FAA64-61A7-4E2F-B9B4-DB069A6171DB}"/>
               </a:ext>
             </a:extLst>
           </p:cNvPr>
@@ -9956,7 +10044,7 @@
           <a:p>
             <a:fld id="{BB2556DB-1519-40E4-AF1C-F909855EDD97}" type="datetimeFigureOut">
               <a:rPr lang="en-GB" smtClean="0"/>
-              <a:t>2018-01-31</a:t>
+              <a:t>2018-02-01</a:t>
             </a:fld>
             <a:endParaRPr lang="en-GB"/>
           </a:p>
@@ -10495,7 +10583,7 @@
             <a:hlinkClick r:id="rId3"/>
             <a:extLst>
               <a:ext uri="{FF2B5EF4-FFF2-40B4-BE49-F238E27FC236}">
-                <a16:creationId xmlns:a16="http://schemas.microsoft.com/office/drawing/2014/main" xmlns="" id="{6F77B270-35F1-4A5B-875A-9BFD13BC898E}"/>
+                <a16:creationId xmlns="" xmlns:a16="http://schemas.microsoft.com/office/drawing/2014/main" id="{6F77B270-35F1-4A5B-875A-9BFD13BC898E}"/>
               </a:ext>
             </a:extLst>
           </p:cNvPr>
@@ -11280,7 +11368,7 @@
             <a:hlinkClick r:id="rId3"/>
             <a:extLst>
               <a:ext uri="{FF2B5EF4-FFF2-40B4-BE49-F238E27FC236}">
-                <a16:creationId xmlns:a16="http://schemas.microsoft.com/office/drawing/2014/main" xmlns="" id="{6F77B270-35F1-4A5B-875A-9BFD13BC898E}"/>
+                <a16:creationId xmlns="" xmlns:a16="http://schemas.microsoft.com/office/drawing/2014/main" id="{6F77B270-35F1-4A5B-875A-9BFD13BC898E}"/>
               </a:ext>
             </a:extLst>
           </p:cNvPr>
@@ -13672,7 +13760,7 @@
             <a:hlinkClick r:id="rId3"/>
             <a:extLst>
               <a:ext uri="{FF2B5EF4-FFF2-40B4-BE49-F238E27FC236}">
-                <a16:creationId xmlns:a16="http://schemas.microsoft.com/office/drawing/2014/main" xmlns="" id="{6F77B270-35F1-4A5B-875A-9BFD13BC898E}"/>
+                <a16:creationId xmlns="" xmlns:a16="http://schemas.microsoft.com/office/drawing/2014/main" id="{6F77B270-35F1-4A5B-875A-9BFD13BC898E}"/>
               </a:ext>
             </a:extLst>
           </p:cNvPr>
@@ -13770,15 +13858,7 @@
             </a:r>
             <a:r>
               <a:rPr lang="en-GB" sz="2400" dirty="0" smtClean="0"/>
-              <a:t>acts </a:t>
-            </a:r>
-            <a:r>
-              <a:rPr lang="en-GB" sz="2400" dirty="0" smtClean="0"/>
-              <a:t>as </a:t>
-            </a:r>
-            <a:r>
-              <a:rPr lang="en-GB" sz="2400" dirty="0" smtClean="0"/>
-              <a:t>the </a:t>
+              <a:t>acts as the </a:t>
             </a:r>
             <a:r>
               <a:rPr lang="en-GB" sz="2400" b="1" dirty="0" smtClean="0"/>
@@ -14055,11 +14135,7 @@
             </a:r>
             <a:r>
               <a:rPr lang="en-GB" sz="2400" b="1" dirty="0" smtClean="0"/>
-              <a:t>Consensus </a:t>
-            </a:r>
-            <a:r>
-              <a:rPr lang="en-GB" sz="2400" b="1" dirty="0" smtClean="0"/>
-              <a:t>Sequence</a:t>
+              <a:t>Consensus Sequence</a:t>
             </a:r>
             <a:r>
               <a:rPr lang="en-GB" sz="2400" dirty="0" smtClean="0"/>
@@ -14067,7 +14143,11 @@
             </a:r>
             <a:r>
               <a:rPr lang="en-GB" sz="2400" dirty="0" smtClean="0"/>
-              <a:t>can be stored with all the “</a:t>
+              <a:t>could </a:t>
+            </a:r>
+            <a:r>
+              <a:rPr lang="en-GB" sz="2400" dirty="0" smtClean="0"/>
+              <a:t>be stored with all the “</a:t>
             </a:r>
             <a:r>
               <a:rPr lang="en-GB" sz="2400" b="1" dirty="0" smtClean="0"/>
@@ -14077,7 +14157,6 @@
               <a:rPr lang="en-GB" sz="2400" dirty="0" smtClean="0"/>
               <a:t>”s in place</a:t>
             </a:r>
-            <a:endParaRPr lang="en-GB" sz="2400" dirty="0" smtClean="0"/>
           </a:p>
         </p:txBody>
       </p:sp>
@@ -14110,12 +14189,20 @@
           <a:p>
             <a:pPr algn="just"/>
             <a:r>
-              <a:rPr lang="en-GB" sz="2400" dirty="0"/>
-              <a:t>M</a:t>
-            </a:r>
-            <a:r>
               <a:rPr lang="en-GB" sz="2400" dirty="0" smtClean="0"/>
-              <a:t>ore commonly, the </a:t>
+              <a:t>In a </a:t>
+            </a:r>
+            <a:r>
+              <a:rPr lang="en-GB" sz="2400" b="1" dirty="0" smtClean="0"/>
+              <a:t>SAM</a:t>
+            </a:r>
+            <a:r>
+              <a:rPr lang="en-GB" sz="2400" dirty="0" smtClean="0"/>
+              <a:t>, </a:t>
+            </a:r>
+            <a:r>
+              <a:rPr lang="en-GB" sz="2400" dirty="0" smtClean="0"/>
+              <a:t>the </a:t>
             </a:r>
             <a:r>
               <a:rPr lang="en-GB" sz="2400" b="1" dirty="0" smtClean="0"/>
@@ -14139,15 +14226,7 @@
             </a:r>
             <a:r>
               <a:rPr lang="en-GB" sz="2400" dirty="0" smtClean="0"/>
-              <a:t>”s removed) is </a:t>
-            </a:r>
-            <a:r>
-              <a:rPr lang="en-GB" sz="2400" dirty="0" smtClean="0"/>
-              <a:t>stored </a:t>
-            </a:r>
-            <a:r>
-              <a:rPr lang="en-GB" sz="2400" dirty="0" smtClean="0"/>
-              <a:t>with a </a:t>
+              <a:t>”s removed) is stored with a </a:t>
             </a:r>
             <a:r>
               <a:rPr lang="en-GB" sz="2400" b="1" dirty="0" smtClean="0"/>
@@ -14181,7 +14260,6 @@
               <a:rPr lang="en-GB" sz="2400" dirty="0" smtClean="0"/>
               <a:t>)</a:t>
             </a:r>
-            <a:endParaRPr lang="en-GB" sz="2400" dirty="0" smtClean="0"/>
           </a:p>
         </p:txBody>
       </p:sp>
@@ -14223,23 +14301,23 @@
             </a:r>
             <a:r>
               <a:rPr lang="en-GB" sz="2400" dirty="0" smtClean="0"/>
-              <a:t>can be reconstructed from the </a:t>
+              <a:t>can be </a:t>
+            </a:r>
+            <a:r>
+              <a:rPr lang="en-GB" sz="2400" dirty="0" smtClean="0"/>
+              <a:t>simply computed </a:t>
+            </a:r>
+            <a:r>
+              <a:rPr lang="en-GB" sz="2400" dirty="0" smtClean="0"/>
+              <a:t>from the </a:t>
             </a:r>
             <a:r>
               <a:rPr lang="en-GB" sz="2400" b="1" dirty="0" smtClean="0"/>
-              <a:t>Unp</a:t>
-            </a:r>
-            <a:r>
-              <a:rPr lang="en-GB" sz="2400" b="1" dirty="0" smtClean="0"/>
-              <a:t>added Consensus </a:t>
+              <a:t>Unpadded Consensus </a:t>
             </a:r>
             <a:r>
               <a:rPr lang="en-GB" sz="2400" dirty="0" smtClean="0"/>
-              <a:t>plus</a:t>
-            </a:r>
-            <a:r>
-              <a:rPr lang="en-GB" sz="2400" dirty="0" smtClean="0"/>
-              <a:t> </a:t>
+              <a:t>plus </a:t>
             </a:r>
             <a:r>
               <a:rPr lang="en-GB" sz="2400" b="1" dirty="0" smtClean="0"/>
@@ -15084,19 +15162,11 @@
             </a:r>
             <a:r>
               <a:rPr lang="en-GB" sz="2400" b="1" dirty="0" smtClean="0"/>
-              <a:t>Consensus </a:t>
-            </a:r>
-            <a:r>
-              <a:rPr lang="en-GB" sz="2400" b="1" dirty="0" smtClean="0"/>
-              <a:t>Sequence</a:t>
+              <a:t>Consensus Sequence</a:t>
             </a:r>
             <a:r>
               <a:rPr lang="en-GB" sz="2400" dirty="0" smtClean="0"/>
-              <a:t> </a:t>
-            </a:r>
-            <a:r>
-              <a:rPr lang="en-GB" sz="2400" dirty="0" smtClean="0"/>
-              <a:t>is </a:t>
+              <a:t> is </a:t>
             </a:r>
             <a:r>
               <a:rPr lang="en-GB" sz="2400" b="1" dirty="0" smtClean="0"/>
@@ -15104,11 +15174,7 @@
             </a:r>
             <a:r>
               <a:rPr lang="en-GB" sz="2400" dirty="0" smtClean="0"/>
-              <a:t>” (i.e. </a:t>
-            </a:r>
-            <a:r>
-              <a:rPr lang="en-GB" sz="2400" dirty="0" smtClean="0"/>
-              <a:t>represented with </a:t>
+              <a:t>” (i.e. represented with </a:t>
             </a:r>
             <a:r>
               <a:rPr lang="en-GB" sz="2400" b="1" dirty="0" smtClean="0"/>
@@ -16202,7 +16268,7 @@
             <a:hlinkClick r:id="rId3"/>
             <a:extLst>
               <a:ext uri="{FF2B5EF4-FFF2-40B4-BE49-F238E27FC236}">
-                <a16:creationId xmlns:a16="http://schemas.microsoft.com/office/drawing/2014/main" xmlns="" id="{6F77B270-35F1-4A5B-875A-9BFD13BC898E}"/>
+                <a16:creationId xmlns="" xmlns:a16="http://schemas.microsoft.com/office/drawing/2014/main" id="{6F77B270-35F1-4A5B-875A-9BFD13BC898E}"/>
               </a:ext>
             </a:extLst>
           </p:cNvPr>
@@ -16288,7 +16354,11 @@
             </a:r>
             <a:r>
               <a:rPr lang="en-GB" sz="2400" dirty="0" smtClean="0"/>
-              <a:t>either form of </a:t>
+              <a:t>any form </a:t>
+            </a:r>
+            <a:r>
+              <a:rPr lang="en-GB" sz="2400" dirty="0" smtClean="0"/>
+              <a:t>of </a:t>
             </a:r>
             <a:r>
               <a:rPr lang="en-GB" sz="2400" b="1" i="1" dirty="0" smtClean="0"/>
@@ -16300,11 +16370,7 @@
             </a:r>
             <a:r>
               <a:rPr lang="en-GB" sz="2400" b="1" dirty="0" smtClean="0"/>
-              <a:t>Consensus </a:t>
-            </a:r>
-            <a:r>
-              <a:rPr lang="en-GB" sz="2400" b="1" dirty="0" smtClean="0"/>
-              <a:t>Sequence </a:t>
+              <a:t>Consensus Sequence </a:t>
             </a:r>
             <a:r>
               <a:rPr lang="en-GB" sz="2400" dirty="0" smtClean="0"/>
@@ -16330,7 +16396,7 @@
         </p:nvSpPr>
         <p:spPr>
           <a:xfrm>
-            <a:off x="10799864" y="2749171"/>
+            <a:off x="10146739" y="2749171"/>
             <a:ext cx="1263487" cy="523220"/>
           </a:xfrm>
           <a:prstGeom prst="rect">
@@ -16365,7 +16431,7 @@
         </p:nvSpPr>
         <p:spPr>
           <a:xfrm>
-            <a:off x="8231986" y="1279500"/>
+            <a:off x="7175111" y="1279500"/>
             <a:ext cx="2363190" cy="461665"/>
           </a:xfrm>
           <a:prstGeom prst="rect">
@@ -16412,7 +16478,7 @@
         </p:nvSpPr>
         <p:spPr>
           <a:xfrm>
-            <a:off x="8231986" y="1796447"/>
+            <a:off x="7175111" y="1796447"/>
             <a:ext cx="2363190" cy="461665"/>
           </a:xfrm>
           <a:prstGeom prst="rect">
@@ -16459,7 +16525,7 @@
         </p:nvSpPr>
         <p:spPr>
           <a:xfrm>
-            <a:off x="8231986" y="2313394"/>
+            <a:off x="7175111" y="2313394"/>
             <a:ext cx="2363190" cy="461665"/>
           </a:xfrm>
           <a:prstGeom prst="rect">
@@ -16506,7 +16572,7 @@
         </p:nvSpPr>
         <p:spPr>
           <a:xfrm>
-            <a:off x="8231986" y="2830341"/>
+            <a:off x="7175111" y="2830341"/>
             <a:ext cx="2363190" cy="461665"/>
           </a:xfrm>
           <a:prstGeom prst="rect">
@@ -17718,15 +17784,7 @@
             </a:r>
             <a:r>
               <a:rPr lang="en-GB" sz="2400" dirty="0" smtClean="0"/>
-              <a:t> when a </a:t>
-            </a:r>
-            <a:r>
-              <a:rPr lang="en-GB" sz="2400" b="1" dirty="0" smtClean="0"/>
-              <a:t>CIGAR</a:t>
-            </a:r>
-            <a:r>
-              <a:rPr lang="en-GB" sz="2400" dirty="0" smtClean="0"/>
-              <a:t> is used)</a:t>
+              <a:t>)</a:t>
             </a:r>
             <a:endParaRPr lang="en-GB" sz="2400" b="1" dirty="0"/>
           </a:p>
@@ -17740,7 +17798,7 @@
         </p:nvSpPr>
         <p:spPr>
           <a:xfrm>
-            <a:off x="8231986" y="3347288"/>
+            <a:off x="7175111" y="3347288"/>
             <a:ext cx="2363190" cy="461665"/>
           </a:xfrm>
           <a:prstGeom prst="rect">
@@ -17787,7 +17845,7 @@
         </p:nvSpPr>
         <p:spPr>
           <a:xfrm>
-            <a:off x="8231986" y="3864233"/>
+            <a:off x="7175111" y="3864233"/>
             <a:ext cx="2363190" cy="461665"/>
           </a:xfrm>
           <a:prstGeom prst="rect">
@@ -17834,7 +17892,7 @@
         </p:nvSpPr>
         <p:spPr>
           <a:xfrm>
-            <a:off x="8231986" y="4397496"/>
+            <a:off x="7175111" y="4397496"/>
             <a:ext cx="2363190" cy="461665"/>
           </a:xfrm>
           <a:prstGeom prst="rect">
@@ -18728,7 +18786,7 @@
             <a:hlinkClick r:id="rId3"/>
             <a:extLst>
               <a:ext uri="{FF2B5EF4-FFF2-40B4-BE49-F238E27FC236}">
-                <a16:creationId xmlns:a16="http://schemas.microsoft.com/office/drawing/2014/main" xmlns="" id="{6F77B270-35F1-4A5B-875A-9BFD13BC898E}"/>
+                <a16:creationId xmlns="" xmlns:a16="http://schemas.microsoft.com/office/drawing/2014/main" id="{6F77B270-35F1-4A5B-875A-9BFD13BC898E}"/>
               </a:ext>
             </a:extLst>
           </p:cNvPr>
@@ -18780,6 +18838,1896 @@
           </a:p>
         </p:txBody>
       </p:sp>
+      <p:sp>
+        <p:nvSpPr>
+          <p:cNvPr id="3" name="TextBox 2"/>
+          <p:cNvSpPr txBox="1"/>
+          <p:nvPr/>
+        </p:nvSpPr>
+        <p:spPr>
+          <a:xfrm>
+            <a:off x="137515" y="703943"/>
+            <a:ext cx="11773436" cy="461665"/>
+          </a:xfrm>
+          <a:prstGeom prst="rect">
+            <a:avLst/>
+          </a:prstGeom>
+          <a:solidFill>
+            <a:schemeClr val="accent2">
+              <a:lumMod val="40000"/>
+              <a:lumOff val="60000"/>
+            </a:schemeClr>
+          </a:solidFill>
+        </p:spPr>
+        <p:txBody>
+          <a:bodyPr wrap="square" rtlCol="0">
+            <a:spAutoFit/>
+          </a:bodyPr>
+          <a:lstStyle/>
+          <a:p>
+            <a:pPr algn="just"/>
+            <a:r>
+              <a:rPr lang="en-GB" sz="2400" dirty="0" smtClean="0"/>
+              <a:t>Where </a:t>
+            </a:r>
+            <a:r>
+              <a:rPr lang="en-GB" sz="2400" dirty="0" smtClean="0"/>
+              <a:t>any form </a:t>
+            </a:r>
+            <a:r>
+              <a:rPr lang="en-GB" sz="2400" dirty="0" smtClean="0"/>
+              <a:t>of </a:t>
+            </a:r>
+            <a:r>
+              <a:rPr lang="en-GB" sz="2400" b="1" i="1" dirty="0" smtClean="0"/>
+              <a:t>Padded</a:t>
+            </a:r>
+            <a:r>
+              <a:rPr lang="en-GB" sz="2400" i="1" dirty="0" smtClean="0"/>
+              <a:t> </a:t>
+            </a:r>
+            <a:r>
+              <a:rPr lang="en-GB" sz="2400" b="1" dirty="0" smtClean="0"/>
+              <a:t>Consensus Sequence </a:t>
+            </a:r>
+            <a:r>
+              <a:rPr lang="en-GB" sz="2400" dirty="0" smtClean="0"/>
+              <a:t>is used, no extra </a:t>
+            </a:r>
+            <a:r>
+              <a:rPr lang="en-GB" sz="2400" b="1" dirty="0" smtClean="0"/>
+              <a:t>CIGAR</a:t>
+            </a:r>
+            <a:r>
+              <a:rPr lang="en-GB" sz="2400" dirty="0" smtClean="0"/>
+              <a:t> code is needed</a:t>
+            </a:r>
+            <a:endParaRPr lang="en-GB" sz="2400" b="1" dirty="0"/>
+          </a:p>
+        </p:txBody>
+      </p:sp>
+      <p:sp>
+        <p:nvSpPr>
+          <p:cNvPr id="4" name="TextBox 3"/>
+          <p:cNvSpPr txBox="1"/>
+          <p:nvPr/>
+        </p:nvSpPr>
+        <p:spPr>
+          <a:xfrm>
+            <a:off x="7581266" y="4377732"/>
+            <a:ext cx="985976" cy="707886"/>
+          </a:xfrm>
+          <a:prstGeom prst="rect">
+            <a:avLst/>
+          </a:prstGeom>
+          <a:solidFill>
+            <a:schemeClr val="accent3">
+              <a:lumMod val="20000"/>
+              <a:lumOff val="80000"/>
+            </a:schemeClr>
+          </a:solidFill>
+        </p:spPr>
+        <p:txBody>
+          <a:bodyPr wrap="none" rtlCol="0">
+            <a:spAutoFit/>
+          </a:bodyPr>
+          <a:lstStyle/>
+          <a:p>
+            <a:r>
+              <a:rPr lang="en-GB" sz="2000" b="1" dirty="0" smtClean="0"/>
+              <a:t>Padded</a:t>
+            </a:r>
+          </a:p>
+          <a:p>
+            <a:r>
+              <a:rPr lang="en-GB" sz="2000" b="1" dirty="0" smtClean="0"/>
+              <a:t>CIGARs</a:t>
+            </a:r>
+            <a:endParaRPr lang="en-GB" sz="2000" b="1" dirty="0"/>
+          </a:p>
+        </p:txBody>
+      </p:sp>
+      <p:sp>
+        <p:nvSpPr>
+          <p:cNvPr id="5" name="TextBox 4"/>
+          <p:cNvSpPr txBox="1"/>
+          <p:nvPr/>
+        </p:nvSpPr>
+        <p:spPr>
+          <a:xfrm>
+            <a:off x="7175111" y="1279500"/>
+            <a:ext cx="2075796" cy="461665"/>
+          </a:xfrm>
+          <a:prstGeom prst="rect">
+            <a:avLst/>
+          </a:prstGeom>
+          <a:solidFill>
+            <a:schemeClr val="accent3">
+              <a:lumMod val="40000"/>
+              <a:lumOff val="60000"/>
+            </a:schemeClr>
+          </a:solidFill>
+        </p:spPr>
+        <p:txBody>
+          <a:bodyPr wrap="square" rtlCol="0">
+            <a:spAutoFit/>
+          </a:bodyPr>
+          <a:lstStyle/>
+          <a:p>
+            <a:r>
+              <a:rPr lang="en-GB" sz="2400" b="1" dirty="0" smtClean="0">
+                <a:solidFill>
+                  <a:schemeClr val="bg1"/>
+                </a:solidFill>
+                <a:latin typeface="Courier New" panose="02070309020205020404" pitchFamily="49" charset="0"/>
+                <a:cs typeface="Courier New" panose="02070309020205020404" pitchFamily="49" charset="0"/>
+              </a:rPr>
+              <a:t>8M4D10M</a:t>
+            </a:r>
+            <a:endParaRPr lang="en-GB" sz="2400" b="1" dirty="0">
+              <a:solidFill>
+                <a:schemeClr val="bg1"/>
+              </a:solidFill>
+              <a:latin typeface="Courier New" panose="02070309020205020404" pitchFamily="49" charset="0"/>
+              <a:cs typeface="Courier New" panose="02070309020205020404" pitchFamily="49" charset="0"/>
+            </a:endParaRPr>
+          </a:p>
+        </p:txBody>
+      </p:sp>
+      <p:sp>
+        <p:nvSpPr>
+          <p:cNvPr id="6" name="TextBox 5"/>
+          <p:cNvSpPr txBox="1"/>
+          <p:nvPr/>
+        </p:nvSpPr>
+        <p:spPr>
+          <a:xfrm>
+            <a:off x="7175111" y="1796447"/>
+            <a:ext cx="2075796" cy="461665"/>
+          </a:xfrm>
+          <a:prstGeom prst="rect">
+            <a:avLst/>
+          </a:prstGeom>
+          <a:solidFill>
+            <a:schemeClr val="accent3">
+              <a:lumMod val="40000"/>
+              <a:lumOff val="60000"/>
+            </a:schemeClr>
+          </a:solidFill>
+        </p:spPr>
+        <p:txBody>
+          <a:bodyPr wrap="square" rtlCol="0">
+            <a:spAutoFit/>
+          </a:bodyPr>
+          <a:lstStyle/>
+          <a:p>
+            <a:r>
+              <a:rPr lang="en-GB" sz="2400" b="1" dirty="0" smtClean="0">
+                <a:solidFill>
+                  <a:schemeClr val="bg1"/>
+                </a:solidFill>
+                <a:latin typeface="Courier New" panose="02070309020205020404" pitchFamily="49" charset="0"/>
+                <a:cs typeface="Courier New" panose="02070309020205020404" pitchFamily="49" charset="0"/>
+              </a:rPr>
+              <a:t>15M3D1M</a:t>
+            </a:r>
+            <a:endParaRPr lang="en-GB" sz="2400" b="1" dirty="0">
+              <a:solidFill>
+                <a:schemeClr val="bg1"/>
+              </a:solidFill>
+              <a:latin typeface="Courier New" panose="02070309020205020404" pitchFamily="49" charset="0"/>
+              <a:cs typeface="Courier New" panose="02070309020205020404" pitchFamily="49" charset="0"/>
+            </a:endParaRPr>
+          </a:p>
+        </p:txBody>
+      </p:sp>
+      <p:sp>
+        <p:nvSpPr>
+          <p:cNvPr id="7" name="TextBox 6"/>
+          <p:cNvSpPr txBox="1"/>
+          <p:nvPr/>
+        </p:nvSpPr>
+        <p:spPr>
+          <a:xfrm>
+            <a:off x="7175111" y="2313394"/>
+            <a:ext cx="2075796" cy="461665"/>
+          </a:xfrm>
+          <a:prstGeom prst="rect">
+            <a:avLst/>
+          </a:prstGeom>
+          <a:solidFill>
+            <a:schemeClr val="accent3">
+              <a:lumMod val="40000"/>
+              <a:lumOff val="60000"/>
+            </a:schemeClr>
+          </a:solidFill>
+        </p:spPr>
+        <p:txBody>
+          <a:bodyPr wrap="square" rtlCol="0">
+            <a:spAutoFit/>
+          </a:bodyPr>
+          <a:lstStyle/>
+          <a:p>
+            <a:r>
+              <a:rPr lang="en-GB" sz="2400" b="1" dirty="0" smtClean="0">
+                <a:solidFill>
+                  <a:schemeClr val="bg1"/>
+                </a:solidFill>
+                <a:latin typeface="Courier New" panose="02070309020205020404" pitchFamily="49" charset="0"/>
+                <a:cs typeface="Courier New" panose="02070309020205020404" pitchFamily="49" charset="0"/>
+              </a:rPr>
+              <a:t>6M4D5M3D1M</a:t>
+            </a:r>
+            <a:endParaRPr lang="en-GB" sz="2400" b="1" dirty="0">
+              <a:solidFill>
+                <a:schemeClr val="bg1"/>
+              </a:solidFill>
+              <a:latin typeface="Courier New" panose="02070309020205020404" pitchFamily="49" charset="0"/>
+              <a:cs typeface="Courier New" panose="02070309020205020404" pitchFamily="49" charset="0"/>
+            </a:endParaRPr>
+          </a:p>
+        </p:txBody>
+      </p:sp>
+      <p:sp>
+        <p:nvSpPr>
+          <p:cNvPr id="8" name="TextBox 7"/>
+          <p:cNvSpPr txBox="1"/>
+          <p:nvPr/>
+        </p:nvSpPr>
+        <p:spPr>
+          <a:xfrm>
+            <a:off x="7175112" y="2830341"/>
+            <a:ext cx="2075796" cy="461665"/>
+          </a:xfrm>
+          <a:prstGeom prst="rect">
+            <a:avLst/>
+          </a:prstGeom>
+          <a:solidFill>
+            <a:schemeClr val="accent3">
+              <a:lumMod val="40000"/>
+              <a:lumOff val="60000"/>
+            </a:schemeClr>
+          </a:solidFill>
+        </p:spPr>
+        <p:txBody>
+          <a:bodyPr wrap="square" rtlCol="0">
+            <a:spAutoFit/>
+          </a:bodyPr>
+          <a:lstStyle/>
+          <a:p>
+            <a:r>
+              <a:rPr lang="en-GB" sz="2400" b="1" dirty="0" smtClean="0">
+                <a:solidFill>
+                  <a:schemeClr val="bg1"/>
+                </a:solidFill>
+                <a:latin typeface="Courier New" panose="02070309020205020404" pitchFamily="49" charset="0"/>
+                <a:cs typeface="Courier New" panose="02070309020205020404" pitchFamily="49" charset="0"/>
+              </a:rPr>
+              <a:t>5M3D7M2D2M</a:t>
+            </a:r>
+            <a:endParaRPr lang="en-GB" sz="2400" b="1" dirty="0">
+              <a:solidFill>
+                <a:schemeClr val="bg1"/>
+              </a:solidFill>
+              <a:latin typeface="Courier New" panose="02070309020205020404" pitchFamily="49" charset="0"/>
+              <a:cs typeface="Courier New" panose="02070309020205020404" pitchFamily="49" charset="0"/>
+            </a:endParaRPr>
+          </a:p>
+        </p:txBody>
+      </p:sp>
+      <p:sp>
+        <p:nvSpPr>
+          <p:cNvPr id="9" name="Rectangle 8"/>
+          <p:cNvSpPr/>
+          <p:nvPr/>
+        </p:nvSpPr>
+        <p:spPr>
+          <a:xfrm>
+            <a:off x="1456141" y="4397496"/>
+            <a:ext cx="5594250" cy="461665"/>
+          </a:xfrm>
+          <a:prstGeom prst="rect">
+            <a:avLst/>
+          </a:prstGeom>
+          <a:solidFill>
+            <a:schemeClr val="accent1">
+              <a:lumMod val="20000"/>
+              <a:lumOff val="80000"/>
+            </a:schemeClr>
+          </a:solidFill>
+        </p:spPr>
+        <p:txBody>
+          <a:bodyPr wrap="square">
+            <a:spAutoFit/>
+          </a:bodyPr>
+          <a:lstStyle/>
+          <a:p>
+            <a:r>
+              <a:rPr lang="en-GB" sz="2400" b="1" dirty="0" smtClean="0">
+                <a:solidFill>
+                  <a:srgbClr val="FF0000"/>
+                </a:solidFill>
+                <a:latin typeface="Courier New" panose="02070309020205020404" pitchFamily="49" charset="0"/>
+                <a:cs typeface="Courier New" panose="02070309020205020404" pitchFamily="49" charset="0"/>
+              </a:rPr>
+              <a:t>TTT</a:t>
+            </a:r>
+            <a:r>
+              <a:rPr lang="en-GB" sz="2400" b="1" dirty="0" smtClean="0">
+                <a:solidFill>
+                  <a:srgbClr val="00B050"/>
+                </a:solidFill>
+                <a:latin typeface="Courier New" panose="02070309020205020404" pitchFamily="49" charset="0"/>
+                <a:cs typeface="Courier New" panose="02070309020205020404" pitchFamily="49" charset="0"/>
+              </a:rPr>
+              <a:t>CC</a:t>
+            </a:r>
+            <a:r>
+              <a:rPr lang="en-GB" sz="2400" b="1" dirty="0" smtClean="0">
+                <a:solidFill>
+                  <a:srgbClr val="FFFF00"/>
+                </a:solidFill>
+                <a:latin typeface="Courier New" panose="02070309020205020404" pitchFamily="49" charset="0"/>
+                <a:cs typeface="Courier New" panose="02070309020205020404" pitchFamily="49" charset="0"/>
+              </a:rPr>
+              <a:t>G</a:t>
+            </a:r>
+            <a:r>
+              <a:rPr lang="en-GB" sz="2400" b="1" dirty="0" smtClean="0">
+                <a:solidFill>
+                  <a:srgbClr val="7030A0"/>
+                </a:solidFill>
+                <a:latin typeface="Courier New" panose="02070309020205020404" pitchFamily="49" charset="0"/>
+                <a:cs typeface="Courier New" panose="02070309020205020404" pitchFamily="49" charset="0"/>
+              </a:rPr>
+              <a:t>AA</a:t>
+            </a:r>
+            <a:r>
+              <a:rPr lang="en-GB" sz="2400" b="1" dirty="0" smtClean="0">
+                <a:latin typeface="Courier New" panose="02070309020205020404" pitchFamily="49" charset="0"/>
+                <a:cs typeface="Courier New" panose="02070309020205020404" pitchFamily="49" charset="0"/>
+              </a:rPr>
+              <a:t>****</a:t>
+            </a:r>
+            <a:r>
+              <a:rPr lang="en-GB" sz="2400" b="1" dirty="0" smtClean="0">
+                <a:solidFill>
+                  <a:srgbClr val="FFFF00"/>
+                </a:solidFill>
+                <a:latin typeface="Courier New" panose="02070309020205020404" pitchFamily="49" charset="0"/>
+                <a:cs typeface="Courier New" panose="02070309020205020404" pitchFamily="49" charset="0"/>
+              </a:rPr>
+              <a:t>GG</a:t>
+            </a:r>
+            <a:r>
+              <a:rPr lang="en-GB" sz="2400" b="1" dirty="0" smtClean="0">
+                <a:solidFill>
+                  <a:srgbClr val="FF0000"/>
+                </a:solidFill>
+                <a:latin typeface="Courier New" panose="02070309020205020404" pitchFamily="49" charset="0"/>
+                <a:cs typeface="Courier New" panose="02070309020205020404" pitchFamily="49" charset="0"/>
+              </a:rPr>
+              <a:t>T</a:t>
+            </a:r>
+            <a:r>
+              <a:rPr lang="en-GB" sz="2400" b="1" dirty="0" smtClean="0">
+                <a:solidFill>
+                  <a:srgbClr val="00B050"/>
+                </a:solidFill>
+                <a:latin typeface="Courier New" panose="02070309020205020404" pitchFamily="49" charset="0"/>
+                <a:cs typeface="Courier New" panose="02070309020205020404" pitchFamily="49" charset="0"/>
+              </a:rPr>
+              <a:t>C</a:t>
+            </a:r>
+            <a:r>
+              <a:rPr lang="en-GB" sz="2400" b="1" dirty="0" smtClean="0">
+                <a:solidFill>
+                  <a:srgbClr val="7030A0"/>
+                </a:solidFill>
+                <a:latin typeface="Courier New" panose="02070309020205020404" pitchFamily="49" charset="0"/>
+                <a:cs typeface="Courier New" panose="02070309020205020404" pitchFamily="49" charset="0"/>
+              </a:rPr>
+              <a:t>A</a:t>
+            </a:r>
+            <a:r>
+              <a:rPr lang="en-GB" sz="2400" b="1" dirty="0" smtClean="0">
+                <a:latin typeface="Courier New" panose="02070309020205020404" pitchFamily="49" charset="0"/>
+                <a:cs typeface="Courier New" panose="02070309020205020404" pitchFamily="49" charset="0"/>
+              </a:rPr>
+              <a:t>***</a:t>
+            </a:r>
+            <a:r>
+              <a:rPr lang="en-GB" sz="2400" b="1" dirty="0" smtClean="0">
+                <a:solidFill>
+                  <a:srgbClr val="FFFF00"/>
+                </a:solidFill>
+                <a:latin typeface="Courier New" panose="02070309020205020404" pitchFamily="49" charset="0"/>
+                <a:cs typeface="Courier New" panose="02070309020205020404" pitchFamily="49" charset="0"/>
+              </a:rPr>
+              <a:t>GG</a:t>
+            </a:r>
+            <a:r>
+              <a:rPr lang="en-GB" sz="2400" b="1" dirty="0" smtClean="0">
+                <a:solidFill>
+                  <a:srgbClr val="92D050"/>
+                </a:solidFill>
+                <a:latin typeface="Courier New" panose="02070309020205020404" pitchFamily="49" charset="0"/>
+                <a:cs typeface="Courier New" panose="02070309020205020404" pitchFamily="49" charset="0"/>
+              </a:rPr>
+              <a:t>C</a:t>
+            </a:r>
+            <a:r>
+              <a:rPr lang="en-GB" sz="2400" b="1" dirty="0" smtClean="0">
+                <a:solidFill>
+                  <a:srgbClr val="FFFF00"/>
+                </a:solidFill>
+                <a:latin typeface="Courier New" panose="02070309020205020404" pitchFamily="49" charset="0"/>
+                <a:cs typeface="Courier New" panose="02070309020205020404" pitchFamily="49" charset="0"/>
+              </a:rPr>
+              <a:t>G</a:t>
+            </a:r>
+            <a:r>
+              <a:rPr lang="en-GB" sz="2400" b="1" dirty="0" smtClean="0">
+                <a:solidFill>
+                  <a:srgbClr val="00B050"/>
+                </a:solidFill>
+                <a:latin typeface="Courier New" panose="02070309020205020404" pitchFamily="49" charset="0"/>
+                <a:cs typeface="Courier New" panose="02070309020205020404" pitchFamily="49" charset="0"/>
+              </a:rPr>
+              <a:t>CC</a:t>
+            </a:r>
+            <a:r>
+              <a:rPr lang="en-GB" sz="2400" b="1" dirty="0" smtClean="0">
+                <a:solidFill>
+                  <a:srgbClr val="FFFF00"/>
+                </a:solidFill>
+                <a:latin typeface="Courier New" panose="02070309020205020404" pitchFamily="49" charset="0"/>
+                <a:cs typeface="Courier New" panose="02070309020205020404" pitchFamily="49" charset="0"/>
+              </a:rPr>
+              <a:t>G</a:t>
+            </a:r>
+            <a:r>
+              <a:rPr lang="en-GB" sz="2400" b="1" dirty="0" smtClean="0">
+                <a:solidFill>
+                  <a:srgbClr val="7030A0"/>
+                </a:solidFill>
+                <a:latin typeface="Courier New" panose="02070309020205020404" pitchFamily="49" charset="0"/>
+                <a:cs typeface="Courier New" panose="02070309020205020404" pitchFamily="49" charset="0"/>
+              </a:rPr>
+              <a:t>AA</a:t>
+            </a:r>
+            <a:endParaRPr lang="en-GB" sz="2400" b="1" dirty="0">
+              <a:latin typeface="Courier New" panose="02070309020205020404" pitchFamily="49" charset="0"/>
+              <a:cs typeface="Courier New" panose="02070309020205020404" pitchFamily="49" charset="0"/>
+            </a:endParaRPr>
+          </a:p>
+        </p:txBody>
+      </p:sp>
+      <p:sp>
+        <p:nvSpPr>
+          <p:cNvPr id="10" name="Rectangle 9"/>
+          <p:cNvSpPr/>
+          <p:nvPr/>
+        </p:nvSpPr>
+        <p:spPr>
+          <a:xfrm>
+            <a:off x="1447232" y="1279500"/>
+            <a:ext cx="4300425" cy="461665"/>
+          </a:xfrm>
+          <a:prstGeom prst="rect">
+            <a:avLst/>
+          </a:prstGeom>
+          <a:solidFill>
+            <a:schemeClr val="accent4">
+              <a:lumMod val="20000"/>
+              <a:lumOff val="80000"/>
+            </a:schemeClr>
+          </a:solidFill>
+        </p:spPr>
+        <p:txBody>
+          <a:bodyPr wrap="square">
+            <a:spAutoFit/>
+          </a:bodyPr>
+          <a:lstStyle/>
+          <a:p>
+            <a:r>
+              <a:rPr lang="en-GB" sz="2400" b="1" dirty="0" smtClean="0">
+                <a:solidFill>
+                  <a:srgbClr val="FF0000"/>
+                </a:solidFill>
+                <a:latin typeface="Courier New" panose="02070309020205020404" pitchFamily="49" charset="0"/>
+                <a:cs typeface="Courier New" panose="02070309020205020404" pitchFamily="49" charset="0"/>
+              </a:rPr>
+              <a:t>TTT</a:t>
+            </a:r>
+            <a:r>
+              <a:rPr lang="en-GB" sz="2400" b="1" dirty="0" smtClean="0">
+                <a:solidFill>
+                  <a:srgbClr val="00B050"/>
+                </a:solidFill>
+                <a:latin typeface="Courier New" panose="02070309020205020404" pitchFamily="49" charset="0"/>
+                <a:cs typeface="Courier New" panose="02070309020205020404" pitchFamily="49" charset="0"/>
+              </a:rPr>
+              <a:t>CC</a:t>
+            </a:r>
+            <a:r>
+              <a:rPr lang="en-GB" sz="2400" b="1" dirty="0" smtClean="0">
+                <a:solidFill>
+                  <a:srgbClr val="FFFF00"/>
+                </a:solidFill>
+                <a:latin typeface="Courier New" panose="02070309020205020404" pitchFamily="49" charset="0"/>
+                <a:cs typeface="Courier New" panose="02070309020205020404" pitchFamily="49" charset="0"/>
+              </a:rPr>
+              <a:t>G</a:t>
+            </a:r>
+            <a:r>
+              <a:rPr lang="en-GB" sz="2400" b="1" dirty="0" smtClean="0">
+                <a:solidFill>
+                  <a:srgbClr val="7030A0"/>
+                </a:solidFill>
+                <a:latin typeface="Courier New" panose="02070309020205020404" pitchFamily="49" charset="0"/>
+                <a:cs typeface="Courier New" panose="02070309020205020404" pitchFamily="49" charset="0"/>
+              </a:rPr>
+              <a:t>AA</a:t>
+            </a:r>
+            <a:r>
+              <a:rPr lang="en-GB" sz="2400" b="1" dirty="0" smtClean="0">
+                <a:latin typeface="Courier New" panose="02070309020205020404" pitchFamily="49" charset="0"/>
+                <a:cs typeface="Courier New" panose="02070309020205020404" pitchFamily="49" charset="0"/>
+              </a:rPr>
+              <a:t>****</a:t>
+            </a:r>
+            <a:r>
+              <a:rPr lang="en-GB" sz="2400" b="1" dirty="0" smtClean="0">
+                <a:solidFill>
+                  <a:srgbClr val="FFFF00"/>
+                </a:solidFill>
+                <a:latin typeface="Courier New" panose="02070309020205020404" pitchFamily="49" charset="0"/>
+                <a:cs typeface="Courier New" panose="02070309020205020404" pitchFamily="49" charset="0"/>
+              </a:rPr>
+              <a:t>GG</a:t>
+            </a:r>
+            <a:r>
+              <a:rPr lang="en-GB" sz="2400" b="1" dirty="0" smtClean="0">
+                <a:solidFill>
+                  <a:srgbClr val="FF0000"/>
+                </a:solidFill>
+                <a:latin typeface="Courier New" panose="02070309020205020404" pitchFamily="49" charset="0"/>
+                <a:cs typeface="Courier New" panose="02070309020205020404" pitchFamily="49" charset="0"/>
+              </a:rPr>
+              <a:t>T</a:t>
+            </a:r>
+            <a:r>
+              <a:rPr lang="en-GB" sz="2400" b="1" dirty="0" smtClean="0">
+                <a:solidFill>
+                  <a:srgbClr val="00B050"/>
+                </a:solidFill>
+                <a:latin typeface="Courier New" panose="02070309020205020404" pitchFamily="49" charset="0"/>
+                <a:cs typeface="Courier New" panose="02070309020205020404" pitchFamily="49" charset="0"/>
+              </a:rPr>
+              <a:t>C</a:t>
+            </a:r>
+            <a:r>
+              <a:rPr lang="en-GB" sz="2400" b="1" dirty="0" smtClean="0">
+                <a:solidFill>
+                  <a:srgbClr val="7030A0"/>
+                </a:solidFill>
+                <a:latin typeface="Courier New" panose="02070309020205020404" pitchFamily="49" charset="0"/>
+                <a:cs typeface="Courier New" panose="02070309020205020404" pitchFamily="49" charset="0"/>
+              </a:rPr>
+              <a:t>AA</a:t>
+            </a:r>
+            <a:r>
+              <a:rPr lang="en-GB" sz="2400" b="1" dirty="0" smtClean="0">
+                <a:solidFill>
+                  <a:srgbClr val="FFFF00"/>
+                </a:solidFill>
+                <a:latin typeface="Courier New" panose="02070309020205020404" pitchFamily="49" charset="0"/>
+                <a:cs typeface="Courier New" panose="02070309020205020404" pitchFamily="49" charset="0"/>
+              </a:rPr>
+              <a:t>GG</a:t>
+            </a:r>
+            <a:r>
+              <a:rPr lang="en-GB" sz="2400" b="1" dirty="0" smtClean="0">
+                <a:solidFill>
+                  <a:srgbClr val="92D050"/>
+                </a:solidFill>
+                <a:latin typeface="Courier New" panose="02070309020205020404" pitchFamily="49" charset="0"/>
+                <a:cs typeface="Courier New" panose="02070309020205020404" pitchFamily="49" charset="0"/>
+              </a:rPr>
+              <a:t>C</a:t>
+            </a:r>
+            <a:r>
+              <a:rPr lang="en-GB" sz="2400" b="1" dirty="0" smtClean="0">
+                <a:solidFill>
+                  <a:srgbClr val="FFFF00"/>
+                </a:solidFill>
+                <a:latin typeface="Courier New" panose="02070309020205020404" pitchFamily="49" charset="0"/>
+                <a:cs typeface="Courier New" panose="02070309020205020404" pitchFamily="49" charset="0"/>
+              </a:rPr>
+              <a:t>G</a:t>
+            </a:r>
+            <a:endParaRPr lang="en-GB" sz="2400" b="1" dirty="0">
+              <a:latin typeface="Courier New" panose="02070309020205020404" pitchFamily="49" charset="0"/>
+              <a:cs typeface="Courier New" panose="02070309020205020404" pitchFamily="49" charset="0"/>
+            </a:endParaRPr>
+          </a:p>
+        </p:txBody>
+      </p:sp>
+      <p:sp>
+        <p:nvSpPr>
+          <p:cNvPr id="11" name="Rectangle 10"/>
+          <p:cNvSpPr/>
+          <p:nvPr/>
+        </p:nvSpPr>
+        <p:spPr>
+          <a:xfrm>
+            <a:off x="3993499" y="3864233"/>
+            <a:ext cx="2656683" cy="461665"/>
+          </a:xfrm>
+          <a:prstGeom prst="rect">
+            <a:avLst/>
+          </a:prstGeom>
+          <a:solidFill>
+            <a:schemeClr val="accent4">
+              <a:lumMod val="20000"/>
+              <a:lumOff val="80000"/>
+            </a:schemeClr>
+          </a:solidFill>
+        </p:spPr>
+        <p:txBody>
+          <a:bodyPr wrap="square">
+            <a:spAutoFit/>
+          </a:bodyPr>
+          <a:lstStyle/>
+          <a:p>
+            <a:r>
+              <a:rPr lang="en-GB" sz="2400" b="1" dirty="0" smtClean="0">
+                <a:solidFill>
+                  <a:srgbClr val="FF0000"/>
+                </a:solidFill>
+                <a:latin typeface="Courier New" panose="02070309020205020404" pitchFamily="49" charset="0"/>
+                <a:cs typeface="Courier New" panose="02070309020205020404" pitchFamily="49" charset="0"/>
+              </a:rPr>
+              <a:t>T</a:t>
+            </a:r>
+            <a:r>
+              <a:rPr lang="en-GB" sz="2400" b="1" dirty="0" smtClean="0">
+                <a:solidFill>
+                  <a:srgbClr val="00B050"/>
+                </a:solidFill>
+                <a:latin typeface="Courier New" panose="02070309020205020404" pitchFamily="49" charset="0"/>
+                <a:cs typeface="Courier New" panose="02070309020205020404" pitchFamily="49" charset="0"/>
+              </a:rPr>
+              <a:t>C</a:t>
+            </a:r>
+            <a:r>
+              <a:rPr lang="en-GB" sz="2400" b="1" dirty="0" smtClean="0">
+                <a:solidFill>
+                  <a:srgbClr val="7030A0"/>
+                </a:solidFill>
+                <a:latin typeface="Courier New" panose="02070309020205020404" pitchFamily="49" charset="0"/>
+                <a:cs typeface="Courier New" panose="02070309020205020404" pitchFamily="49" charset="0"/>
+              </a:rPr>
+              <a:t>A</a:t>
+            </a:r>
+            <a:r>
+              <a:rPr lang="en-GB" sz="2400" b="1" dirty="0" smtClean="0">
+                <a:latin typeface="Courier New" panose="02070309020205020404" pitchFamily="49" charset="0"/>
+                <a:cs typeface="Courier New" panose="02070309020205020404" pitchFamily="49" charset="0"/>
+              </a:rPr>
+              <a:t>*</a:t>
+            </a:r>
+            <a:r>
+              <a:rPr lang="en-GB" sz="2400" b="1" dirty="0" smtClean="0">
+                <a:solidFill>
+                  <a:srgbClr val="FFFF00"/>
+                </a:solidFill>
+                <a:latin typeface="Courier New" panose="02070309020205020404" pitchFamily="49" charset="0"/>
+                <a:cs typeface="Courier New" panose="02070309020205020404" pitchFamily="49" charset="0"/>
+              </a:rPr>
+              <a:t>GG</a:t>
+            </a:r>
+            <a:r>
+              <a:rPr lang="en-GB" sz="2400" b="1" dirty="0" smtClean="0">
+                <a:solidFill>
+                  <a:srgbClr val="92D050"/>
+                </a:solidFill>
+                <a:latin typeface="Courier New" panose="02070309020205020404" pitchFamily="49" charset="0"/>
+                <a:cs typeface="Courier New" panose="02070309020205020404" pitchFamily="49" charset="0"/>
+              </a:rPr>
+              <a:t>C</a:t>
+            </a:r>
+            <a:r>
+              <a:rPr lang="en-GB" sz="2400" b="1" dirty="0" smtClean="0">
+                <a:solidFill>
+                  <a:srgbClr val="FFFF00"/>
+                </a:solidFill>
+                <a:latin typeface="Courier New" panose="02070309020205020404" pitchFamily="49" charset="0"/>
+                <a:cs typeface="Courier New" panose="02070309020205020404" pitchFamily="49" charset="0"/>
+              </a:rPr>
+              <a:t>G</a:t>
+            </a:r>
+            <a:r>
+              <a:rPr lang="en-GB" sz="2400" b="1" dirty="0" smtClean="0">
+                <a:solidFill>
+                  <a:srgbClr val="00B050"/>
+                </a:solidFill>
+                <a:latin typeface="Courier New" panose="02070309020205020404" pitchFamily="49" charset="0"/>
+                <a:cs typeface="Courier New" panose="02070309020205020404" pitchFamily="49" charset="0"/>
+              </a:rPr>
+              <a:t>CC</a:t>
+            </a:r>
+            <a:r>
+              <a:rPr lang="en-GB" sz="2400" b="1" dirty="0" smtClean="0">
+                <a:solidFill>
+                  <a:srgbClr val="FFFF00"/>
+                </a:solidFill>
+                <a:latin typeface="Courier New" panose="02070309020205020404" pitchFamily="49" charset="0"/>
+                <a:cs typeface="Courier New" panose="02070309020205020404" pitchFamily="49" charset="0"/>
+              </a:rPr>
+              <a:t>G</a:t>
+            </a:r>
+            <a:r>
+              <a:rPr lang="en-GB" sz="2400" b="1" dirty="0" smtClean="0">
+                <a:solidFill>
+                  <a:srgbClr val="7030A0"/>
+                </a:solidFill>
+                <a:latin typeface="Courier New" panose="02070309020205020404" pitchFamily="49" charset="0"/>
+                <a:cs typeface="Courier New" panose="02070309020205020404" pitchFamily="49" charset="0"/>
+              </a:rPr>
+              <a:t>AA</a:t>
+            </a:r>
+            <a:endParaRPr lang="en-GB" sz="2400" b="1" dirty="0">
+              <a:latin typeface="Courier New" panose="02070309020205020404" pitchFamily="49" charset="0"/>
+              <a:cs typeface="Courier New" panose="02070309020205020404" pitchFamily="49" charset="0"/>
+            </a:endParaRPr>
+          </a:p>
+        </p:txBody>
+      </p:sp>
+      <p:sp>
+        <p:nvSpPr>
+          <p:cNvPr id="12" name="Rectangle 11"/>
+          <p:cNvSpPr/>
+          <p:nvPr/>
+        </p:nvSpPr>
+        <p:spPr>
+          <a:xfrm>
+            <a:off x="1822271" y="1796447"/>
+            <a:ext cx="3699674" cy="461665"/>
+          </a:xfrm>
+          <a:prstGeom prst="rect">
+            <a:avLst/>
+          </a:prstGeom>
+          <a:solidFill>
+            <a:schemeClr val="accent4">
+              <a:lumMod val="20000"/>
+              <a:lumOff val="80000"/>
+            </a:schemeClr>
+          </a:solidFill>
+        </p:spPr>
+        <p:txBody>
+          <a:bodyPr wrap="square">
+            <a:spAutoFit/>
+          </a:bodyPr>
+          <a:lstStyle/>
+          <a:p>
+            <a:r>
+              <a:rPr lang="en-GB" sz="2400" b="1" dirty="0" smtClean="0">
+                <a:solidFill>
+                  <a:srgbClr val="FF0000"/>
+                </a:solidFill>
+                <a:latin typeface="Courier New" panose="02070309020205020404" pitchFamily="49" charset="0"/>
+                <a:cs typeface="Courier New" panose="02070309020205020404" pitchFamily="49" charset="0"/>
+              </a:rPr>
+              <a:t>T</a:t>
+            </a:r>
+            <a:r>
+              <a:rPr lang="en-GB" sz="2400" b="1" dirty="0" smtClean="0">
+                <a:solidFill>
+                  <a:srgbClr val="00B050"/>
+                </a:solidFill>
+                <a:latin typeface="Courier New" panose="02070309020205020404" pitchFamily="49" charset="0"/>
+                <a:cs typeface="Courier New" panose="02070309020205020404" pitchFamily="49" charset="0"/>
+              </a:rPr>
+              <a:t>CC</a:t>
+            </a:r>
+            <a:r>
+              <a:rPr lang="en-GB" sz="2400" b="1" dirty="0" smtClean="0">
+                <a:solidFill>
+                  <a:srgbClr val="FFFF00"/>
+                </a:solidFill>
+                <a:latin typeface="Courier New" panose="02070309020205020404" pitchFamily="49" charset="0"/>
+                <a:cs typeface="Courier New" panose="02070309020205020404" pitchFamily="49" charset="0"/>
+              </a:rPr>
+              <a:t>G</a:t>
+            </a:r>
+            <a:r>
+              <a:rPr lang="en-GB" sz="2400" b="1" dirty="0" smtClean="0">
+                <a:solidFill>
+                  <a:srgbClr val="7030A0"/>
+                </a:solidFill>
+                <a:latin typeface="Courier New" panose="02070309020205020404" pitchFamily="49" charset="0"/>
+                <a:cs typeface="Courier New" panose="02070309020205020404" pitchFamily="49" charset="0"/>
+              </a:rPr>
+              <a:t>AAA</a:t>
+            </a:r>
+            <a:r>
+              <a:rPr lang="en-GB" sz="2400" b="1" dirty="0" smtClean="0">
+                <a:solidFill>
+                  <a:srgbClr val="FF0000"/>
+                </a:solidFill>
+                <a:latin typeface="Courier New" panose="02070309020205020404" pitchFamily="49" charset="0"/>
+                <a:cs typeface="Courier New" panose="02070309020205020404" pitchFamily="49" charset="0"/>
+              </a:rPr>
+              <a:t>T</a:t>
+            </a:r>
+            <a:r>
+              <a:rPr lang="en-GB" sz="2400" b="1" dirty="0" smtClean="0">
+                <a:solidFill>
+                  <a:srgbClr val="00B050"/>
+                </a:solidFill>
+                <a:latin typeface="Courier New" panose="02070309020205020404" pitchFamily="49" charset="0"/>
+                <a:cs typeface="Courier New" panose="02070309020205020404" pitchFamily="49" charset="0"/>
+              </a:rPr>
+              <a:t>CC</a:t>
+            </a:r>
+            <a:r>
+              <a:rPr lang="en-GB" sz="2400" b="1" dirty="0" smtClean="0">
+                <a:solidFill>
+                  <a:srgbClr val="FFFF00"/>
+                </a:solidFill>
+                <a:latin typeface="Courier New" panose="02070309020205020404" pitchFamily="49" charset="0"/>
+                <a:cs typeface="Courier New" panose="02070309020205020404" pitchFamily="49" charset="0"/>
+              </a:rPr>
+              <a:t>GG</a:t>
+            </a:r>
+            <a:r>
+              <a:rPr lang="en-GB" sz="2400" b="1" dirty="0" smtClean="0">
+                <a:solidFill>
+                  <a:srgbClr val="FF0000"/>
+                </a:solidFill>
+                <a:latin typeface="Courier New" panose="02070309020205020404" pitchFamily="49" charset="0"/>
+                <a:cs typeface="Courier New" panose="02070309020205020404" pitchFamily="49" charset="0"/>
+              </a:rPr>
+              <a:t>T</a:t>
+            </a:r>
+            <a:r>
+              <a:rPr lang="en-GB" sz="2400" b="1" dirty="0" smtClean="0">
+                <a:solidFill>
+                  <a:srgbClr val="00B050"/>
+                </a:solidFill>
+                <a:latin typeface="Courier New" panose="02070309020205020404" pitchFamily="49" charset="0"/>
+                <a:cs typeface="Courier New" panose="02070309020205020404" pitchFamily="49" charset="0"/>
+              </a:rPr>
+              <a:t>C</a:t>
+            </a:r>
+            <a:r>
+              <a:rPr lang="en-GB" sz="2400" b="1" dirty="0" smtClean="0">
+                <a:solidFill>
+                  <a:srgbClr val="7030A0"/>
+                </a:solidFill>
+                <a:latin typeface="Courier New" panose="02070309020205020404" pitchFamily="49" charset="0"/>
+                <a:cs typeface="Courier New" panose="02070309020205020404" pitchFamily="49" charset="0"/>
+              </a:rPr>
+              <a:t>A</a:t>
+            </a:r>
+            <a:r>
+              <a:rPr lang="en-GB" sz="2400" b="1" dirty="0" smtClean="0">
+                <a:latin typeface="Courier New" panose="02070309020205020404" pitchFamily="49" charset="0"/>
+                <a:cs typeface="Courier New" panose="02070309020205020404" pitchFamily="49" charset="0"/>
+              </a:rPr>
+              <a:t>***</a:t>
+            </a:r>
+            <a:r>
+              <a:rPr lang="en-GB" sz="2400" b="1" dirty="0">
+                <a:solidFill>
+                  <a:srgbClr val="92D050"/>
+                </a:solidFill>
+                <a:latin typeface="Courier New" panose="02070309020205020404" pitchFamily="49" charset="0"/>
+                <a:cs typeface="Courier New" panose="02070309020205020404" pitchFamily="49" charset="0"/>
+              </a:rPr>
+              <a:t>C</a:t>
+            </a:r>
+            <a:endParaRPr lang="en-GB" sz="2400" b="1" dirty="0">
+              <a:latin typeface="Courier New" panose="02070309020205020404" pitchFamily="49" charset="0"/>
+              <a:cs typeface="Courier New" panose="02070309020205020404" pitchFamily="49" charset="0"/>
+            </a:endParaRPr>
+          </a:p>
+        </p:txBody>
+      </p:sp>
+      <p:sp>
+        <p:nvSpPr>
+          <p:cNvPr id="13" name="Rectangle 12"/>
+          <p:cNvSpPr/>
+          <p:nvPr/>
+        </p:nvSpPr>
+        <p:spPr>
+          <a:xfrm>
+            <a:off x="1995450" y="3347288"/>
+            <a:ext cx="3752207" cy="461665"/>
+          </a:xfrm>
+          <a:prstGeom prst="rect">
+            <a:avLst/>
+          </a:prstGeom>
+          <a:solidFill>
+            <a:schemeClr val="accent4">
+              <a:lumMod val="20000"/>
+              <a:lumOff val="80000"/>
+            </a:schemeClr>
+          </a:solidFill>
+        </p:spPr>
+        <p:txBody>
+          <a:bodyPr wrap="square">
+            <a:spAutoFit/>
+          </a:bodyPr>
+          <a:lstStyle/>
+          <a:p>
+            <a:r>
+              <a:rPr lang="en-GB" sz="2400" b="1" dirty="0" smtClean="0">
+                <a:solidFill>
+                  <a:srgbClr val="00B050"/>
+                </a:solidFill>
+                <a:latin typeface="Courier New" panose="02070309020205020404" pitchFamily="49" charset="0"/>
+                <a:cs typeface="Courier New" panose="02070309020205020404" pitchFamily="49" charset="0"/>
+              </a:rPr>
+              <a:t>CC</a:t>
+            </a:r>
+            <a:r>
+              <a:rPr lang="en-GB" sz="2400" b="1" dirty="0" smtClean="0">
+                <a:solidFill>
+                  <a:srgbClr val="FFFF00"/>
+                </a:solidFill>
+                <a:latin typeface="Courier New" panose="02070309020205020404" pitchFamily="49" charset="0"/>
+                <a:cs typeface="Courier New" panose="02070309020205020404" pitchFamily="49" charset="0"/>
+              </a:rPr>
+              <a:t>G</a:t>
+            </a:r>
+            <a:r>
+              <a:rPr lang="en-GB" sz="2400" b="1" dirty="0" smtClean="0">
+                <a:solidFill>
+                  <a:srgbClr val="7030A0"/>
+                </a:solidFill>
+                <a:latin typeface="Courier New" panose="02070309020205020404" pitchFamily="49" charset="0"/>
+                <a:cs typeface="Courier New" panose="02070309020205020404" pitchFamily="49" charset="0"/>
+              </a:rPr>
+              <a:t>AA</a:t>
+            </a:r>
+            <a:r>
+              <a:rPr lang="en-GB" sz="2400" b="1" dirty="0" smtClean="0">
+                <a:latin typeface="Courier New" panose="02070309020205020404" pitchFamily="49" charset="0"/>
+                <a:cs typeface="Courier New" panose="02070309020205020404" pitchFamily="49" charset="0"/>
+              </a:rPr>
+              <a:t>****</a:t>
+            </a:r>
+            <a:r>
+              <a:rPr lang="en-GB" sz="2400" b="1" dirty="0" smtClean="0">
+                <a:solidFill>
+                  <a:srgbClr val="FFFF00"/>
+                </a:solidFill>
+                <a:latin typeface="Courier New" panose="02070309020205020404" pitchFamily="49" charset="0"/>
+                <a:cs typeface="Courier New" panose="02070309020205020404" pitchFamily="49" charset="0"/>
+              </a:rPr>
+              <a:t>GG</a:t>
+            </a:r>
+            <a:r>
+              <a:rPr lang="en-GB" sz="2400" b="1" dirty="0" smtClean="0">
+                <a:solidFill>
+                  <a:srgbClr val="FF0000"/>
+                </a:solidFill>
+                <a:latin typeface="Courier New" panose="02070309020205020404" pitchFamily="49" charset="0"/>
+                <a:cs typeface="Courier New" panose="02070309020205020404" pitchFamily="49" charset="0"/>
+              </a:rPr>
+              <a:t>T</a:t>
+            </a:r>
+            <a:r>
+              <a:rPr lang="en-GB" sz="2400" b="1" dirty="0" smtClean="0">
+                <a:solidFill>
+                  <a:srgbClr val="00B050"/>
+                </a:solidFill>
+                <a:latin typeface="Courier New" panose="02070309020205020404" pitchFamily="49" charset="0"/>
+                <a:cs typeface="Courier New" panose="02070309020205020404" pitchFamily="49" charset="0"/>
+              </a:rPr>
+              <a:t>C</a:t>
+            </a:r>
+            <a:r>
+              <a:rPr lang="en-GB" sz="2400" b="1" dirty="0" smtClean="0">
+                <a:solidFill>
+                  <a:srgbClr val="7030A0"/>
+                </a:solidFill>
+                <a:latin typeface="Courier New" panose="02070309020205020404" pitchFamily="49" charset="0"/>
+                <a:cs typeface="Courier New" panose="02070309020205020404" pitchFamily="49" charset="0"/>
+              </a:rPr>
+              <a:t>A</a:t>
+            </a:r>
+            <a:r>
+              <a:rPr lang="en-GB" sz="2400" b="1" dirty="0" smtClean="0">
+                <a:latin typeface="Courier New" panose="02070309020205020404" pitchFamily="49" charset="0"/>
+                <a:cs typeface="Courier New" panose="02070309020205020404" pitchFamily="49" charset="0"/>
+              </a:rPr>
+              <a:t>***</a:t>
+            </a:r>
+            <a:r>
+              <a:rPr lang="en-GB" sz="2400" b="1" dirty="0" smtClean="0">
+                <a:solidFill>
+                  <a:srgbClr val="92D050"/>
+                </a:solidFill>
+                <a:latin typeface="Courier New" panose="02070309020205020404" pitchFamily="49" charset="0"/>
+                <a:cs typeface="Courier New" panose="02070309020205020404" pitchFamily="49" charset="0"/>
+              </a:rPr>
+              <a:t>C</a:t>
+            </a:r>
+            <a:r>
+              <a:rPr lang="en-GB" sz="2400" b="1" dirty="0" smtClean="0">
+                <a:solidFill>
+                  <a:srgbClr val="FFFF00"/>
+                </a:solidFill>
+                <a:latin typeface="Courier New" panose="02070309020205020404" pitchFamily="49" charset="0"/>
+                <a:cs typeface="Courier New" panose="02070309020205020404" pitchFamily="49" charset="0"/>
+              </a:rPr>
+              <a:t>G</a:t>
+            </a:r>
+            <a:endParaRPr lang="en-GB" sz="2400" b="1" dirty="0">
+              <a:latin typeface="Courier New" panose="02070309020205020404" pitchFamily="49" charset="0"/>
+              <a:cs typeface="Courier New" panose="02070309020205020404" pitchFamily="49" charset="0"/>
+            </a:endParaRPr>
+          </a:p>
+        </p:txBody>
+      </p:sp>
+      <p:sp>
+        <p:nvSpPr>
+          <p:cNvPr id="14" name="Rectangle 13"/>
+          <p:cNvSpPr/>
+          <p:nvPr/>
+        </p:nvSpPr>
+        <p:spPr>
+          <a:xfrm>
+            <a:off x="1822271" y="2313394"/>
+            <a:ext cx="3699674" cy="461665"/>
+          </a:xfrm>
+          <a:prstGeom prst="rect">
+            <a:avLst/>
+          </a:prstGeom>
+          <a:solidFill>
+            <a:schemeClr val="accent4">
+              <a:lumMod val="20000"/>
+              <a:lumOff val="80000"/>
+            </a:schemeClr>
+          </a:solidFill>
+        </p:spPr>
+        <p:txBody>
+          <a:bodyPr wrap="square">
+            <a:spAutoFit/>
+          </a:bodyPr>
+          <a:lstStyle/>
+          <a:p>
+            <a:r>
+              <a:rPr lang="en-GB" sz="2400" b="1" dirty="0" smtClean="0">
+                <a:solidFill>
+                  <a:srgbClr val="FF0000"/>
+                </a:solidFill>
+                <a:latin typeface="Courier New" panose="02070309020205020404" pitchFamily="49" charset="0"/>
+                <a:cs typeface="Courier New" panose="02070309020205020404" pitchFamily="49" charset="0"/>
+              </a:rPr>
+              <a:t>T</a:t>
+            </a:r>
+            <a:r>
+              <a:rPr lang="en-GB" sz="2400" b="1" dirty="0" smtClean="0">
+                <a:solidFill>
+                  <a:srgbClr val="00B050"/>
+                </a:solidFill>
+                <a:latin typeface="Courier New" panose="02070309020205020404" pitchFamily="49" charset="0"/>
+                <a:cs typeface="Courier New" panose="02070309020205020404" pitchFamily="49" charset="0"/>
+              </a:rPr>
+              <a:t>CC</a:t>
+            </a:r>
+            <a:r>
+              <a:rPr lang="en-GB" sz="2400" b="1" dirty="0" smtClean="0">
+                <a:solidFill>
+                  <a:srgbClr val="FFFF00"/>
+                </a:solidFill>
+                <a:latin typeface="Courier New" panose="02070309020205020404" pitchFamily="49" charset="0"/>
+                <a:cs typeface="Courier New" panose="02070309020205020404" pitchFamily="49" charset="0"/>
+              </a:rPr>
+              <a:t>G</a:t>
+            </a:r>
+            <a:r>
+              <a:rPr lang="en-GB" sz="2400" b="1" dirty="0" smtClean="0">
+                <a:solidFill>
+                  <a:srgbClr val="7030A0"/>
+                </a:solidFill>
+                <a:latin typeface="Courier New" panose="02070309020205020404" pitchFamily="49" charset="0"/>
+                <a:cs typeface="Courier New" panose="02070309020205020404" pitchFamily="49" charset="0"/>
+              </a:rPr>
+              <a:t>AA</a:t>
+            </a:r>
+            <a:r>
+              <a:rPr lang="en-GB" sz="2400" b="1" dirty="0" smtClean="0">
+                <a:latin typeface="Courier New" panose="02070309020205020404" pitchFamily="49" charset="0"/>
+                <a:cs typeface="Courier New" panose="02070309020205020404" pitchFamily="49" charset="0"/>
+              </a:rPr>
+              <a:t>****</a:t>
+            </a:r>
+            <a:r>
+              <a:rPr lang="en-GB" sz="2400" b="1" dirty="0" smtClean="0">
+                <a:solidFill>
+                  <a:srgbClr val="FFFF00"/>
+                </a:solidFill>
+                <a:latin typeface="Courier New" panose="02070309020205020404" pitchFamily="49" charset="0"/>
+                <a:cs typeface="Courier New" panose="02070309020205020404" pitchFamily="49" charset="0"/>
+              </a:rPr>
+              <a:t>GG</a:t>
+            </a:r>
+            <a:r>
+              <a:rPr lang="en-GB" sz="2400" b="1" dirty="0" smtClean="0">
+                <a:solidFill>
+                  <a:srgbClr val="FF0000"/>
+                </a:solidFill>
+                <a:latin typeface="Courier New" panose="02070309020205020404" pitchFamily="49" charset="0"/>
+                <a:cs typeface="Courier New" panose="02070309020205020404" pitchFamily="49" charset="0"/>
+              </a:rPr>
+              <a:t>T</a:t>
+            </a:r>
+            <a:r>
+              <a:rPr lang="en-GB" sz="2400" b="1" dirty="0" smtClean="0">
+                <a:solidFill>
+                  <a:srgbClr val="00B050"/>
+                </a:solidFill>
+                <a:latin typeface="Courier New" panose="02070309020205020404" pitchFamily="49" charset="0"/>
+                <a:cs typeface="Courier New" panose="02070309020205020404" pitchFamily="49" charset="0"/>
+              </a:rPr>
+              <a:t>C</a:t>
+            </a:r>
+            <a:r>
+              <a:rPr lang="en-GB" sz="2400" b="1" dirty="0" smtClean="0">
+                <a:solidFill>
+                  <a:srgbClr val="7030A0"/>
+                </a:solidFill>
+                <a:latin typeface="Courier New" panose="02070309020205020404" pitchFamily="49" charset="0"/>
+                <a:cs typeface="Courier New" panose="02070309020205020404" pitchFamily="49" charset="0"/>
+              </a:rPr>
+              <a:t>A</a:t>
+            </a:r>
+            <a:r>
+              <a:rPr lang="en-GB" sz="2400" b="1" dirty="0" smtClean="0">
+                <a:latin typeface="Courier New" panose="02070309020205020404" pitchFamily="49" charset="0"/>
+                <a:cs typeface="Courier New" panose="02070309020205020404" pitchFamily="49" charset="0"/>
+              </a:rPr>
+              <a:t>***</a:t>
+            </a:r>
+            <a:r>
+              <a:rPr lang="en-GB" sz="2400" b="1" dirty="0">
+                <a:solidFill>
+                  <a:srgbClr val="92D050"/>
+                </a:solidFill>
+                <a:latin typeface="Courier New" panose="02070309020205020404" pitchFamily="49" charset="0"/>
+                <a:cs typeface="Courier New" panose="02070309020205020404" pitchFamily="49" charset="0"/>
+              </a:rPr>
+              <a:t>C</a:t>
+            </a:r>
+            <a:endParaRPr lang="en-GB" sz="2400" b="1" dirty="0">
+              <a:latin typeface="Courier New" panose="02070309020205020404" pitchFamily="49" charset="0"/>
+              <a:cs typeface="Courier New" panose="02070309020205020404" pitchFamily="49" charset="0"/>
+            </a:endParaRPr>
+          </a:p>
+        </p:txBody>
+      </p:sp>
+      <p:sp>
+        <p:nvSpPr>
+          <p:cNvPr id="15" name="Rectangle 14"/>
+          <p:cNvSpPr/>
+          <p:nvPr/>
+        </p:nvSpPr>
+        <p:spPr>
+          <a:xfrm>
+            <a:off x="1995450" y="2830341"/>
+            <a:ext cx="3752207" cy="461665"/>
+          </a:xfrm>
+          <a:prstGeom prst="rect">
+            <a:avLst/>
+          </a:prstGeom>
+          <a:solidFill>
+            <a:schemeClr val="accent4">
+              <a:lumMod val="20000"/>
+              <a:lumOff val="80000"/>
+            </a:schemeClr>
+          </a:solidFill>
+        </p:spPr>
+        <p:txBody>
+          <a:bodyPr wrap="square">
+            <a:spAutoFit/>
+          </a:bodyPr>
+          <a:lstStyle/>
+          <a:p>
+            <a:r>
+              <a:rPr lang="en-GB" sz="2400" b="1" dirty="0" smtClean="0">
+                <a:solidFill>
+                  <a:srgbClr val="00B050"/>
+                </a:solidFill>
+                <a:latin typeface="Courier New" panose="02070309020205020404" pitchFamily="49" charset="0"/>
+                <a:cs typeface="Courier New" panose="02070309020205020404" pitchFamily="49" charset="0"/>
+              </a:rPr>
+              <a:t>CC</a:t>
+            </a:r>
+            <a:r>
+              <a:rPr lang="en-GB" sz="2400" b="1" dirty="0" smtClean="0">
+                <a:solidFill>
+                  <a:srgbClr val="FFFF00"/>
+                </a:solidFill>
+                <a:latin typeface="Courier New" panose="02070309020205020404" pitchFamily="49" charset="0"/>
+                <a:cs typeface="Courier New" panose="02070309020205020404" pitchFamily="49" charset="0"/>
+              </a:rPr>
+              <a:t>G</a:t>
+            </a:r>
+            <a:r>
+              <a:rPr lang="en-GB" sz="2400" b="1" dirty="0" smtClean="0">
+                <a:solidFill>
+                  <a:srgbClr val="7030A0"/>
+                </a:solidFill>
+                <a:latin typeface="Courier New" panose="02070309020205020404" pitchFamily="49" charset="0"/>
+                <a:cs typeface="Courier New" panose="02070309020205020404" pitchFamily="49" charset="0"/>
+              </a:rPr>
+              <a:t>AA</a:t>
+            </a:r>
+            <a:r>
+              <a:rPr lang="en-GB" sz="2400" b="1" dirty="0" smtClean="0">
+                <a:latin typeface="Courier New" panose="02070309020205020404" pitchFamily="49" charset="0"/>
+                <a:cs typeface="Courier New" panose="02070309020205020404" pitchFamily="49" charset="0"/>
+              </a:rPr>
+              <a:t>***</a:t>
+            </a:r>
+            <a:r>
+              <a:rPr lang="en-GB" sz="2400" b="1" dirty="0" smtClean="0">
+                <a:solidFill>
+                  <a:srgbClr val="FFFF00"/>
+                </a:solidFill>
+                <a:latin typeface="Courier New" panose="02070309020205020404" pitchFamily="49" charset="0"/>
+                <a:cs typeface="Courier New" panose="02070309020205020404" pitchFamily="49" charset="0"/>
+              </a:rPr>
+              <a:t>GGG</a:t>
+            </a:r>
+            <a:r>
+              <a:rPr lang="en-GB" sz="2400" b="1" dirty="0" smtClean="0">
+                <a:solidFill>
+                  <a:srgbClr val="FF0000"/>
+                </a:solidFill>
+                <a:latin typeface="Courier New" panose="02070309020205020404" pitchFamily="49" charset="0"/>
+                <a:cs typeface="Courier New" panose="02070309020205020404" pitchFamily="49" charset="0"/>
+              </a:rPr>
+              <a:t>T</a:t>
+            </a:r>
+            <a:r>
+              <a:rPr lang="en-GB" sz="2400" b="1" dirty="0" smtClean="0">
+                <a:solidFill>
+                  <a:srgbClr val="00B050"/>
+                </a:solidFill>
+                <a:latin typeface="Courier New" panose="02070309020205020404" pitchFamily="49" charset="0"/>
+                <a:cs typeface="Courier New" panose="02070309020205020404" pitchFamily="49" charset="0"/>
+              </a:rPr>
+              <a:t>C</a:t>
+            </a:r>
+            <a:r>
+              <a:rPr lang="en-GB" sz="2400" b="1" dirty="0">
+                <a:solidFill>
+                  <a:srgbClr val="7030A0"/>
+                </a:solidFill>
+                <a:latin typeface="Courier New" panose="02070309020205020404" pitchFamily="49" charset="0"/>
+                <a:cs typeface="Courier New" panose="02070309020205020404" pitchFamily="49" charset="0"/>
+              </a:rPr>
+              <a:t>AA</a:t>
+            </a:r>
+            <a:r>
+              <a:rPr lang="en-GB" sz="2400" b="1" dirty="0" smtClean="0">
+                <a:latin typeface="Courier New" panose="02070309020205020404" pitchFamily="49" charset="0"/>
+                <a:cs typeface="Courier New" panose="02070309020205020404" pitchFamily="49" charset="0"/>
+              </a:rPr>
+              <a:t>**</a:t>
+            </a:r>
+            <a:r>
+              <a:rPr lang="en-GB" sz="2400" b="1" dirty="0" smtClean="0">
+                <a:solidFill>
+                  <a:srgbClr val="92D050"/>
+                </a:solidFill>
+                <a:latin typeface="Courier New" panose="02070309020205020404" pitchFamily="49" charset="0"/>
+                <a:cs typeface="Courier New" panose="02070309020205020404" pitchFamily="49" charset="0"/>
+              </a:rPr>
+              <a:t>C</a:t>
+            </a:r>
+            <a:r>
+              <a:rPr lang="en-GB" sz="2400" b="1" dirty="0" smtClean="0">
+                <a:solidFill>
+                  <a:srgbClr val="FFFF00"/>
+                </a:solidFill>
+                <a:latin typeface="Courier New" panose="02070309020205020404" pitchFamily="49" charset="0"/>
+                <a:cs typeface="Courier New" panose="02070309020205020404" pitchFamily="49" charset="0"/>
+              </a:rPr>
+              <a:t>G</a:t>
+            </a:r>
+            <a:endParaRPr lang="en-GB" sz="2400" b="1" dirty="0">
+              <a:latin typeface="Courier New" panose="02070309020205020404" pitchFamily="49" charset="0"/>
+              <a:cs typeface="Courier New" panose="02070309020205020404" pitchFamily="49" charset="0"/>
+            </a:endParaRPr>
+          </a:p>
+        </p:txBody>
+      </p:sp>
+      <p:sp>
+        <p:nvSpPr>
+          <p:cNvPr id="16" name="TextBox 15"/>
+          <p:cNvSpPr txBox="1"/>
+          <p:nvPr/>
+        </p:nvSpPr>
+        <p:spPr>
+          <a:xfrm>
+            <a:off x="137515" y="2315536"/>
+            <a:ext cx="907621" cy="646331"/>
+          </a:xfrm>
+          <a:prstGeom prst="rect">
+            <a:avLst/>
+          </a:prstGeom>
+          <a:solidFill>
+            <a:schemeClr val="accent3">
+              <a:lumMod val="20000"/>
+              <a:lumOff val="80000"/>
+            </a:schemeClr>
+          </a:solidFill>
+        </p:spPr>
+        <p:txBody>
+          <a:bodyPr wrap="none" rtlCol="0">
+            <a:spAutoFit/>
+          </a:bodyPr>
+          <a:lstStyle/>
+          <a:p>
+            <a:r>
+              <a:rPr lang="en-GB" b="1" dirty="0" smtClean="0"/>
+              <a:t>Aligned</a:t>
+            </a:r>
+          </a:p>
+          <a:p>
+            <a:r>
+              <a:rPr lang="en-GB" b="1" dirty="0" smtClean="0"/>
+              <a:t>Reads</a:t>
+            </a:r>
+            <a:endParaRPr lang="en-GB" b="1" dirty="0"/>
+          </a:p>
+        </p:txBody>
+      </p:sp>
+      <p:sp>
+        <p:nvSpPr>
+          <p:cNvPr id="17" name="TextBox 16"/>
+          <p:cNvSpPr txBox="1"/>
+          <p:nvPr/>
+        </p:nvSpPr>
+        <p:spPr>
+          <a:xfrm>
+            <a:off x="137515" y="4439082"/>
+            <a:ext cx="1189749" cy="369332"/>
+          </a:xfrm>
+          <a:prstGeom prst="rect">
+            <a:avLst/>
+          </a:prstGeom>
+          <a:solidFill>
+            <a:schemeClr val="accent3">
+              <a:lumMod val="20000"/>
+              <a:lumOff val="80000"/>
+            </a:schemeClr>
+          </a:solidFill>
+        </p:spPr>
+        <p:txBody>
+          <a:bodyPr wrap="none" rtlCol="0">
+            <a:spAutoFit/>
+          </a:bodyPr>
+          <a:lstStyle/>
+          <a:p>
+            <a:r>
+              <a:rPr lang="en-GB" b="1" dirty="0" smtClean="0"/>
+              <a:t>Consensus</a:t>
+            </a:r>
+            <a:endParaRPr lang="en-GB" b="1" dirty="0"/>
+          </a:p>
+        </p:txBody>
+      </p:sp>
+      <p:sp>
+        <p:nvSpPr>
+          <p:cNvPr id="18" name="TextBox 17"/>
+          <p:cNvSpPr txBox="1"/>
+          <p:nvPr/>
+        </p:nvSpPr>
+        <p:spPr>
+          <a:xfrm>
+            <a:off x="137515" y="5297597"/>
+            <a:ext cx="11773436" cy="461665"/>
+          </a:xfrm>
+          <a:prstGeom prst="rect">
+            <a:avLst/>
+          </a:prstGeom>
+          <a:solidFill>
+            <a:schemeClr val="accent2">
+              <a:lumMod val="40000"/>
+              <a:lumOff val="60000"/>
+            </a:schemeClr>
+          </a:solidFill>
+        </p:spPr>
+        <p:txBody>
+          <a:bodyPr wrap="square" rtlCol="0">
+            <a:spAutoFit/>
+          </a:bodyPr>
+          <a:lstStyle/>
+          <a:p>
+            <a:pPr algn="just"/>
+            <a:r>
+              <a:rPr lang="en-GB" sz="2400" dirty="0" smtClean="0"/>
+              <a:t>All </a:t>
+            </a:r>
+            <a:r>
+              <a:rPr lang="en-GB" sz="2400" b="1" dirty="0" smtClean="0"/>
+              <a:t>Gaps</a:t>
+            </a:r>
+            <a:r>
+              <a:rPr lang="en-GB" sz="2400" dirty="0" smtClean="0"/>
+              <a:t> in </a:t>
+            </a:r>
+            <a:r>
+              <a:rPr lang="en-GB" sz="2400" b="1" dirty="0" smtClean="0"/>
+              <a:t>Reads</a:t>
+            </a:r>
+            <a:r>
+              <a:rPr lang="en-GB" sz="2400" dirty="0" smtClean="0"/>
+              <a:t> can be regarded as </a:t>
+            </a:r>
+            <a:r>
+              <a:rPr lang="en-GB" sz="2400" b="1" dirty="0" smtClean="0"/>
+              <a:t>Deletions</a:t>
+            </a:r>
+            <a:r>
+              <a:rPr lang="en-GB" sz="2400" dirty="0" smtClean="0"/>
+              <a:t> (as in the </a:t>
+            </a:r>
+            <a:r>
+              <a:rPr lang="en-GB" sz="2400" b="1" dirty="0" smtClean="0"/>
+              <a:t>Consensus</a:t>
+            </a:r>
+            <a:r>
+              <a:rPr lang="en-GB" sz="2400" dirty="0" smtClean="0"/>
+              <a:t>)</a:t>
+            </a:r>
+            <a:endParaRPr lang="en-GB" sz="2400" b="1" dirty="0"/>
+          </a:p>
+        </p:txBody>
+      </p:sp>
+      <p:sp>
+        <p:nvSpPr>
+          <p:cNvPr id="19" name="TextBox 18"/>
+          <p:cNvSpPr txBox="1"/>
+          <p:nvPr/>
+        </p:nvSpPr>
+        <p:spPr>
+          <a:xfrm>
+            <a:off x="7175111" y="3347288"/>
+            <a:ext cx="2075797" cy="461665"/>
+          </a:xfrm>
+          <a:prstGeom prst="rect">
+            <a:avLst/>
+          </a:prstGeom>
+          <a:solidFill>
+            <a:schemeClr val="accent3">
+              <a:lumMod val="40000"/>
+              <a:lumOff val="60000"/>
+            </a:schemeClr>
+          </a:solidFill>
+        </p:spPr>
+        <p:txBody>
+          <a:bodyPr wrap="square" rtlCol="0">
+            <a:spAutoFit/>
+          </a:bodyPr>
+          <a:lstStyle/>
+          <a:p>
+            <a:r>
+              <a:rPr lang="en-GB" sz="2400" b="1" dirty="0" smtClean="0">
+                <a:solidFill>
+                  <a:schemeClr val="bg1"/>
+                </a:solidFill>
+                <a:latin typeface="Courier New" panose="02070309020205020404" pitchFamily="49" charset="0"/>
+                <a:cs typeface="Courier New" panose="02070309020205020404" pitchFamily="49" charset="0"/>
+              </a:rPr>
+              <a:t>5M4D5M3D2M</a:t>
+            </a:r>
+            <a:endParaRPr lang="en-GB" sz="2400" b="1" dirty="0">
+              <a:solidFill>
+                <a:schemeClr val="bg1"/>
+              </a:solidFill>
+              <a:latin typeface="Courier New" panose="02070309020205020404" pitchFamily="49" charset="0"/>
+              <a:cs typeface="Courier New" panose="02070309020205020404" pitchFamily="49" charset="0"/>
+            </a:endParaRPr>
+          </a:p>
+        </p:txBody>
+      </p:sp>
+      <p:sp>
+        <p:nvSpPr>
+          <p:cNvPr id="20" name="TextBox 19"/>
+          <p:cNvSpPr txBox="1"/>
+          <p:nvPr/>
+        </p:nvSpPr>
+        <p:spPr>
+          <a:xfrm>
+            <a:off x="7175111" y="3864233"/>
+            <a:ext cx="2075797" cy="461665"/>
+          </a:xfrm>
+          <a:prstGeom prst="rect">
+            <a:avLst/>
+          </a:prstGeom>
+          <a:solidFill>
+            <a:schemeClr val="accent3">
+              <a:lumMod val="40000"/>
+              <a:lumOff val="60000"/>
+            </a:schemeClr>
+          </a:solidFill>
+        </p:spPr>
+        <p:txBody>
+          <a:bodyPr wrap="square" rtlCol="0">
+            <a:spAutoFit/>
+          </a:bodyPr>
+          <a:lstStyle/>
+          <a:p>
+            <a:r>
+              <a:rPr lang="en-GB" sz="2400" b="1" dirty="0" smtClean="0">
+                <a:solidFill>
+                  <a:schemeClr val="bg1"/>
+                </a:solidFill>
+                <a:latin typeface="Courier New" panose="02070309020205020404" pitchFamily="49" charset="0"/>
+                <a:cs typeface="Courier New" panose="02070309020205020404" pitchFamily="49" charset="0"/>
+              </a:rPr>
+              <a:t>3M1D9M</a:t>
+            </a:r>
+            <a:endParaRPr lang="en-GB" sz="2400" b="1" dirty="0">
+              <a:solidFill>
+                <a:schemeClr val="bg1"/>
+              </a:solidFill>
+              <a:latin typeface="Courier New" panose="02070309020205020404" pitchFamily="49" charset="0"/>
+              <a:cs typeface="Courier New" panose="02070309020205020404" pitchFamily="49" charset="0"/>
+            </a:endParaRPr>
+          </a:p>
+        </p:txBody>
+      </p:sp>
+      <p:sp>
+        <p:nvSpPr>
+          <p:cNvPr id="22" name="TextBox 21"/>
+          <p:cNvSpPr txBox="1"/>
+          <p:nvPr/>
+        </p:nvSpPr>
+        <p:spPr>
+          <a:xfrm>
+            <a:off x="9797511" y="1277525"/>
+            <a:ext cx="2075796" cy="461665"/>
+          </a:xfrm>
+          <a:prstGeom prst="rect">
+            <a:avLst/>
+          </a:prstGeom>
+          <a:solidFill>
+            <a:schemeClr val="accent3">
+              <a:lumMod val="40000"/>
+              <a:lumOff val="60000"/>
+            </a:schemeClr>
+          </a:solidFill>
+        </p:spPr>
+        <p:txBody>
+          <a:bodyPr wrap="square" rtlCol="0">
+            <a:spAutoFit/>
+          </a:bodyPr>
+          <a:lstStyle/>
+          <a:p>
+            <a:r>
+              <a:rPr lang="en-GB" sz="2400" b="1" dirty="0" smtClean="0">
+                <a:solidFill>
+                  <a:schemeClr val="bg1"/>
+                </a:solidFill>
+                <a:latin typeface="Courier New" panose="02070309020205020404" pitchFamily="49" charset="0"/>
+                <a:cs typeface="Courier New" panose="02070309020205020404" pitchFamily="49" charset="0"/>
+              </a:rPr>
+              <a:t>18M</a:t>
+            </a:r>
+            <a:endParaRPr lang="en-GB" sz="2400" b="1" dirty="0">
+              <a:solidFill>
+                <a:schemeClr val="bg1"/>
+              </a:solidFill>
+              <a:latin typeface="Courier New" panose="02070309020205020404" pitchFamily="49" charset="0"/>
+              <a:cs typeface="Courier New" panose="02070309020205020404" pitchFamily="49" charset="0"/>
+            </a:endParaRPr>
+          </a:p>
+        </p:txBody>
+      </p:sp>
+      <p:sp>
+        <p:nvSpPr>
+          <p:cNvPr id="23" name="TextBox 22"/>
+          <p:cNvSpPr txBox="1"/>
+          <p:nvPr/>
+        </p:nvSpPr>
+        <p:spPr>
+          <a:xfrm>
+            <a:off x="9797511" y="1794472"/>
+            <a:ext cx="2075796" cy="461665"/>
+          </a:xfrm>
+          <a:prstGeom prst="rect">
+            <a:avLst/>
+          </a:prstGeom>
+          <a:solidFill>
+            <a:schemeClr val="accent3">
+              <a:lumMod val="40000"/>
+              <a:lumOff val="60000"/>
+            </a:schemeClr>
+          </a:solidFill>
+        </p:spPr>
+        <p:txBody>
+          <a:bodyPr wrap="square" rtlCol="0">
+            <a:spAutoFit/>
+          </a:bodyPr>
+          <a:lstStyle/>
+          <a:p>
+            <a:r>
+              <a:rPr lang="en-GB" sz="2400" b="1" dirty="0" smtClean="0">
+                <a:solidFill>
+                  <a:schemeClr val="bg1"/>
+                </a:solidFill>
+                <a:latin typeface="Courier New" panose="02070309020205020404" pitchFamily="49" charset="0"/>
+                <a:cs typeface="Courier New" panose="02070309020205020404" pitchFamily="49" charset="0"/>
+              </a:rPr>
+              <a:t>16M</a:t>
+            </a:r>
+            <a:endParaRPr lang="en-GB" sz="2400" b="1" dirty="0">
+              <a:solidFill>
+                <a:schemeClr val="bg1"/>
+              </a:solidFill>
+              <a:latin typeface="Courier New" panose="02070309020205020404" pitchFamily="49" charset="0"/>
+              <a:cs typeface="Courier New" panose="02070309020205020404" pitchFamily="49" charset="0"/>
+            </a:endParaRPr>
+          </a:p>
+        </p:txBody>
+      </p:sp>
+      <p:sp>
+        <p:nvSpPr>
+          <p:cNvPr id="24" name="TextBox 23"/>
+          <p:cNvSpPr txBox="1"/>
+          <p:nvPr/>
+        </p:nvSpPr>
+        <p:spPr>
+          <a:xfrm>
+            <a:off x="9797511" y="2311419"/>
+            <a:ext cx="2075796" cy="461665"/>
+          </a:xfrm>
+          <a:prstGeom prst="rect">
+            <a:avLst/>
+          </a:prstGeom>
+          <a:solidFill>
+            <a:schemeClr val="accent3">
+              <a:lumMod val="40000"/>
+              <a:lumOff val="60000"/>
+            </a:schemeClr>
+          </a:solidFill>
+        </p:spPr>
+        <p:txBody>
+          <a:bodyPr wrap="square" rtlCol="0">
+            <a:spAutoFit/>
+          </a:bodyPr>
+          <a:lstStyle/>
+          <a:p>
+            <a:r>
+              <a:rPr lang="en-GB" sz="2400" b="1" dirty="0" smtClean="0">
+                <a:solidFill>
+                  <a:schemeClr val="bg1"/>
+                </a:solidFill>
+                <a:latin typeface="Courier New" panose="02070309020205020404" pitchFamily="49" charset="0"/>
+                <a:cs typeface="Courier New" panose="02070309020205020404" pitchFamily="49" charset="0"/>
+              </a:rPr>
+              <a:t>12M</a:t>
+            </a:r>
+            <a:endParaRPr lang="en-GB" sz="2400" b="1" dirty="0">
+              <a:solidFill>
+                <a:schemeClr val="bg1"/>
+              </a:solidFill>
+              <a:latin typeface="Courier New" panose="02070309020205020404" pitchFamily="49" charset="0"/>
+              <a:cs typeface="Courier New" panose="02070309020205020404" pitchFamily="49" charset="0"/>
+            </a:endParaRPr>
+          </a:p>
+        </p:txBody>
+      </p:sp>
+      <p:sp>
+        <p:nvSpPr>
+          <p:cNvPr id="25" name="TextBox 24"/>
+          <p:cNvSpPr txBox="1"/>
+          <p:nvPr/>
+        </p:nvSpPr>
+        <p:spPr>
+          <a:xfrm>
+            <a:off x="9797511" y="2828366"/>
+            <a:ext cx="2075796" cy="461665"/>
+          </a:xfrm>
+          <a:prstGeom prst="rect">
+            <a:avLst/>
+          </a:prstGeom>
+          <a:solidFill>
+            <a:schemeClr val="accent3">
+              <a:lumMod val="40000"/>
+              <a:lumOff val="60000"/>
+            </a:schemeClr>
+          </a:solidFill>
+        </p:spPr>
+        <p:txBody>
+          <a:bodyPr wrap="square" rtlCol="0">
+            <a:spAutoFit/>
+          </a:bodyPr>
+          <a:lstStyle/>
+          <a:p>
+            <a:r>
+              <a:rPr lang="en-GB" sz="2400" b="1" dirty="0" smtClean="0">
+                <a:solidFill>
+                  <a:schemeClr val="bg1"/>
+                </a:solidFill>
+                <a:latin typeface="Courier New" panose="02070309020205020404" pitchFamily="49" charset="0"/>
+                <a:cs typeface="Courier New" panose="02070309020205020404" pitchFamily="49" charset="0"/>
+              </a:rPr>
+              <a:t>5M3P151I1M</a:t>
+            </a:r>
+            <a:endParaRPr lang="en-GB" sz="2400" b="1" dirty="0">
+              <a:solidFill>
+                <a:schemeClr val="bg1"/>
+              </a:solidFill>
+              <a:latin typeface="Courier New" panose="02070309020205020404" pitchFamily="49" charset="0"/>
+              <a:cs typeface="Courier New" panose="02070309020205020404" pitchFamily="49" charset="0"/>
+            </a:endParaRPr>
+          </a:p>
+        </p:txBody>
+      </p:sp>
+      <p:sp>
+        <p:nvSpPr>
+          <p:cNvPr id="26" name="TextBox 25"/>
+          <p:cNvSpPr txBox="1"/>
+          <p:nvPr/>
+        </p:nvSpPr>
+        <p:spPr>
+          <a:xfrm>
+            <a:off x="9797511" y="3345313"/>
+            <a:ext cx="2075797" cy="461665"/>
+          </a:xfrm>
+          <a:prstGeom prst="rect">
+            <a:avLst/>
+          </a:prstGeom>
+          <a:solidFill>
+            <a:schemeClr val="accent3">
+              <a:lumMod val="40000"/>
+              <a:lumOff val="60000"/>
+            </a:schemeClr>
+          </a:solidFill>
+        </p:spPr>
+        <p:txBody>
+          <a:bodyPr wrap="square" rtlCol="0">
+            <a:spAutoFit/>
+          </a:bodyPr>
+          <a:lstStyle/>
+          <a:p>
+            <a:r>
+              <a:rPr lang="en-GB" sz="2400" b="1" dirty="0" smtClean="0">
+                <a:solidFill>
+                  <a:schemeClr val="bg1"/>
+                </a:solidFill>
+                <a:latin typeface="Courier New" panose="02070309020205020404" pitchFamily="49" charset="0"/>
+                <a:cs typeface="Courier New" panose="02070309020205020404" pitchFamily="49" charset="0"/>
+              </a:rPr>
+              <a:t>11M</a:t>
+            </a:r>
+          </a:p>
+        </p:txBody>
+      </p:sp>
+      <p:sp>
+        <p:nvSpPr>
+          <p:cNvPr id="27" name="TextBox 26"/>
+          <p:cNvSpPr txBox="1"/>
+          <p:nvPr/>
+        </p:nvSpPr>
+        <p:spPr>
+          <a:xfrm>
+            <a:off x="9797511" y="3862258"/>
+            <a:ext cx="2075797" cy="461665"/>
+          </a:xfrm>
+          <a:prstGeom prst="rect">
+            <a:avLst/>
+          </a:prstGeom>
+          <a:solidFill>
+            <a:schemeClr val="accent3">
+              <a:lumMod val="40000"/>
+              <a:lumOff val="60000"/>
+            </a:schemeClr>
+          </a:solidFill>
+        </p:spPr>
+        <p:txBody>
+          <a:bodyPr wrap="square" rtlCol="0">
+            <a:spAutoFit/>
+          </a:bodyPr>
+          <a:lstStyle/>
+          <a:p>
+            <a:r>
+              <a:rPr lang="en-GB" sz="2400" b="1" dirty="0" smtClean="0">
+                <a:solidFill>
+                  <a:schemeClr val="bg1"/>
+                </a:solidFill>
+                <a:latin typeface="Courier New" panose="02070309020205020404" pitchFamily="49" charset="0"/>
+                <a:cs typeface="Courier New" panose="02070309020205020404" pitchFamily="49" charset="0"/>
+              </a:rPr>
+              <a:t>3M1P2IM7M</a:t>
+            </a:r>
+            <a:endParaRPr lang="en-GB" sz="2400" b="1" dirty="0">
+              <a:solidFill>
+                <a:schemeClr val="bg1"/>
+              </a:solidFill>
+              <a:latin typeface="Courier New" panose="02070309020205020404" pitchFamily="49" charset="0"/>
+              <a:cs typeface="Courier New" panose="02070309020205020404" pitchFamily="49" charset="0"/>
+            </a:endParaRPr>
+          </a:p>
+        </p:txBody>
+      </p:sp>
+      <p:sp>
+        <p:nvSpPr>
+          <p:cNvPr id="28" name="TextBox 27"/>
+          <p:cNvSpPr txBox="1"/>
+          <p:nvPr/>
+        </p:nvSpPr>
+        <p:spPr>
+          <a:xfrm>
+            <a:off x="10203666" y="4377732"/>
+            <a:ext cx="1297150" cy="707886"/>
+          </a:xfrm>
+          <a:prstGeom prst="rect">
+            <a:avLst/>
+          </a:prstGeom>
+          <a:solidFill>
+            <a:schemeClr val="accent3">
+              <a:lumMod val="20000"/>
+              <a:lumOff val="80000"/>
+            </a:schemeClr>
+          </a:solidFill>
+        </p:spPr>
+        <p:txBody>
+          <a:bodyPr wrap="none" rtlCol="0">
+            <a:spAutoFit/>
+          </a:bodyPr>
+          <a:lstStyle/>
+          <a:p>
+            <a:r>
+              <a:rPr lang="en-GB" sz="2000" b="1" dirty="0" smtClean="0"/>
+              <a:t>Unp</a:t>
+            </a:r>
+            <a:r>
+              <a:rPr lang="en-GB" sz="2000" b="1" dirty="0" smtClean="0"/>
+              <a:t>added</a:t>
+            </a:r>
+          </a:p>
+          <a:p>
+            <a:r>
+              <a:rPr lang="en-GB" sz="2000" b="1" dirty="0" smtClean="0"/>
+              <a:t>CIGARs</a:t>
+            </a:r>
+            <a:endParaRPr lang="en-GB" sz="2000" b="1" dirty="0"/>
+          </a:p>
+        </p:txBody>
+      </p:sp>
     </p:spTree>
     <p:extLst>
       <p:ext uri="{BB962C8B-B14F-4D97-AF65-F5344CB8AC3E}">
@@ -18793,9 +20741,1050 @@
   <p:timing>
     <p:tnLst>
       <p:par>
-        <p:cTn id="1" dur="indefinite" restart="never" nodeType="tmRoot"/>
+        <p:cTn id="1" dur="indefinite" restart="never" nodeType="tmRoot">
+          <p:childTnLst>
+            <p:seq concurrent="1" nextAc="seek">
+              <p:cTn id="2" dur="indefinite" nodeType="mainSeq">
+                <p:childTnLst>
+                  <p:par>
+                    <p:cTn id="3" fill="hold">
+                      <p:stCondLst>
+                        <p:cond delay="indefinite"/>
+                        <p:cond evt="onBegin" delay="0">
+                          <p:tn val="2"/>
+                        </p:cond>
+                      </p:stCondLst>
+                      <p:childTnLst>
+                        <p:par>
+                          <p:cTn id="4" fill="hold">
+                            <p:stCondLst>
+                              <p:cond delay="0"/>
+                            </p:stCondLst>
+                            <p:childTnLst>
+                              <p:par>
+                                <p:cTn id="5" presetID="22" presetClass="entr" presetSubtype="8" fill="hold" grpId="0" nodeType="withEffect">
+                                  <p:stCondLst>
+                                    <p:cond delay="0"/>
+                                  </p:stCondLst>
+                                  <p:childTnLst>
+                                    <p:set>
+                                      <p:cBhvr>
+                                        <p:cTn id="6" dur="1" fill="hold">
+                                          <p:stCondLst>
+                                            <p:cond delay="0"/>
+                                          </p:stCondLst>
+                                        </p:cTn>
+                                        <p:tgtEl>
+                                          <p:spTgt spid="3"/>
+                                        </p:tgtEl>
+                                        <p:attrNameLst>
+                                          <p:attrName>style.visibility</p:attrName>
+                                        </p:attrNameLst>
+                                      </p:cBhvr>
+                                      <p:to>
+                                        <p:strVal val="visible"/>
+                                      </p:to>
+                                    </p:set>
+                                    <p:animEffect transition="in" filter="wipe(left)">
+                                      <p:cBhvr>
+                                        <p:cTn id="7" dur="2000"/>
+                                        <p:tgtEl>
+                                          <p:spTgt spid="3"/>
+                                        </p:tgtEl>
+                                      </p:cBhvr>
+                                    </p:animEffect>
+                                  </p:childTnLst>
+                                </p:cTn>
+                              </p:par>
+                            </p:childTnLst>
+                          </p:cTn>
+                        </p:par>
+                        <p:par>
+                          <p:cTn id="8" fill="hold">
+                            <p:stCondLst>
+                              <p:cond delay="2000"/>
+                            </p:stCondLst>
+                            <p:childTnLst>
+                              <p:par>
+                                <p:cTn id="9" presetID="22" presetClass="entr" presetSubtype="8" fill="hold" grpId="0" nodeType="afterEffect">
+                                  <p:stCondLst>
+                                    <p:cond delay="0"/>
+                                  </p:stCondLst>
+                                  <p:childTnLst>
+                                    <p:set>
+                                      <p:cBhvr>
+                                        <p:cTn id="10" dur="1" fill="hold">
+                                          <p:stCondLst>
+                                            <p:cond delay="0"/>
+                                          </p:stCondLst>
+                                        </p:cTn>
+                                        <p:tgtEl>
+                                          <p:spTgt spid="16"/>
+                                        </p:tgtEl>
+                                        <p:attrNameLst>
+                                          <p:attrName>style.visibility</p:attrName>
+                                        </p:attrNameLst>
+                                      </p:cBhvr>
+                                      <p:to>
+                                        <p:strVal val="visible"/>
+                                      </p:to>
+                                    </p:set>
+                                    <p:animEffect transition="in" filter="wipe(left)">
+                                      <p:cBhvr>
+                                        <p:cTn id="11" dur="2000"/>
+                                        <p:tgtEl>
+                                          <p:spTgt spid="16"/>
+                                        </p:tgtEl>
+                                      </p:cBhvr>
+                                    </p:animEffect>
+                                  </p:childTnLst>
+                                </p:cTn>
+                              </p:par>
+                              <p:par>
+                                <p:cTn id="12" presetID="22" presetClass="entr" presetSubtype="8" fill="hold" grpId="0" nodeType="withEffect">
+                                  <p:stCondLst>
+                                    <p:cond delay="0"/>
+                                  </p:stCondLst>
+                                  <p:childTnLst>
+                                    <p:set>
+                                      <p:cBhvr>
+                                        <p:cTn id="13" dur="1" fill="hold">
+                                          <p:stCondLst>
+                                            <p:cond delay="0"/>
+                                          </p:stCondLst>
+                                        </p:cTn>
+                                        <p:tgtEl>
+                                          <p:spTgt spid="17"/>
+                                        </p:tgtEl>
+                                        <p:attrNameLst>
+                                          <p:attrName>style.visibility</p:attrName>
+                                        </p:attrNameLst>
+                                      </p:cBhvr>
+                                      <p:to>
+                                        <p:strVal val="visible"/>
+                                      </p:to>
+                                    </p:set>
+                                    <p:animEffect transition="in" filter="wipe(left)">
+                                      <p:cBhvr>
+                                        <p:cTn id="14" dur="2000"/>
+                                        <p:tgtEl>
+                                          <p:spTgt spid="17"/>
+                                        </p:tgtEl>
+                                      </p:cBhvr>
+                                    </p:animEffect>
+                                  </p:childTnLst>
+                                </p:cTn>
+                              </p:par>
+                            </p:childTnLst>
+                          </p:cTn>
+                        </p:par>
+                        <p:par>
+                          <p:cTn id="15" fill="hold">
+                            <p:stCondLst>
+                              <p:cond delay="4000"/>
+                            </p:stCondLst>
+                            <p:childTnLst>
+                              <p:par>
+                                <p:cTn id="16" presetID="22" presetClass="entr" presetSubtype="8" fill="hold" grpId="0" nodeType="afterEffect">
+                                  <p:stCondLst>
+                                    <p:cond delay="0"/>
+                                  </p:stCondLst>
+                                  <p:childTnLst>
+                                    <p:set>
+                                      <p:cBhvr>
+                                        <p:cTn id="17" dur="1" fill="hold">
+                                          <p:stCondLst>
+                                            <p:cond delay="0"/>
+                                          </p:stCondLst>
+                                        </p:cTn>
+                                        <p:tgtEl>
+                                          <p:spTgt spid="9"/>
+                                        </p:tgtEl>
+                                        <p:attrNameLst>
+                                          <p:attrName>style.visibility</p:attrName>
+                                        </p:attrNameLst>
+                                      </p:cBhvr>
+                                      <p:to>
+                                        <p:strVal val="visible"/>
+                                      </p:to>
+                                    </p:set>
+                                    <p:animEffect transition="in" filter="wipe(left)">
+                                      <p:cBhvr>
+                                        <p:cTn id="18" dur="2000"/>
+                                        <p:tgtEl>
+                                          <p:spTgt spid="9"/>
+                                        </p:tgtEl>
+                                      </p:cBhvr>
+                                    </p:animEffect>
+                                  </p:childTnLst>
+                                </p:cTn>
+                              </p:par>
+                              <p:par>
+                                <p:cTn id="19" presetID="22" presetClass="entr" presetSubtype="8" fill="hold" grpId="0" nodeType="withEffect">
+                                  <p:stCondLst>
+                                    <p:cond delay="0"/>
+                                  </p:stCondLst>
+                                  <p:childTnLst>
+                                    <p:set>
+                                      <p:cBhvr>
+                                        <p:cTn id="20" dur="1" fill="hold">
+                                          <p:stCondLst>
+                                            <p:cond delay="0"/>
+                                          </p:stCondLst>
+                                        </p:cTn>
+                                        <p:tgtEl>
+                                          <p:spTgt spid="10"/>
+                                        </p:tgtEl>
+                                        <p:attrNameLst>
+                                          <p:attrName>style.visibility</p:attrName>
+                                        </p:attrNameLst>
+                                      </p:cBhvr>
+                                      <p:to>
+                                        <p:strVal val="visible"/>
+                                      </p:to>
+                                    </p:set>
+                                    <p:animEffect transition="in" filter="wipe(left)">
+                                      <p:cBhvr>
+                                        <p:cTn id="21" dur="2000"/>
+                                        <p:tgtEl>
+                                          <p:spTgt spid="10"/>
+                                        </p:tgtEl>
+                                      </p:cBhvr>
+                                    </p:animEffect>
+                                  </p:childTnLst>
+                                </p:cTn>
+                              </p:par>
+                              <p:par>
+                                <p:cTn id="22" presetID="22" presetClass="entr" presetSubtype="8" fill="hold" grpId="0" nodeType="withEffect">
+                                  <p:stCondLst>
+                                    <p:cond delay="0"/>
+                                  </p:stCondLst>
+                                  <p:childTnLst>
+                                    <p:set>
+                                      <p:cBhvr>
+                                        <p:cTn id="23" dur="1" fill="hold">
+                                          <p:stCondLst>
+                                            <p:cond delay="0"/>
+                                          </p:stCondLst>
+                                        </p:cTn>
+                                        <p:tgtEl>
+                                          <p:spTgt spid="11"/>
+                                        </p:tgtEl>
+                                        <p:attrNameLst>
+                                          <p:attrName>style.visibility</p:attrName>
+                                        </p:attrNameLst>
+                                      </p:cBhvr>
+                                      <p:to>
+                                        <p:strVal val="visible"/>
+                                      </p:to>
+                                    </p:set>
+                                    <p:animEffect transition="in" filter="wipe(left)">
+                                      <p:cBhvr>
+                                        <p:cTn id="24" dur="2000"/>
+                                        <p:tgtEl>
+                                          <p:spTgt spid="11"/>
+                                        </p:tgtEl>
+                                      </p:cBhvr>
+                                    </p:animEffect>
+                                  </p:childTnLst>
+                                </p:cTn>
+                              </p:par>
+                              <p:par>
+                                <p:cTn id="25" presetID="22" presetClass="entr" presetSubtype="8" fill="hold" grpId="0" nodeType="withEffect">
+                                  <p:stCondLst>
+                                    <p:cond delay="0"/>
+                                  </p:stCondLst>
+                                  <p:childTnLst>
+                                    <p:set>
+                                      <p:cBhvr>
+                                        <p:cTn id="26" dur="1" fill="hold">
+                                          <p:stCondLst>
+                                            <p:cond delay="0"/>
+                                          </p:stCondLst>
+                                        </p:cTn>
+                                        <p:tgtEl>
+                                          <p:spTgt spid="12"/>
+                                        </p:tgtEl>
+                                        <p:attrNameLst>
+                                          <p:attrName>style.visibility</p:attrName>
+                                        </p:attrNameLst>
+                                      </p:cBhvr>
+                                      <p:to>
+                                        <p:strVal val="visible"/>
+                                      </p:to>
+                                    </p:set>
+                                    <p:animEffect transition="in" filter="wipe(left)">
+                                      <p:cBhvr>
+                                        <p:cTn id="27" dur="2000"/>
+                                        <p:tgtEl>
+                                          <p:spTgt spid="12"/>
+                                        </p:tgtEl>
+                                      </p:cBhvr>
+                                    </p:animEffect>
+                                  </p:childTnLst>
+                                </p:cTn>
+                              </p:par>
+                              <p:par>
+                                <p:cTn id="28" presetID="22" presetClass="entr" presetSubtype="8" fill="hold" grpId="0" nodeType="withEffect">
+                                  <p:stCondLst>
+                                    <p:cond delay="0"/>
+                                  </p:stCondLst>
+                                  <p:childTnLst>
+                                    <p:set>
+                                      <p:cBhvr>
+                                        <p:cTn id="29" dur="1" fill="hold">
+                                          <p:stCondLst>
+                                            <p:cond delay="0"/>
+                                          </p:stCondLst>
+                                        </p:cTn>
+                                        <p:tgtEl>
+                                          <p:spTgt spid="13"/>
+                                        </p:tgtEl>
+                                        <p:attrNameLst>
+                                          <p:attrName>style.visibility</p:attrName>
+                                        </p:attrNameLst>
+                                      </p:cBhvr>
+                                      <p:to>
+                                        <p:strVal val="visible"/>
+                                      </p:to>
+                                    </p:set>
+                                    <p:animEffect transition="in" filter="wipe(left)">
+                                      <p:cBhvr>
+                                        <p:cTn id="30" dur="2000"/>
+                                        <p:tgtEl>
+                                          <p:spTgt spid="13"/>
+                                        </p:tgtEl>
+                                      </p:cBhvr>
+                                    </p:animEffect>
+                                  </p:childTnLst>
+                                </p:cTn>
+                              </p:par>
+                              <p:par>
+                                <p:cTn id="31" presetID="22" presetClass="entr" presetSubtype="8" fill="hold" grpId="0" nodeType="withEffect">
+                                  <p:stCondLst>
+                                    <p:cond delay="0"/>
+                                  </p:stCondLst>
+                                  <p:childTnLst>
+                                    <p:set>
+                                      <p:cBhvr>
+                                        <p:cTn id="32" dur="1" fill="hold">
+                                          <p:stCondLst>
+                                            <p:cond delay="0"/>
+                                          </p:stCondLst>
+                                        </p:cTn>
+                                        <p:tgtEl>
+                                          <p:spTgt spid="14"/>
+                                        </p:tgtEl>
+                                        <p:attrNameLst>
+                                          <p:attrName>style.visibility</p:attrName>
+                                        </p:attrNameLst>
+                                      </p:cBhvr>
+                                      <p:to>
+                                        <p:strVal val="visible"/>
+                                      </p:to>
+                                    </p:set>
+                                    <p:animEffect transition="in" filter="wipe(left)">
+                                      <p:cBhvr>
+                                        <p:cTn id="33" dur="2000"/>
+                                        <p:tgtEl>
+                                          <p:spTgt spid="14"/>
+                                        </p:tgtEl>
+                                      </p:cBhvr>
+                                    </p:animEffect>
+                                  </p:childTnLst>
+                                </p:cTn>
+                              </p:par>
+                              <p:par>
+                                <p:cTn id="34" presetID="22" presetClass="entr" presetSubtype="8" fill="hold" grpId="0" nodeType="withEffect">
+                                  <p:stCondLst>
+                                    <p:cond delay="0"/>
+                                  </p:stCondLst>
+                                  <p:childTnLst>
+                                    <p:set>
+                                      <p:cBhvr>
+                                        <p:cTn id="35" dur="1" fill="hold">
+                                          <p:stCondLst>
+                                            <p:cond delay="0"/>
+                                          </p:stCondLst>
+                                        </p:cTn>
+                                        <p:tgtEl>
+                                          <p:spTgt spid="15"/>
+                                        </p:tgtEl>
+                                        <p:attrNameLst>
+                                          <p:attrName>style.visibility</p:attrName>
+                                        </p:attrNameLst>
+                                      </p:cBhvr>
+                                      <p:to>
+                                        <p:strVal val="visible"/>
+                                      </p:to>
+                                    </p:set>
+                                    <p:animEffect transition="in" filter="wipe(left)">
+                                      <p:cBhvr>
+                                        <p:cTn id="36" dur="2000"/>
+                                        <p:tgtEl>
+                                          <p:spTgt spid="15"/>
+                                        </p:tgtEl>
+                                      </p:cBhvr>
+                                    </p:animEffect>
+                                  </p:childTnLst>
+                                </p:cTn>
+                              </p:par>
+                            </p:childTnLst>
+                          </p:cTn>
+                        </p:par>
+                        <p:par>
+                          <p:cTn id="37" fill="hold">
+                            <p:stCondLst>
+                              <p:cond delay="6000"/>
+                            </p:stCondLst>
+                            <p:childTnLst>
+                              <p:par>
+                                <p:cTn id="38" presetID="22" presetClass="entr" presetSubtype="8" fill="hold" grpId="0" nodeType="afterEffect">
+                                  <p:stCondLst>
+                                    <p:cond delay="1000"/>
+                                  </p:stCondLst>
+                                  <p:childTnLst>
+                                    <p:set>
+                                      <p:cBhvr>
+                                        <p:cTn id="39" dur="1" fill="hold">
+                                          <p:stCondLst>
+                                            <p:cond delay="0"/>
+                                          </p:stCondLst>
+                                        </p:cTn>
+                                        <p:tgtEl>
+                                          <p:spTgt spid="18"/>
+                                        </p:tgtEl>
+                                        <p:attrNameLst>
+                                          <p:attrName>style.visibility</p:attrName>
+                                        </p:attrNameLst>
+                                      </p:cBhvr>
+                                      <p:to>
+                                        <p:strVal val="visible"/>
+                                      </p:to>
+                                    </p:set>
+                                    <p:animEffect transition="in" filter="wipe(left)">
+                                      <p:cBhvr>
+                                        <p:cTn id="40" dur="2000"/>
+                                        <p:tgtEl>
+                                          <p:spTgt spid="18"/>
+                                        </p:tgtEl>
+                                      </p:cBhvr>
+                                    </p:animEffect>
+                                  </p:childTnLst>
+                                </p:cTn>
+                              </p:par>
+                              <p:par>
+                                <p:cTn id="41" presetID="9" presetClass="emph" presetSubtype="0" grpId="1" nodeType="withEffect">
+                                  <p:stCondLst>
+                                    <p:cond delay="1000"/>
+                                  </p:stCondLst>
+                                  <p:childTnLst>
+                                    <p:set>
+                                      <p:cBhvr rctx="PPT">
+                                        <p:cTn id="42" dur="indefinite"/>
+                                        <p:tgtEl>
+                                          <p:spTgt spid="3"/>
+                                        </p:tgtEl>
+                                        <p:attrNameLst>
+                                          <p:attrName>style.opacity</p:attrName>
+                                        </p:attrNameLst>
+                                      </p:cBhvr>
+                                      <p:to>
+                                        <p:strVal val="0.35"/>
+                                      </p:to>
+                                    </p:set>
+                                    <p:animEffect filter="image" prLst="opacity: 0.35">
+                                      <p:cBhvr rctx="IE">
+                                        <p:cTn id="43" dur="indefinite"/>
+                                        <p:tgtEl>
+                                          <p:spTgt spid="3"/>
+                                        </p:tgtEl>
+                                      </p:cBhvr>
+                                    </p:animEffect>
+                                  </p:childTnLst>
+                                </p:cTn>
+                              </p:par>
+                            </p:childTnLst>
+                          </p:cTn>
+                        </p:par>
+                        <p:par>
+                          <p:cTn id="44" fill="hold">
+                            <p:stCondLst>
+                              <p:cond delay="9000"/>
+                            </p:stCondLst>
+                            <p:childTnLst>
+                              <p:par>
+                                <p:cTn id="45" presetID="22" presetClass="entr" presetSubtype="2" fill="hold" grpId="0" nodeType="afterEffect">
+                                  <p:stCondLst>
+                                    <p:cond delay="0"/>
+                                  </p:stCondLst>
+                                  <p:childTnLst>
+                                    <p:set>
+                                      <p:cBhvr>
+                                        <p:cTn id="46" dur="1" fill="hold">
+                                          <p:stCondLst>
+                                            <p:cond delay="0"/>
+                                          </p:stCondLst>
+                                        </p:cTn>
+                                        <p:tgtEl>
+                                          <p:spTgt spid="4"/>
+                                        </p:tgtEl>
+                                        <p:attrNameLst>
+                                          <p:attrName>style.visibility</p:attrName>
+                                        </p:attrNameLst>
+                                      </p:cBhvr>
+                                      <p:to>
+                                        <p:strVal val="visible"/>
+                                      </p:to>
+                                    </p:set>
+                                    <p:animEffect transition="in" filter="wipe(right)">
+                                      <p:cBhvr>
+                                        <p:cTn id="47" dur="2000"/>
+                                        <p:tgtEl>
+                                          <p:spTgt spid="4"/>
+                                        </p:tgtEl>
+                                      </p:cBhvr>
+                                    </p:animEffect>
+                                  </p:childTnLst>
+                                </p:cTn>
+                              </p:par>
+                            </p:childTnLst>
+                          </p:cTn>
+                        </p:par>
+                        <p:par>
+                          <p:cTn id="48" fill="hold">
+                            <p:stCondLst>
+                              <p:cond delay="11000"/>
+                            </p:stCondLst>
+                            <p:childTnLst>
+                              <p:par>
+                                <p:cTn id="49" presetID="22" presetClass="entr" presetSubtype="2" fill="hold" grpId="0" nodeType="afterEffect">
+                                  <p:stCondLst>
+                                    <p:cond delay="0"/>
+                                  </p:stCondLst>
+                                  <p:childTnLst>
+                                    <p:set>
+                                      <p:cBhvr>
+                                        <p:cTn id="50" dur="1" fill="hold">
+                                          <p:stCondLst>
+                                            <p:cond delay="0"/>
+                                          </p:stCondLst>
+                                        </p:cTn>
+                                        <p:tgtEl>
+                                          <p:spTgt spid="5"/>
+                                        </p:tgtEl>
+                                        <p:attrNameLst>
+                                          <p:attrName>style.visibility</p:attrName>
+                                        </p:attrNameLst>
+                                      </p:cBhvr>
+                                      <p:to>
+                                        <p:strVal val="visible"/>
+                                      </p:to>
+                                    </p:set>
+                                    <p:animEffect transition="in" filter="wipe(right)">
+                                      <p:cBhvr>
+                                        <p:cTn id="51" dur="2000"/>
+                                        <p:tgtEl>
+                                          <p:spTgt spid="5"/>
+                                        </p:tgtEl>
+                                      </p:cBhvr>
+                                    </p:animEffect>
+                                  </p:childTnLst>
+                                </p:cTn>
+                              </p:par>
+                              <p:par>
+                                <p:cTn id="52" presetID="22" presetClass="entr" presetSubtype="2" fill="hold" grpId="0" nodeType="withEffect">
+                                  <p:stCondLst>
+                                    <p:cond delay="0"/>
+                                  </p:stCondLst>
+                                  <p:childTnLst>
+                                    <p:set>
+                                      <p:cBhvr>
+                                        <p:cTn id="53" dur="1" fill="hold">
+                                          <p:stCondLst>
+                                            <p:cond delay="0"/>
+                                          </p:stCondLst>
+                                        </p:cTn>
+                                        <p:tgtEl>
+                                          <p:spTgt spid="6"/>
+                                        </p:tgtEl>
+                                        <p:attrNameLst>
+                                          <p:attrName>style.visibility</p:attrName>
+                                        </p:attrNameLst>
+                                      </p:cBhvr>
+                                      <p:to>
+                                        <p:strVal val="visible"/>
+                                      </p:to>
+                                    </p:set>
+                                    <p:animEffect transition="in" filter="wipe(right)">
+                                      <p:cBhvr>
+                                        <p:cTn id="54" dur="2000"/>
+                                        <p:tgtEl>
+                                          <p:spTgt spid="6"/>
+                                        </p:tgtEl>
+                                      </p:cBhvr>
+                                    </p:animEffect>
+                                  </p:childTnLst>
+                                </p:cTn>
+                              </p:par>
+                              <p:par>
+                                <p:cTn id="55" presetID="22" presetClass="entr" presetSubtype="2" fill="hold" grpId="0" nodeType="withEffect">
+                                  <p:stCondLst>
+                                    <p:cond delay="0"/>
+                                  </p:stCondLst>
+                                  <p:childTnLst>
+                                    <p:set>
+                                      <p:cBhvr>
+                                        <p:cTn id="56" dur="1" fill="hold">
+                                          <p:stCondLst>
+                                            <p:cond delay="0"/>
+                                          </p:stCondLst>
+                                        </p:cTn>
+                                        <p:tgtEl>
+                                          <p:spTgt spid="7"/>
+                                        </p:tgtEl>
+                                        <p:attrNameLst>
+                                          <p:attrName>style.visibility</p:attrName>
+                                        </p:attrNameLst>
+                                      </p:cBhvr>
+                                      <p:to>
+                                        <p:strVal val="visible"/>
+                                      </p:to>
+                                    </p:set>
+                                    <p:animEffect transition="in" filter="wipe(right)">
+                                      <p:cBhvr>
+                                        <p:cTn id="57" dur="2000"/>
+                                        <p:tgtEl>
+                                          <p:spTgt spid="7"/>
+                                        </p:tgtEl>
+                                      </p:cBhvr>
+                                    </p:animEffect>
+                                  </p:childTnLst>
+                                </p:cTn>
+                              </p:par>
+                              <p:par>
+                                <p:cTn id="58" presetID="22" presetClass="entr" presetSubtype="2" fill="hold" grpId="0" nodeType="withEffect">
+                                  <p:stCondLst>
+                                    <p:cond delay="0"/>
+                                  </p:stCondLst>
+                                  <p:childTnLst>
+                                    <p:set>
+                                      <p:cBhvr>
+                                        <p:cTn id="59" dur="1" fill="hold">
+                                          <p:stCondLst>
+                                            <p:cond delay="0"/>
+                                          </p:stCondLst>
+                                        </p:cTn>
+                                        <p:tgtEl>
+                                          <p:spTgt spid="8"/>
+                                        </p:tgtEl>
+                                        <p:attrNameLst>
+                                          <p:attrName>style.visibility</p:attrName>
+                                        </p:attrNameLst>
+                                      </p:cBhvr>
+                                      <p:to>
+                                        <p:strVal val="visible"/>
+                                      </p:to>
+                                    </p:set>
+                                    <p:animEffect transition="in" filter="wipe(right)">
+                                      <p:cBhvr>
+                                        <p:cTn id="60" dur="2000"/>
+                                        <p:tgtEl>
+                                          <p:spTgt spid="8"/>
+                                        </p:tgtEl>
+                                      </p:cBhvr>
+                                    </p:animEffect>
+                                  </p:childTnLst>
+                                </p:cTn>
+                              </p:par>
+                              <p:par>
+                                <p:cTn id="61" presetID="22" presetClass="entr" presetSubtype="2" fill="hold" grpId="0" nodeType="withEffect">
+                                  <p:stCondLst>
+                                    <p:cond delay="0"/>
+                                  </p:stCondLst>
+                                  <p:childTnLst>
+                                    <p:set>
+                                      <p:cBhvr>
+                                        <p:cTn id="62" dur="1" fill="hold">
+                                          <p:stCondLst>
+                                            <p:cond delay="0"/>
+                                          </p:stCondLst>
+                                        </p:cTn>
+                                        <p:tgtEl>
+                                          <p:spTgt spid="19"/>
+                                        </p:tgtEl>
+                                        <p:attrNameLst>
+                                          <p:attrName>style.visibility</p:attrName>
+                                        </p:attrNameLst>
+                                      </p:cBhvr>
+                                      <p:to>
+                                        <p:strVal val="visible"/>
+                                      </p:to>
+                                    </p:set>
+                                    <p:animEffect transition="in" filter="wipe(right)">
+                                      <p:cBhvr>
+                                        <p:cTn id="63" dur="2000"/>
+                                        <p:tgtEl>
+                                          <p:spTgt spid="19"/>
+                                        </p:tgtEl>
+                                      </p:cBhvr>
+                                    </p:animEffect>
+                                  </p:childTnLst>
+                                </p:cTn>
+                              </p:par>
+                              <p:par>
+                                <p:cTn id="64" presetID="22" presetClass="entr" presetSubtype="2" fill="hold" grpId="0" nodeType="withEffect">
+                                  <p:stCondLst>
+                                    <p:cond delay="0"/>
+                                  </p:stCondLst>
+                                  <p:childTnLst>
+                                    <p:set>
+                                      <p:cBhvr>
+                                        <p:cTn id="65" dur="1" fill="hold">
+                                          <p:stCondLst>
+                                            <p:cond delay="0"/>
+                                          </p:stCondLst>
+                                        </p:cTn>
+                                        <p:tgtEl>
+                                          <p:spTgt spid="20"/>
+                                        </p:tgtEl>
+                                        <p:attrNameLst>
+                                          <p:attrName>style.visibility</p:attrName>
+                                        </p:attrNameLst>
+                                      </p:cBhvr>
+                                      <p:to>
+                                        <p:strVal val="visible"/>
+                                      </p:to>
+                                    </p:set>
+                                    <p:animEffect transition="in" filter="wipe(right)">
+                                      <p:cBhvr>
+                                        <p:cTn id="66" dur="2000"/>
+                                        <p:tgtEl>
+                                          <p:spTgt spid="20"/>
+                                        </p:tgtEl>
+                                      </p:cBhvr>
+                                    </p:animEffect>
+                                  </p:childTnLst>
+                                </p:cTn>
+                              </p:par>
+                            </p:childTnLst>
+                          </p:cTn>
+                        </p:par>
+                        <p:par>
+                          <p:cTn id="67" fill="hold">
+                            <p:stCondLst>
+                              <p:cond delay="13000"/>
+                            </p:stCondLst>
+                            <p:childTnLst>
+                              <p:par>
+                                <p:cTn id="68" presetID="22" presetClass="entr" presetSubtype="2" fill="hold" grpId="0" nodeType="afterEffect">
+                                  <p:stCondLst>
+                                    <p:cond delay="0"/>
+                                  </p:stCondLst>
+                                  <p:childTnLst>
+                                    <p:set>
+                                      <p:cBhvr>
+                                        <p:cTn id="69" dur="1" fill="hold">
+                                          <p:stCondLst>
+                                            <p:cond delay="0"/>
+                                          </p:stCondLst>
+                                        </p:cTn>
+                                        <p:tgtEl>
+                                          <p:spTgt spid="22"/>
+                                        </p:tgtEl>
+                                        <p:attrNameLst>
+                                          <p:attrName>style.visibility</p:attrName>
+                                        </p:attrNameLst>
+                                      </p:cBhvr>
+                                      <p:to>
+                                        <p:strVal val="visible"/>
+                                      </p:to>
+                                    </p:set>
+                                    <p:animEffect transition="in" filter="wipe(right)">
+                                      <p:cBhvr>
+                                        <p:cTn id="70" dur="2000"/>
+                                        <p:tgtEl>
+                                          <p:spTgt spid="22"/>
+                                        </p:tgtEl>
+                                      </p:cBhvr>
+                                    </p:animEffect>
+                                  </p:childTnLst>
+                                </p:cTn>
+                              </p:par>
+                              <p:par>
+                                <p:cTn id="71" presetID="22" presetClass="entr" presetSubtype="2" fill="hold" grpId="0" nodeType="withEffect">
+                                  <p:stCondLst>
+                                    <p:cond delay="0"/>
+                                  </p:stCondLst>
+                                  <p:childTnLst>
+                                    <p:set>
+                                      <p:cBhvr>
+                                        <p:cTn id="72" dur="1" fill="hold">
+                                          <p:stCondLst>
+                                            <p:cond delay="0"/>
+                                          </p:stCondLst>
+                                        </p:cTn>
+                                        <p:tgtEl>
+                                          <p:spTgt spid="23"/>
+                                        </p:tgtEl>
+                                        <p:attrNameLst>
+                                          <p:attrName>style.visibility</p:attrName>
+                                        </p:attrNameLst>
+                                      </p:cBhvr>
+                                      <p:to>
+                                        <p:strVal val="visible"/>
+                                      </p:to>
+                                    </p:set>
+                                    <p:animEffect transition="in" filter="wipe(right)">
+                                      <p:cBhvr>
+                                        <p:cTn id="73" dur="2000"/>
+                                        <p:tgtEl>
+                                          <p:spTgt spid="23"/>
+                                        </p:tgtEl>
+                                      </p:cBhvr>
+                                    </p:animEffect>
+                                  </p:childTnLst>
+                                </p:cTn>
+                              </p:par>
+                              <p:par>
+                                <p:cTn id="74" presetID="22" presetClass="entr" presetSubtype="2" fill="hold" grpId="0" nodeType="withEffect">
+                                  <p:stCondLst>
+                                    <p:cond delay="0"/>
+                                  </p:stCondLst>
+                                  <p:childTnLst>
+                                    <p:set>
+                                      <p:cBhvr>
+                                        <p:cTn id="75" dur="1" fill="hold">
+                                          <p:stCondLst>
+                                            <p:cond delay="0"/>
+                                          </p:stCondLst>
+                                        </p:cTn>
+                                        <p:tgtEl>
+                                          <p:spTgt spid="24"/>
+                                        </p:tgtEl>
+                                        <p:attrNameLst>
+                                          <p:attrName>style.visibility</p:attrName>
+                                        </p:attrNameLst>
+                                      </p:cBhvr>
+                                      <p:to>
+                                        <p:strVal val="visible"/>
+                                      </p:to>
+                                    </p:set>
+                                    <p:animEffect transition="in" filter="wipe(right)">
+                                      <p:cBhvr>
+                                        <p:cTn id="76" dur="2000"/>
+                                        <p:tgtEl>
+                                          <p:spTgt spid="24"/>
+                                        </p:tgtEl>
+                                      </p:cBhvr>
+                                    </p:animEffect>
+                                  </p:childTnLst>
+                                </p:cTn>
+                              </p:par>
+                              <p:par>
+                                <p:cTn id="77" presetID="22" presetClass="entr" presetSubtype="2" fill="hold" grpId="0" nodeType="withEffect">
+                                  <p:stCondLst>
+                                    <p:cond delay="0"/>
+                                  </p:stCondLst>
+                                  <p:childTnLst>
+                                    <p:set>
+                                      <p:cBhvr>
+                                        <p:cTn id="78" dur="1" fill="hold">
+                                          <p:stCondLst>
+                                            <p:cond delay="0"/>
+                                          </p:stCondLst>
+                                        </p:cTn>
+                                        <p:tgtEl>
+                                          <p:spTgt spid="25"/>
+                                        </p:tgtEl>
+                                        <p:attrNameLst>
+                                          <p:attrName>style.visibility</p:attrName>
+                                        </p:attrNameLst>
+                                      </p:cBhvr>
+                                      <p:to>
+                                        <p:strVal val="visible"/>
+                                      </p:to>
+                                    </p:set>
+                                    <p:animEffect transition="in" filter="wipe(right)">
+                                      <p:cBhvr>
+                                        <p:cTn id="79" dur="2000"/>
+                                        <p:tgtEl>
+                                          <p:spTgt spid="25"/>
+                                        </p:tgtEl>
+                                      </p:cBhvr>
+                                    </p:animEffect>
+                                  </p:childTnLst>
+                                </p:cTn>
+                              </p:par>
+                              <p:par>
+                                <p:cTn id="80" presetID="22" presetClass="entr" presetSubtype="2" fill="hold" grpId="0" nodeType="withEffect">
+                                  <p:stCondLst>
+                                    <p:cond delay="0"/>
+                                  </p:stCondLst>
+                                  <p:childTnLst>
+                                    <p:set>
+                                      <p:cBhvr>
+                                        <p:cTn id="81" dur="1" fill="hold">
+                                          <p:stCondLst>
+                                            <p:cond delay="0"/>
+                                          </p:stCondLst>
+                                        </p:cTn>
+                                        <p:tgtEl>
+                                          <p:spTgt spid="26"/>
+                                        </p:tgtEl>
+                                        <p:attrNameLst>
+                                          <p:attrName>style.visibility</p:attrName>
+                                        </p:attrNameLst>
+                                      </p:cBhvr>
+                                      <p:to>
+                                        <p:strVal val="visible"/>
+                                      </p:to>
+                                    </p:set>
+                                    <p:animEffect transition="in" filter="wipe(right)">
+                                      <p:cBhvr>
+                                        <p:cTn id="82" dur="2000"/>
+                                        <p:tgtEl>
+                                          <p:spTgt spid="26"/>
+                                        </p:tgtEl>
+                                      </p:cBhvr>
+                                    </p:animEffect>
+                                  </p:childTnLst>
+                                </p:cTn>
+                              </p:par>
+                              <p:par>
+                                <p:cTn id="83" presetID="22" presetClass="entr" presetSubtype="2" fill="hold" grpId="0" nodeType="withEffect">
+                                  <p:stCondLst>
+                                    <p:cond delay="0"/>
+                                  </p:stCondLst>
+                                  <p:childTnLst>
+                                    <p:set>
+                                      <p:cBhvr>
+                                        <p:cTn id="84" dur="1" fill="hold">
+                                          <p:stCondLst>
+                                            <p:cond delay="0"/>
+                                          </p:stCondLst>
+                                        </p:cTn>
+                                        <p:tgtEl>
+                                          <p:spTgt spid="27"/>
+                                        </p:tgtEl>
+                                        <p:attrNameLst>
+                                          <p:attrName>style.visibility</p:attrName>
+                                        </p:attrNameLst>
+                                      </p:cBhvr>
+                                      <p:to>
+                                        <p:strVal val="visible"/>
+                                      </p:to>
+                                    </p:set>
+                                    <p:animEffect transition="in" filter="wipe(right)">
+                                      <p:cBhvr>
+                                        <p:cTn id="85" dur="2000"/>
+                                        <p:tgtEl>
+                                          <p:spTgt spid="27"/>
+                                        </p:tgtEl>
+                                      </p:cBhvr>
+                                    </p:animEffect>
+                                  </p:childTnLst>
+                                </p:cTn>
+                              </p:par>
+                            </p:childTnLst>
+                          </p:cTn>
+                        </p:par>
+                        <p:par>
+                          <p:cTn id="86" fill="hold">
+                            <p:stCondLst>
+                              <p:cond delay="15000"/>
+                            </p:stCondLst>
+                            <p:childTnLst>
+                              <p:par>
+                                <p:cTn id="87" presetID="22" presetClass="entr" presetSubtype="2" fill="hold" grpId="0" nodeType="afterEffect">
+                                  <p:stCondLst>
+                                    <p:cond delay="0"/>
+                                  </p:stCondLst>
+                                  <p:childTnLst>
+                                    <p:set>
+                                      <p:cBhvr>
+                                        <p:cTn id="88" dur="1" fill="hold">
+                                          <p:stCondLst>
+                                            <p:cond delay="0"/>
+                                          </p:stCondLst>
+                                        </p:cTn>
+                                        <p:tgtEl>
+                                          <p:spTgt spid="28"/>
+                                        </p:tgtEl>
+                                        <p:attrNameLst>
+                                          <p:attrName>style.visibility</p:attrName>
+                                        </p:attrNameLst>
+                                      </p:cBhvr>
+                                      <p:to>
+                                        <p:strVal val="visible"/>
+                                      </p:to>
+                                    </p:set>
+                                    <p:animEffect transition="in" filter="wipe(right)">
+                                      <p:cBhvr>
+                                        <p:cTn id="89" dur="2000"/>
+                                        <p:tgtEl>
+                                          <p:spTgt spid="28"/>
+                                        </p:tgtEl>
+                                      </p:cBhvr>
+                                    </p:animEffect>
+                                  </p:childTnLst>
+                                </p:cTn>
+                              </p:par>
+                            </p:childTnLst>
+                          </p:cTn>
+                        </p:par>
+                      </p:childTnLst>
+                    </p:cTn>
+                  </p:par>
+                </p:childTnLst>
+              </p:cTn>
+              <p:prevCondLst>
+                <p:cond evt="onPrev" delay="0">
+                  <p:tgtEl>
+                    <p:sldTgt/>
+                  </p:tgtEl>
+                </p:cond>
+              </p:prevCondLst>
+              <p:nextCondLst>
+                <p:cond evt="onNext" delay="0">
+                  <p:tgtEl>
+                    <p:sldTgt/>
+                  </p:tgtEl>
+                </p:cond>
+              </p:nextCondLst>
+            </p:seq>
+          </p:childTnLst>
+        </p:cTn>
       </p:par>
     </p:tnLst>
+    <p:bldLst>
+      <p:bldP spid="3" grpId="0" animBg="1"/>
+      <p:bldP spid="3" grpId="1" animBg="1"/>
+      <p:bldP spid="4" grpId="0" animBg="1"/>
+      <p:bldP spid="5" grpId="0" animBg="1"/>
+      <p:bldP spid="6" grpId="0" animBg="1"/>
+      <p:bldP spid="7" grpId="0" animBg="1"/>
+      <p:bldP spid="8" grpId="0" animBg="1"/>
+      <p:bldP spid="9" grpId="0" animBg="1"/>
+      <p:bldP spid="10" grpId="0" animBg="1"/>
+      <p:bldP spid="11" grpId="0" animBg="1"/>
+      <p:bldP spid="12" grpId="0" animBg="1"/>
+      <p:bldP spid="13" grpId="0" animBg="1"/>
+      <p:bldP spid="14" grpId="0" animBg="1"/>
+      <p:bldP spid="15" grpId="0" animBg="1"/>
+      <p:bldP spid="16" grpId="0" animBg="1"/>
+      <p:bldP spid="17" grpId="0" animBg="1"/>
+      <p:bldP spid="18" grpId="0" animBg="1"/>
+      <p:bldP spid="19" grpId="0" animBg="1"/>
+      <p:bldP spid="20" grpId="0" animBg="1"/>
+      <p:bldP spid="22" grpId="0" animBg="1"/>
+      <p:bldP spid="23" grpId="0" animBg="1"/>
+      <p:bldP spid="24" grpId="0" animBg="1"/>
+      <p:bldP spid="25" grpId="0" animBg="1"/>
+      <p:bldP spid="26" grpId="0" animBg="1"/>
+      <p:bldP spid="27" grpId="0" animBg="1"/>
+      <p:bldP spid="28" grpId="0" animBg="1"/>
+    </p:bldLst>
   </p:timing>
 </p:sld>
 </file>
@@ -18823,7 +21812,7 @@
             <a:hlinkClick r:id="rId3"/>
             <a:extLst>
               <a:ext uri="{FF2B5EF4-FFF2-40B4-BE49-F238E27FC236}">
-                <a16:creationId xmlns:a16="http://schemas.microsoft.com/office/drawing/2014/main" xmlns="" id="{6F77B270-35F1-4A5B-875A-9BFD13BC898E}"/>
+                <a16:creationId xmlns="" xmlns:a16="http://schemas.microsoft.com/office/drawing/2014/main" id="{6F77B270-35F1-4A5B-875A-9BFD13BC898E}"/>
               </a:ext>
             </a:extLst>
           </p:cNvPr>
@@ -18918,7 +21907,7 @@
             <a:hlinkClick r:id="rId3"/>
             <a:extLst>
               <a:ext uri="{FF2B5EF4-FFF2-40B4-BE49-F238E27FC236}">
-                <a16:creationId xmlns:a16="http://schemas.microsoft.com/office/drawing/2014/main" xmlns="" id="{6F77B270-35F1-4A5B-875A-9BFD13BC898E}"/>
+                <a16:creationId xmlns="" xmlns:a16="http://schemas.microsoft.com/office/drawing/2014/main" id="{6F77B270-35F1-4A5B-875A-9BFD13BC898E}"/>
               </a:ext>
             </a:extLst>
           </p:cNvPr>
@@ -19013,7 +22002,7 @@
             <a:hlinkClick r:id="rId3"/>
             <a:extLst>
               <a:ext uri="{FF2B5EF4-FFF2-40B4-BE49-F238E27FC236}">
-                <a16:creationId xmlns:a16="http://schemas.microsoft.com/office/drawing/2014/main" xmlns="" id="{6F77B270-35F1-4A5B-875A-9BFD13BC898E}"/>
+                <a16:creationId xmlns="" xmlns:a16="http://schemas.microsoft.com/office/drawing/2014/main" id="{6F77B270-35F1-4A5B-875A-9BFD13BC898E}"/>
               </a:ext>
             </a:extLst>
           </p:cNvPr>
@@ -19108,7 +22097,7 @@
             <a:hlinkClick r:id="rId3"/>
             <a:extLst>
               <a:ext uri="{FF2B5EF4-FFF2-40B4-BE49-F238E27FC236}">
-                <a16:creationId xmlns:a16="http://schemas.microsoft.com/office/drawing/2014/main" xmlns="" id="{6F77B270-35F1-4A5B-875A-9BFD13BC898E}"/>
+                <a16:creationId xmlns="" xmlns:a16="http://schemas.microsoft.com/office/drawing/2014/main" id="{6F77B270-35F1-4A5B-875A-9BFD13BC898E}"/>
               </a:ext>
             </a:extLst>
           </p:cNvPr>
@@ -19203,7 +22192,7 @@
             <a:hlinkClick r:id="rId3"/>
             <a:extLst>
               <a:ext uri="{FF2B5EF4-FFF2-40B4-BE49-F238E27FC236}">
-                <a16:creationId xmlns:a16="http://schemas.microsoft.com/office/drawing/2014/main" xmlns="" id="{6F77B270-35F1-4A5B-875A-9BFD13BC898E}"/>
+                <a16:creationId xmlns="" xmlns:a16="http://schemas.microsoft.com/office/drawing/2014/main" id="{6F77B270-35F1-4A5B-875A-9BFD13BC898E}"/>
               </a:ext>
             </a:extLst>
           </p:cNvPr>
@@ -19556,7 +22545,7 @@
             <a:hlinkClick r:id="rId3"/>
             <a:extLst>
               <a:ext uri="{FF2B5EF4-FFF2-40B4-BE49-F238E27FC236}">
-                <a16:creationId xmlns:a16="http://schemas.microsoft.com/office/drawing/2014/main" xmlns="" id="{6F77B270-35F1-4A5B-875A-9BFD13BC898E}"/>
+                <a16:creationId xmlns="" xmlns:a16="http://schemas.microsoft.com/office/drawing/2014/main" id="{6F77B270-35F1-4A5B-875A-9BFD13BC898E}"/>
               </a:ext>
             </a:extLst>
           </p:cNvPr>
@@ -21571,7 +24560,7 @@
             <a:hlinkClick r:id="rId3"/>
             <a:extLst>
               <a:ext uri="{FF2B5EF4-FFF2-40B4-BE49-F238E27FC236}">
-                <a16:creationId xmlns:a16="http://schemas.microsoft.com/office/drawing/2014/main" xmlns="" id="{6F77B270-35F1-4A5B-875A-9BFD13BC898E}"/>
+                <a16:creationId xmlns="" xmlns:a16="http://schemas.microsoft.com/office/drawing/2014/main" id="{6F77B270-35F1-4A5B-875A-9BFD13BC898E}"/>
               </a:ext>
             </a:extLst>
           </p:cNvPr>
@@ -21822,7 +24811,7 @@
             <a:hlinkClick r:id="rId3"/>
             <a:extLst>
               <a:ext uri="{FF2B5EF4-FFF2-40B4-BE49-F238E27FC236}">
-                <a16:creationId xmlns:a16="http://schemas.microsoft.com/office/drawing/2014/main" xmlns="" id="{6F77B270-35F1-4A5B-875A-9BFD13BC898E}"/>
+                <a16:creationId xmlns="" xmlns:a16="http://schemas.microsoft.com/office/drawing/2014/main" id="{6F77B270-35F1-4A5B-875A-9BFD13BC898E}"/>
               </a:ext>
             </a:extLst>
           </p:cNvPr>
@@ -22297,7 +25286,7 @@
             <a:hlinkClick r:id="rId3"/>
             <a:extLst>
               <a:ext uri="{FF2B5EF4-FFF2-40B4-BE49-F238E27FC236}">
-                <a16:creationId xmlns:a16="http://schemas.microsoft.com/office/drawing/2014/main" xmlns="" id="{6F77B270-35F1-4A5B-875A-9BFD13BC898E}"/>
+                <a16:creationId xmlns="" xmlns:a16="http://schemas.microsoft.com/office/drawing/2014/main" id="{6F77B270-35F1-4A5B-875A-9BFD13BC898E}"/>
               </a:ext>
             </a:extLst>
           </p:cNvPr>
@@ -22548,7 +25537,7 @@
             <a:hlinkClick r:id="rId3"/>
             <a:extLst>
               <a:ext uri="{FF2B5EF4-FFF2-40B4-BE49-F238E27FC236}">
-                <a16:creationId xmlns:a16="http://schemas.microsoft.com/office/drawing/2014/main" xmlns="" id="{6F77B270-35F1-4A5B-875A-9BFD13BC898E}"/>
+                <a16:creationId xmlns="" xmlns:a16="http://schemas.microsoft.com/office/drawing/2014/main" id="{6F77B270-35F1-4A5B-875A-9BFD13BC898E}"/>
               </a:ext>
             </a:extLst>
           </p:cNvPr>
@@ -22829,7 +25818,7 @@
             <a:hlinkClick r:id="rId3"/>
             <a:extLst>
               <a:ext uri="{FF2B5EF4-FFF2-40B4-BE49-F238E27FC236}">
-                <a16:creationId xmlns:a16="http://schemas.microsoft.com/office/drawing/2014/main" xmlns="" id="{6F77B270-35F1-4A5B-875A-9BFD13BC898E}"/>
+                <a16:creationId xmlns="" xmlns:a16="http://schemas.microsoft.com/office/drawing/2014/main" id="{6F77B270-35F1-4A5B-875A-9BFD13BC898E}"/>
               </a:ext>
             </a:extLst>
           </p:cNvPr>
@@ -23776,7 +26765,7 @@
             <a:hlinkClick r:id="rId4"/>
             <a:extLst>
               <a:ext uri="{FF2B5EF4-FFF2-40B4-BE49-F238E27FC236}">
-                <a16:creationId xmlns:a16="http://schemas.microsoft.com/office/drawing/2014/main" xmlns="" id="{6F77B270-35F1-4A5B-875A-9BFD13BC898E}"/>
+                <a16:creationId xmlns="" xmlns:a16="http://schemas.microsoft.com/office/drawing/2014/main" id="{6F77B270-35F1-4A5B-875A-9BFD13BC898E}"/>
               </a:ext>
             </a:extLst>
           </p:cNvPr>
@@ -23868,7 +26857,7 @@
             <a:hlinkClick r:id="rId3"/>
             <a:extLst>
               <a:ext uri="{FF2B5EF4-FFF2-40B4-BE49-F238E27FC236}">
-                <a16:creationId xmlns:a16="http://schemas.microsoft.com/office/drawing/2014/main" xmlns="" id="{6F77B270-35F1-4A5B-875A-9BFD13BC898E}"/>
+                <a16:creationId xmlns="" xmlns:a16="http://schemas.microsoft.com/office/drawing/2014/main" id="{6F77B270-35F1-4A5B-875A-9BFD13BC898E}"/>
               </a:ext>
             </a:extLst>
           </p:cNvPr>
@@ -25694,7 +28683,7 @@
             <a:hlinkClick r:id="rId3"/>
             <a:extLst>
               <a:ext uri="{FF2B5EF4-FFF2-40B4-BE49-F238E27FC236}">
-                <a16:creationId xmlns:a16="http://schemas.microsoft.com/office/drawing/2014/main" xmlns="" id="{6F77B270-35F1-4A5B-875A-9BFD13BC898E}"/>
+                <a16:creationId xmlns="" xmlns:a16="http://schemas.microsoft.com/office/drawing/2014/main" id="{6F77B270-35F1-4A5B-875A-9BFD13BC898E}"/>
               </a:ext>
             </a:extLst>
           </p:cNvPr>
@@ -25910,7 +28899,7 @@
             <a:hlinkClick r:id="rId3"/>
             <a:extLst>
               <a:ext uri="{FF2B5EF4-FFF2-40B4-BE49-F238E27FC236}">
-                <a16:creationId xmlns:a16="http://schemas.microsoft.com/office/drawing/2014/main" xmlns="" id="{6F77B270-35F1-4A5B-875A-9BFD13BC898E}"/>
+                <a16:creationId xmlns="" xmlns:a16="http://schemas.microsoft.com/office/drawing/2014/main" id="{6F77B270-35F1-4A5B-875A-9BFD13BC898E}"/>
               </a:ext>
             </a:extLst>
           </p:cNvPr>
@@ -28089,7 +31078,7 @@
             <a:hlinkClick r:id="rId3"/>
             <a:extLst>
               <a:ext uri="{FF2B5EF4-FFF2-40B4-BE49-F238E27FC236}">
-                <a16:creationId xmlns:a16="http://schemas.microsoft.com/office/drawing/2014/main" xmlns="" id="{6F77B270-35F1-4A5B-875A-9BFD13BC898E}"/>
+                <a16:creationId xmlns="" xmlns:a16="http://schemas.microsoft.com/office/drawing/2014/main" id="{6F77B270-35F1-4A5B-875A-9BFD13BC898E}"/>
               </a:ext>
             </a:extLst>
           </p:cNvPr>
@@ -31123,7 +34112,7 @@
             <a:hlinkClick r:id="rId3"/>
             <a:extLst>
               <a:ext uri="{FF2B5EF4-FFF2-40B4-BE49-F238E27FC236}">
-                <a16:creationId xmlns:a16="http://schemas.microsoft.com/office/drawing/2014/main" xmlns="" id="{6F77B270-35F1-4A5B-875A-9BFD13BC898E}"/>
+                <a16:creationId xmlns="" xmlns:a16="http://schemas.microsoft.com/office/drawing/2014/main" id="{6F77B270-35F1-4A5B-875A-9BFD13BC898E}"/>
               </a:ext>
             </a:extLst>
           </p:cNvPr>
@@ -33749,7 +36738,7 @@
             <a:hlinkClick r:id="rId3"/>
             <a:extLst>
               <a:ext uri="{FF2B5EF4-FFF2-40B4-BE49-F238E27FC236}">
-                <a16:creationId xmlns:a16="http://schemas.microsoft.com/office/drawing/2014/main" xmlns="" id="{6F77B270-35F1-4A5B-875A-9BFD13BC898E}"/>
+                <a16:creationId xmlns="" xmlns:a16="http://schemas.microsoft.com/office/drawing/2014/main" id="{6F77B270-35F1-4A5B-875A-9BFD13BC898E}"/>
               </a:ext>
             </a:extLst>
           </p:cNvPr>
@@ -36853,7 +39842,7 @@
             <a:hlinkClick r:id="rId3"/>
             <a:extLst>
               <a:ext uri="{FF2B5EF4-FFF2-40B4-BE49-F238E27FC236}">
-                <a16:creationId xmlns:a16="http://schemas.microsoft.com/office/drawing/2014/main" xmlns="" id="{6F77B270-35F1-4A5B-875A-9BFD13BC898E}"/>
+                <a16:creationId xmlns="" xmlns:a16="http://schemas.microsoft.com/office/drawing/2014/main" id="{6F77B270-35F1-4A5B-875A-9BFD13BC898E}"/>
               </a:ext>
             </a:extLst>
           </p:cNvPr>
@@ -40010,7 +42999,7 @@
             <a:hlinkClick r:id="rId3"/>
             <a:extLst>
               <a:ext uri="{FF2B5EF4-FFF2-40B4-BE49-F238E27FC236}">
-                <a16:creationId xmlns:a16="http://schemas.microsoft.com/office/drawing/2014/main" xmlns="" id="{6F77B270-35F1-4A5B-875A-9BFD13BC898E}"/>
+                <a16:creationId xmlns="" xmlns:a16="http://schemas.microsoft.com/office/drawing/2014/main" id="{6F77B270-35F1-4A5B-875A-9BFD13BC898E}"/>
               </a:ext>
             </a:extLst>
           </p:cNvPr>
@@ -43120,7 +46109,7 @@
             <a:hlinkClick r:id="rId3"/>
             <a:extLst>
               <a:ext uri="{FF2B5EF4-FFF2-40B4-BE49-F238E27FC236}">
-                <a16:creationId xmlns:a16="http://schemas.microsoft.com/office/drawing/2014/main" xmlns="" id="{6F77B270-35F1-4A5B-875A-9BFD13BC898E}"/>
+                <a16:creationId xmlns="" xmlns:a16="http://schemas.microsoft.com/office/drawing/2014/main" id="{6F77B270-35F1-4A5B-875A-9BFD13BC898E}"/>
               </a:ext>
             </a:extLst>
           </p:cNvPr>
@@ -45778,7 +48767,7 @@
   <a:extraClrSchemeLst/>
   <a:extLst>
     <a:ext uri="{05A4C25C-085E-4340-85A3-A5531E510DB2}">
-      <thm15:themeFamily xmlns:thm15="http://schemas.microsoft.com/office/thememl/2012/main" xmlns="" name="Office Theme" id="{62F939B6-93AF-4DB8-9C6B-D6C7DFDC589F}" vid="{4A3C46E8-61CC-4603-A589-7422A47A8E4A}"/>
+      <thm15:themeFamily xmlns="" xmlns:thm15="http://schemas.microsoft.com/office/thememl/2012/main" name="Office Theme" id="{62F939B6-93AF-4DB8-9C6B-D6C7DFDC589F}" vid="{4A3C46E8-61CC-4603-A589-7422A47A8E4A}"/>
     </a:ext>
   </a:extLst>
 </a:theme>

</xml_diff>